<commit_message>
Aufgaben und Musterlösung hinzugefügt, Aufgaben in die Präsentation übernommen.
</commit_message>
<xml_diff>
--- a/git Schulung.pptx
+++ b/git Schulung.pptx
@@ -5,10 +5,10 @@
     <p:sldMasterId id="2147483648" r:id="rId1"/>
   </p:sldMasterIdLst>
   <p:notesMasterIdLst>
-    <p:notesMasterId r:id="rId8"/>
+    <p:notesMasterId r:id="rId15"/>
   </p:notesMasterIdLst>
   <p:handoutMasterIdLst>
-    <p:handoutMasterId r:id="rId9"/>
+    <p:handoutMasterId r:id="rId16"/>
   </p:handoutMasterIdLst>
   <p:sldIdLst>
     <p:sldId id="257" r:id="rId2"/>
@@ -17,6 +17,13 @@
     <p:sldId id="259" r:id="rId5"/>
     <p:sldId id="260" r:id="rId6"/>
     <p:sldId id="261" r:id="rId7"/>
+    <p:sldId id="262" r:id="rId8"/>
+    <p:sldId id="263" r:id="rId9"/>
+    <p:sldId id="264" r:id="rId10"/>
+    <p:sldId id="265" r:id="rId11"/>
+    <p:sldId id="266" r:id="rId12"/>
+    <p:sldId id="267" r:id="rId13"/>
+    <p:sldId id="268" r:id="rId14"/>
   </p:sldIdLst>
   <p:sldSz cx="9144000" cy="6858000" type="screen4x3"/>
   <p:notesSz cx="6858000" cy="9144000"/>
@@ -287,7 +294,7 @@
             <a:fld id="{01A16F67-0ADF-424E-A3CF-900693C53E51}" type="datetimeFigureOut">
               <a:rPr lang="de-DE" smtClean="0"/>
               <a:pPr/>
-              <a:t>19.03.2018</a:t>
+              <a:t>26.03.2018</a:t>
             </a:fld>
             <a:endParaRPr lang="de-DE"/>
           </a:p>
@@ -454,7 +461,7 @@
             <a:fld id="{C10ADC04-0464-4C0D-AAF8-E93D48EEE2B0}" type="datetimeFigureOut">
               <a:rPr lang="de-DE" smtClean="0"/>
               <a:pPr/>
-              <a:t>19.03.2018</a:t>
+              <a:t>26.03.2018</a:t>
             </a:fld>
             <a:endParaRPr lang="de-DE"/>
           </a:p>
@@ -5998,7 +6005,7 @@
                 <a:tabLst/>
                 <a:defRPr/>
               </a:pPr>
-              <a:t>Montag, 19. März 2018</a:t>
+              <a:t>Montag, 26. März 2018</a:t>
             </a:fld>
             <a:endParaRPr lang="de-DE" sz="1600" dirty="0"/>
           </a:p>
@@ -7366,7 +7373,7 @@
                 <a:tabLst/>
                 <a:defRPr/>
               </a:pPr>
-              <a:t>19.03.2018</a:t>
+              <a:t>26.03.2018</a:t>
             </a:fld>
             <a:r>
               <a:rPr lang="de-DE" sz="1600" b="0" i="1" kern="0" dirty="0">
@@ -12113,6 +12120,857 @@
 </p:sld>
 </file>
 
+<file path=ppt/slides/slide10.xml><?xml version="1.0" encoding="utf-8"?>
+<p:sld xmlns:a="http://schemas.openxmlformats.org/drawingml/2006/main" xmlns:r="http://schemas.openxmlformats.org/officeDocument/2006/relationships" xmlns:p="http://schemas.openxmlformats.org/presentationml/2006/main">
+  <p:cSld>
+    <p:spTree>
+      <p:nvGrpSpPr>
+        <p:cNvPr id="1" name=""/>
+        <p:cNvGrpSpPr/>
+        <p:nvPr/>
+      </p:nvGrpSpPr>
+      <p:grpSpPr>
+        <a:xfrm>
+          <a:off x="0" y="0"/>
+          <a:ext cx="0" cy="0"/>
+          <a:chOff x="0" y="0"/>
+          <a:chExt cx="0" cy="0"/>
+        </a:xfrm>
+      </p:grpSpPr>
+      <p:sp>
+        <p:nvSpPr>
+          <p:cNvPr id="2" name="Titel 1"/>
+          <p:cNvSpPr>
+            <a:spLocks noGrp="1"/>
+          </p:cNvSpPr>
+          <p:nvPr>
+            <p:ph type="title"/>
+          </p:nvPr>
+        </p:nvSpPr>
+        <p:spPr/>
+        <p:txBody>
+          <a:bodyPr/>
+          <a:lstStyle/>
+          <a:p>
+            <a:r>
+              <a:rPr lang="de-DE" dirty="0"/>
+              <a:t>Hands-On</a:t>
+            </a:r>
+          </a:p>
+        </p:txBody>
+      </p:sp>
+      <p:pic>
+        <p:nvPicPr>
+          <p:cNvPr id="7" name="Bildplatzhalter 6" descr="Ein Bild, das ClipArt enthält.&#10;&#10;Mit hoher Zuverlässigkeit generierte Beschreibung">
+            <a:extLst>
+              <a:ext uri="{FF2B5EF4-FFF2-40B4-BE49-F238E27FC236}">
+                <a16:creationId xmlns:a16="http://schemas.microsoft.com/office/drawing/2014/main" id="{139C5A7F-A204-41EC-9889-C7B002A21534}"/>
+              </a:ext>
+            </a:extLst>
+          </p:cNvPr>
+          <p:cNvPicPr>
+            <a:picLocks noGrp="1" noChangeAspect="1"/>
+          </p:cNvPicPr>
+          <p:nvPr>
+            <p:ph type="pic" sz="quarter" idx="12"/>
+          </p:nvPr>
+        </p:nvPicPr>
+        <p:blipFill>
+          <a:blip r:embed="rId2">
+            <a:extLst>
+              <a:ext uri="{28A0092B-C50C-407E-A947-70E740481C1C}">
+                <a14:useLocalDpi xmlns:a14="http://schemas.microsoft.com/office/drawing/2010/main" val="0"/>
+              </a:ext>
+            </a:extLst>
+          </a:blip>
+          <a:srcRect t="6324" b="6324"/>
+          <a:stretch>
+            <a:fillRect/>
+          </a:stretch>
+        </p:blipFill>
+        <p:spPr/>
+      </p:pic>
+      <p:sp>
+        <p:nvSpPr>
+          <p:cNvPr id="4" name="Textplatzhalter 3"/>
+          <p:cNvSpPr>
+            <a:spLocks noGrp="1"/>
+          </p:cNvSpPr>
+          <p:nvPr>
+            <p:ph type="body" sz="quarter" idx="13"/>
+          </p:nvPr>
+        </p:nvSpPr>
+        <p:spPr>
+          <a:xfrm>
+            <a:off x="1187624" y="2996952"/>
+            <a:ext cx="6769074" cy="1439689"/>
+          </a:xfrm>
+        </p:spPr>
+        <p:txBody>
+          <a:bodyPr>
+            <a:normAutofit fontScale="70000" lnSpcReduction="20000"/>
+          </a:bodyPr>
+          <a:lstStyle/>
+          <a:p>
+            <a:r>
+              <a:rPr lang="de-DE" dirty="0"/>
+              <a:t>Anne hat schon wieder (!!) das Bier zu einem gesunden Gemüse geändert. Direkt danach hat Philipp wichtige Änderungen an der Datei FB_Alle.txt gemacht und diese hochgeladen. Erst danach stellt er fest, dass sein Freund Herbert, den er in die Datei eingetragen hat, Spinat anstatt Bier bekommt! Da seine eigenen Änderungen so aufwändig sind, dass er sie nicht nochmal machen möchte, kommt ein </a:t>
+            </a:r>
+            <a:r>
+              <a:rPr lang="de-DE" dirty="0" err="1"/>
+              <a:t>reset</a:t>
+            </a:r>
+            <a:r>
+              <a:rPr lang="de-DE" dirty="0"/>
+              <a:t> nicht in Frage.  Was hätte er rückblickend besser machen können? </a:t>
+            </a:r>
+          </a:p>
+        </p:txBody>
+      </p:sp>
+      <p:sp>
+        <p:nvSpPr>
+          <p:cNvPr id="5" name="Textplatzhalter 4"/>
+          <p:cNvSpPr>
+            <a:spLocks noGrp="1"/>
+          </p:cNvSpPr>
+          <p:nvPr>
+            <p:ph type="body" sz="quarter" idx="15"/>
+          </p:nvPr>
+        </p:nvSpPr>
+        <p:spPr/>
+        <p:txBody>
+          <a:bodyPr/>
+          <a:lstStyle/>
+          <a:p>
+            <a:endParaRPr lang="de-DE" dirty="0"/>
+          </a:p>
+        </p:txBody>
+      </p:sp>
+      <p:sp>
+        <p:nvSpPr>
+          <p:cNvPr id="3" name="Rechteck: abgerundete Ecken 2">
+            <a:extLst>
+              <a:ext uri="{FF2B5EF4-FFF2-40B4-BE49-F238E27FC236}">
+                <a16:creationId xmlns:a16="http://schemas.microsoft.com/office/drawing/2014/main" id="{3CE9FA32-6D59-4CA8-9F8C-C7123564038F}"/>
+              </a:ext>
+            </a:extLst>
+          </p:cNvPr>
+          <p:cNvSpPr/>
+          <p:nvPr/>
+        </p:nvSpPr>
+        <p:spPr>
+          <a:xfrm>
+            <a:off x="1115294" y="1508400"/>
+            <a:ext cx="6912768" cy="1301304"/>
+          </a:xfrm>
+          <a:prstGeom prst="roundRect">
+            <a:avLst/>
+          </a:prstGeom>
+          <a:solidFill>
+            <a:schemeClr val="tx2">
+              <a:lumMod val="20000"/>
+              <a:lumOff val="80000"/>
+            </a:schemeClr>
+          </a:solidFill>
+          <a:ln w="28575">
+            <a:solidFill>
+              <a:srgbClr val="C00000"/>
+            </a:solidFill>
+          </a:ln>
+        </p:spPr>
+        <p:style>
+          <a:lnRef idx="2">
+            <a:schemeClr val="accent1">
+              <a:shade val="50000"/>
+            </a:schemeClr>
+          </a:lnRef>
+          <a:fillRef idx="1">
+            <a:schemeClr val="accent1"/>
+          </a:fillRef>
+          <a:effectRef idx="0">
+            <a:schemeClr val="accent1"/>
+          </a:effectRef>
+          <a:fontRef idx="minor">
+            <a:schemeClr val="lt1"/>
+          </a:fontRef>
+        </p:style>
+        <p:txBody>
+          <a:bodyPr rtlCol="0" anchor="ctr"/>
+          <a:lstStyle/>
+          <a:p>
+            <a:pPr algn="ctr"/>
+            <a:r>
+              <a:rPr lang="de-DE" sz="4800" dirty="0">
+                <a:solidFill>
+                  <a:schemeClr val="tx1"/>
+                </a:solidFill>
+              </a:rPr>
+              <a:t>Aufgabe 5</a:t>
+            </a:r>
+          </a:p>
+        </p:txBody>
+      </p:sp>
+    </p:spTree>
+    <p:extLst>
+      <p:ext uri="{BB962C8B-B14F-4D97-AF65-F5344CB8AC3E}">
+        <p14:creationId xmlns:p14="http://schemas.microsoft.com/office/powerpoint/2010/main" val="110835878"/>
+      </p:ext>
+    </p:extLst>
+  </p:cSld>
+  <p:clrMapOvr>
+    <a:masterClrMapping/>
+  </p:clrMapOvr>
+</p:sld>
+</file>
+
+<file path=ppt/slides/slide11.xml><?xml version="1.0" encoding="utf-8"?>
+<p:sld xmlns:a="http://schemas.openxmlformats.org/drawingml/2006/main" xmlns:r="http://schemas.openxmlformats.org/officeDocument/2006/relationships" xmlns:p="http://schemas.openxmlformats.org/presentationml/2006/main">
+  <p:cSld>
+    <p:spTree>
+      <p:nvGrpSpPr>
+        <p:cNvPr id="1" name=""/>
+        <p:cNvGrpSpPr/>
+        <p:nvPr/>
+      </p:nvGrpSpPr>
+      <p:grpSpPr>
+        <a:xfrm>
+          <a:off x="0" y="0"/>
+          <a:ext cx="0" cy="0"/>
+          <a:chOff x="0" y="0"/>
+          <a:chExt cx="0" cy="0"/>
+        </a:xfrm>
+      </p:grpSpPr>
+      <p:sp>
+        <p:nvSpPr>
+          <p:cNvPr id="2" name="Titel 1"/>
+          <p:cNvSpPr>
+            <a:spLocks noGrp="1"/>
+          </p:cNvSpPr>
+          <p:nvPr>
+            <p:ph type="title"/>
+          </p:nvPr>
+        </p:nvSpPr>
+        <p:spPr/>
+        <p:txBody>
+          <a:bodyPr/>
+          <a:lstStyle/>
+          <a:p>
+            <a:r>
+              <a:rPr lang="de-DE" dirty="0"/>
+              <a:t>Hands-On</a:t>
+            </a:r>
+          </a:p>
+        </p:txBody>
+      </p:sp>
+      <p:pic>
+        <p:nvPicPr>
+          <p:cNvPr id="7" name="Bildplatzhalter 6" descr="Ein Bild, das ClipArt enthält.&#10;&#10;Mit hoher Zuverlässigkeit generierte Beschreibung">
+            <a:extLst>
+              <a:ext uri="{FF2B5EF4-FFF2-40B4-BE49-F238E27FC236}">
+                <a16:creationId xmlns:a16="http://schemas.microsoft.com/office/drawing/2014/main" id="{139C5A7F-A204-41EC-9889-C7B002A21534}"/>
+              </a:ext>
+            </a:extLst>
+          </p:cNvPr>
+          <p:cNvPicPr>
+            <a:picLocks noGrp="1" noChangeAspect="1"/>
+          </p:cNvPicPr>
+          <p:nvPr>
+            <p:ph type="pic" sz="quarter" idx="12"/>
+          </p:nvPr>
+        </p:nvPicPr>
+        <p:blipFill>
+          <a:blip r:embed="rId2">
+            <a:extLst>
+              <a:ext uri="{28A0092B-C50C-407E-A947-70E740481C1C}">
+                <a14:useLocalDpi xmlns:a14="http://schemas.microsoft.com/office/drawing/2010/main" val="0"/>
+              </a:ext>
+            </a:extLst>
+          </a:blip>
+          <a:srcRect t="6324" b="6324"/>
+          <a:stretch>
+            <a:fillRect/>
+          </a:stretch>
+        </p:blipFill>
+        <p:spPr/>
+      </p:pic>
+      <p:sp>
+        <p:nvSpPr>
+          <p:cNvPr id="4" name="Textplatzhalter 3"/>
+          <p:cNvSpPr>
+            <a:spLocks noGrp="1"/>
+          </p:cNvSpPr>
+          <p:nvPr>
+            <p:ph type="body" sz="quarter" idx="13"/>
+          </p:nvPr>
+        </p:nvSpPr>
+        <p:spPr>
+          <a:xfrm>
+            <a:off x="1187624" y="2996952"/>
+            <a:ext cx="6769074" cy="1439689"/>
+          </a:xfrm>
+        </p:spPr>
+        <p:txBody>
+          <a:bodyPr>
+            <a:normAutofit/>
+          </a:bodyPr>
+          <a:lstStyle/>
+          <a:p>
+            <a:pPr marL="0" indent="0">
+              <a:buNone/>
+            </a:pPr>
+            <a:r>
+              <a:rPr lang="de-DE" dirty="0"/>
+              <a:t>Erstelle deinen eigenen Branch und trage in die ausführbare Datei dein Lieblingsgemüse ein.</a:t>
+            </a:r>
+          </a:p>
+        </p:txBody>
+      </p:sp>
+      <p:sp>
+        <p:nvSpPr>
+          <p:cNvPr id="5" name="Textplatzhalter 4"/>
+          <p:cNvSpPr>
+            <a:spLocks noGrp="1"/>
+          </p:cNvSpPr>
+          <p:nvPr>
+            <p:ph type="body" sz="quarter" idx="15"/>
+          </p:nvPr>
+        </p:nvSpPr>
+        <p:spPr/>
+        <p:txBody>
+          <a:bodyPr/>
+          <a:lstStyle/>
+          <a:p>
+            <a:endParaRPr lang="de-DE" dirty="0"/>
+          </a:p>
+        </p:txBody>
+      </p:sp>
+      <p:sp>
+        <p:nvSpPr>
+          <p:cNvPr id="3" name="Rechteck: abgerundete Ecken 2">
+            <a:extLst>
+              <a:ext uri="{FF2B5EF4-FFF2-40B4-BE49-F238E27FC236}">
+                <a16:creationId xmlns:a16="http://schemas.microsoft.com/office/drawing/2014/main" id="{3CE9FA32-6D59-4CA8-9F8C-C7123564038F}"/>
+              </a:ext>
+            </a:extLst>
+          </p:cNvPr>
+          <p:cNvSpPr/>
+          <p:nvPr/>
+        </p:nvSpPr>
+        <p:spPr>
+          <a:xfrm>
+            <a:off x="1115294" y="1508400"/>
+            <a:ext cx="6912768" cy="1301304"/>
+          </a:xfrm>
+          <a:prstGeom prst="roundRect">
+            <a:avLst/>
+          </a:prstGeom>
+          <a:solidFill>
+            <a:schemeClr val="tx2">
+              <a:lumMod val="20000"/>
+              <a:lumOff val="80000"/>
+            </a:schemeClr>
+          </a:solidFill>
+          <a:ln w="28575">
+            <a:solidFill>
+              <a:srgbClr val="C00000"/>
+            </a:solidFill>
+          </a:ln>
+        </p:spPr>
+        <p:style>
+          <a:lnRef idx="2">
+            <a:schemeClr val="accent1">
+              <a:shade val="50000"/>
+            </a:schemeClr>
+          </a:lnRef>
+          <a:fillRef idx="1">
+            <a:schemeClr val="accent1"/>
+          </a:fillRef>
+          <a:effectRef idx="0">
+            <a:schemeClr val="accent1"/>
+          </a:effectRef>
+          <a:fontRef idx="minor">
+            <a:schemeClr val="lt1"/>
+          </a:fontRef>
+        </p:style>
+        <p:txBody>
+          <a:bodyPr rtlCol="0" anchor="ctr"/>
+          <a:lstStyle/>
+          <a:p>
+            <a:pPr algn="ctr"/>
+            <a:r>
+              <a:rPr lang="de-DE" sz="4800" dirty="0">
+                <a:solidFill>
+                  <a:schemeClr val="tx1"/>
+                </a:solidFill>
+              </a:rPr>
+              <a:t>Aufgabe 6</a:t>
+            </a:r>
+          </a:p>
+        </p:txBody>
+      </p:sp>
+    </p:spTree>
+    <p:extLst>
+      <p:ext uri="{BB962C8B-B14F-4D97-AF65-F5344CB8AC3E}">
+        <p14:creationId xmlns:p14="http://schemas.microsoft.com/office/powerpoint/2010/main" val="1421577261"/>
+      </p:ext>
+    </p:extLst>
+  </p:cSld>
+  <p:clrMapOvr>
+    <a:masterClrMapping/>
+  </p:clrMapOvr>
+</p:sld>
+</file>
+
+<file path=ppt/slides/slide12.xml><?xml version="1.0" encoding="utf-8"?>
+<p:sld xmlns:a="http://schemas.openxmlformats.org/drawingml/2006/main" xmlns:r="http://schemas.openxmlformats.org/officeDocument/2006/relationships" xmlns:p="http://schemas.openxmlformats.org/presentationml/2006/main">
+  <p:cSld>
+    <p:spTree>
+      <p:nvGrpSpPr>
+        <p:cNvPr id="1" name=""/>
+        <p:cNvGrpSpPr/>
+        <p:nvPr/>
+      </p:nvGrpSpPr>
+      <p:grpSpPr>
+        <a:xfrm>
+          <a:off x="0" y="0"/>
+          <a:ext cx="0" cy="0"/>
+          <a:chOff x="0" y="0"/>
+          <a:chExt cx="0" cy="0"/>
+        </a:xfrm>
+      </p:grpSpPr>
+      <p:sp>
+        <p:nvSpPr>
+          <p:cNvPr id="2" name="Titel 1"/>
+          <p:cNvSpPr>
+            <a:spLocks noGrp="1"/>
+          </p:cNvSpPr>
+          <p:nvPr>
+            <p:ph type="title"/>
+          </p:nvPr>
+        </p:nvSpPr>
+        <p:spPr/>
+        <p:txBody>
+          <a:bodyPr/>
+          <a:lstStyle/>
+          <a:p>
+            <a:r>
+              <a:rPr lang="de-DE" dirty="0"/>
+              <a:t>Hands-On</a:t>
+            </a:r>
+          </a:p>
+        </p:txBody>
+      </p:sp>
+      <p:pic>
+        <p:nvPicPr>
+          <p:cNvPr id="7" name="Bildplatzhalter 6" descr="Ein Bild, das ClipArt enthält.&#10;&#10;Mit hoher Zuverlässigkeit generierte Beschreibung">
+            <a:extLst>
+              <a:ext uri="{FF2B5EF4-FFF2-40B4-BE49-F238E27FC236}">
+                <a16:creationId xmlns:a16="http://schemas.microsoft.com/office/drawing/2014/main" id="{139C5A7F-A204-41EC-9889-C7B002A21534}"/>
+              </a:ext>
+            </a:extLst>
+          </p:cNvPr>
+          <p:cNvPicPr>
+            <a:picLocks noGrp="1" noChangeAspect="1"/>
+          </p:cNvPicPr>
+          <p:nvPr>
+            <p:ph type="pic" sz="quarter" idx="12"/>
+          </p:nvPr>
+        </p:nvPicPr>
+        <p:blipFill>
+          <a:blip r:embed="rId2">
+            <a:extLst>
+              <a:ext uri="{28A0092B-C50C-407E-A947-70E740481C1C}">
+                <a14:useLocalDpi xmlns:a14="http://schemas.microsoft.com/office/drawing/2010/main" val="0"/>
+              </a:ext>
+            </a:extLst>
+          </a:blip>
+          <a:srcRect t="6324" b="6324"/>
+          <a:stretch>
+            <a:fillRect/>
+          </a:stretch>
+        </p:blipFill>
+        <p:spPr/>
+      </p:pic>
+      <p:sp>
+        <p:nvSpPr>
+          <p:cNvPr id="5" name="Textplatzhalter 4"/>
+          <p:cNvSpPr>
+            <a:spLocks noGrp="1"/>
+          </p:cNvSpPr>
+          <p:nvPr>
+            <p:ph type="body" sz="quarter" idx="15"/>
+          </p:nvPr>
+        </p:nvSpPr>
+        <p:spPr/>
+        <p:txBody>
+          <a:bodyPr/>
+          <a:lstStyle/>
+          <a:p>
+            <a:endParaRPr lang="de-DE" dirty="0"/>
+          </a:p>
+        </p:txBody>
+      </p:sp>
+      <p:sp>
+        <p:nvSpPr>
+          <p:cNvPr id="8" name="Textplatzhalter 7">
+            <a:extLst>
+              <a:ext uri="{FF2B5EF4-FFF2-40B4-BE49-F238E27FC236}">
+                <a16:creationId xmlns:a16="http://schemas.microsoft.com/office/drawing/2014/main" id="{0F35EED6-E9E8-4369-860F-9927E646E322}"/>
+              </a:ext>
+            </a:extLst>
+          </p:cNvPr>
+          <p:cNvSpPr>
+            <a:spLocks noGrp="1"/>
+          </p:cNvSpPr>
+          <p:nvPr>
+            <p:ph type="body" sz="quarter" idx="13"/>
+          </p:nvPr>
+        </p:nvSpPr>
+        <p:spPr/>
+        <p:txBody>
+          <a:bodyPr/>
+          <a:lstStyle/>
+          <a:p>
+            <a:endParaRPr lang="de-DE"/>
+          </a:p>
+        </p:txBody>
+      </p:sp>
+      <p:sp>
+        <p:nvSpPr>
+          <p:cNvPr id="9" name="Rechteck 8">
+            <a:extLst>
+              <a:ext uri="{FF2B5EF4-FFF2-40B4-BE49-F238E27FC236}">
+                <a16:creationId xmlns:a16="http://schemas.microsoft.com/office/drawing/2014/main" id="{506E1D6F-3BAC-4497-A889-7A198D2BCB78}"/>
+              </a:ext>
+            </a:extLst>
+          </p:cNvPr>
+          <p:cNvSpPr/>
+          <p:nvPr/>
+        </p:nvSpPr>
+        <p:spPr>
+          <a:xfrm>
+            <a:off x="0" y="0"/>
+            <a:ext cx="9144000" cy="6858000"/>
+          </a:xfrm>
+          <a:prstGeom prst="rect">
+            <a:avLst/>
+          </a:prstGeom>
+          <a:solidFill>
+            <a:schemeClr val="accent1"/>
+          </a:solidFill>
+          <a:ln w="28575">
+            <a:solidFill>
+              <a:srgbClr val="C00000"/>
+            </a:solidFill>
+          </a:ln>
+        </p:spPr>
+        <p:style>
+          <a:lnRef idx="2">
+            <a:schemeClr val="accent1">
+              <a:shade val="50000"/>
+            </a:schemeClr>
+          </a:lnRef>
+          <a:fillRef idx="1">
+            <a:schemeClr val="accent1"/>
+          </a:fillRef>
+          <a:effectRef idx="0">
+            <a:schemeClr val="accent1"/>
+          </a:effectRef>
+          <a:fontRef idx="minor">
+            <a:schemeClr val="lt1"/>
+          </a:fontRef>
+        </p:style>
+        <p:txBody>
+          <a:bodyPr rtlCol="0" anchor="ctr"/>
+          <a:lstStyle/>
+          <a:p>
+            <a:pPr algn="ctr"/>
+            <a:endParaRPr lang="de-DE"/>
+          </a:p>
+        </p:txBody>
+      </p:sp>
+      <p:sp>
+        <p:nvSpPr>
+          <p:cNvPr id="10" name="Textfeld 9">
+            <a:extLst>
+              <a:ext uri="{FF2B5EF4-FFF2-40B4-BE49-F238E27FC236}">
+                <a16:creationId xmlns:a16="http://schemas.microsoft.com/office/drawing/2014/main" id="{37C63480-5CCD-4863-AB1B-3B79B6B2D69A}"/>
+              </a:ext>
+            </a:extLst>
+          </p:cNvPr>
+          <p:cNvSpPr txBox="1"/>
+          <p:nvPr/>
+        </p:nvSpPr>
+        <p:spPr>
+          <a:xfrm>
+            <a:off x="1619672" y="2348880"/>
+            <a:ext cx="6192688" cy="1862048"/>
+          </a:xfrm>
+          <a:prstGeom prst="rect">
+            <a:avLst/>
+          </a:prstGeom>
+          <a:noFill/>
+        </p:spPr>
+        <p:txBody>
+          <a:bodyPr wrap="square" rtlCol="0">
+            <a:spAutoFit/>
+          </a:bodyPr>
+          <a:lstStyle/>
+          <a:p>
+            <a:pPr>
+              <a:buClr>
+                <a:srgbClr val="C00000"/>
+              </a:buClr>
+            </a:pPr>
+            <a:r>
+              <a:rPr lang="de-DE" sz="11500" dirty="0">
+                <a:solidFill>
+                  <a:schemeClr val="bg1"/>
+                </a:solidFill>
+              </a:rPr>
+              <a:t>Fragen?</a:t>
+            </a:r>
+          </a:p>
+        </p:txBody>
+      </p:sp>
+    </p:spTree>
+    <p:extLst>
+      <p:ext uri="{BB962C8B-B14F-4D97-AF65-F5344CB8AC3E}">
+        <p14:creationId xmlns:p14="http://schemas.microsoft.com/office/powerpoint/2010/main" val="3297582077"/>
+      </p:ext>
+    </p:extLst>
+  </p:cSld>
+  <p:clrMapOvr>
+    <a:masterClrMapping/>
+  </p:clrMapOvr>
+</p:sld>
+</file>
+
+<file path=ppt/slides/slide13.xml><?xml version="1.0" encoding="utf-8"?>
+<p:sld xmlns:a="http://schemas.openxmlformats.org/drawingml/2006/main" xmlns:r="http://schemas.openxmlformats.org/officeDocument/2006/relationships" xmlns:p="http://schemas.openxmlformats.org/presentationml/2006/main">
+  <p:cSld>
+    <p:spTree>
+      <p:nvGrpSpPr>
+        <p:cNvPr id="1" name=""/>
+        <p:cNvGrpSpPr/>
+        <p:nvPr/>
+      </p:nvGrpSpPr>
+      <p:grpSpPr>
+        <a:xfrm>
+          <a:off x="0" y="0"/>
+          <a:ext cx="0" cy="0"/>
+          <a:chOff x="0" y="0"/>
+          <a:chExt cx="0" cy="0"/>
+        </a:xfrm>
+      </p:grpSpPr>
+      <p:sp>
+        <p:nvSpPr>
+          <p:cNvPr id="2" name="Titel 1"/>
+          <p:cNvSpPr>
+            <a:spLocks noGrp="1"/>
+          </p:cNvSpPr>
+          <p:nvPr>
+            <p:ph type="title"/>
+          </p:nvPr>
+        </p:nvSpPr>
+        <p:spPr/>
+        <p:txBody>
+          <a:bodyPr/>
+          <a:lstStyle/>
+          <a:p>
+            <a:r>
+              <a:rPr lang="de-DE" dirty="0"/>
+              <a:t>Hands-On</a:t>
+            </a:r>
+          </a:p>
+        </p:txBody>
+      </p:sp>
+      <p:pic>
+        <p:nvPicPr>
+          <p:cNvPr id="7" name="Bildplatzhalter 6" descr="Ein Bild, das ClipArt enthält.&#10;&#10;Mit hoher Zuverlässigkeit generierte Beschreibung">
+            <a:extLst>
+              <a:ext uri="{FF2B5EF4-FFF2-40B4-BE49-F238E27FC236}">
+                <a16:creationId xmlns:a16="http://schemas.microsoft.com/office/drawing/2014/main" id="{139C5A7F-A204-41EC-9889-C7B002A21534}"/>
+              </a:ext>
+            </a:extLst>
+          </p:cNvPr>
+          <p:cNvPicPr>
+            <a:picLocks noGrp="1" noChangeAspect="1"/>
+          </p:cNvPicPr>
+          <p:nvPr>
+            <p:ph type="pic" sz="quarter" idx="12"/>
+          </p:nvPr>
+        </p:nvPicPr>
+        <p:blipFill>
+          <a:blip r:embed="rId2">
+            <a:extLst>
+              <a:ext uri="{28A0092B-C50C-407E-A947-70E740481C1C}">
+                <a14:useLocalDpi xmlns:a14="http://schemas.microsoft.com/office/drawing/2010/main" val="0"/>
+              </a:ext>
+            </a:extLst>
+          </a:blip>
+          <a:srcRect t="6324" b="6324"/>
+          <a:stretch>
+            <a:fillRect/>
+          </a:stretch>
+        </p:blipFill>
+        <p:spPr/>
+      </p:pic>
+      <p:sp>
+        <p:nvSpPr>
+          <p:cNvPr id="5" name="Textplatzhalter 4"/>
+          <p:cNvSpPr>
+            <a:spLocks noGrp="1"/>
+          </p:cNvSpPr>
+          <p:nvPr>
+            <p:ph type="body" sz="quarter" idx="15"/>
+          </p:nvPr>
+        </p:nvSpPr>
+        <p:spPr/>
+        <p:txBody>
+          <a:bodyPr/>
+          <a:lstStyle/>
+          <a:p>
+            <a:endParaRPr lang="de-DE" dirty="0"/>
+          </a:p>
+        </p:txBody>
+      </p:sp>
+      <p:sp>
+        <p:nvSpPr>
+          <p:cNvPr id="8" name="Textplatzhalter 7">
+            <a:extLst>
+              <a:ext uri="{FF2B5EF4-FFF2-40B4-BE49-F238E27FC236}">
+                <a16:creationId xmlns:a16="http://schemas.microsoft.com/office/drawing/2014/main" id="{0F35EED6-E9E8-4369-860F-9927E646E322}"/>
+              </a:ext>
+            </a:extLst>
+          </p:cNvPr>
+          <p:cNvSpPr>
+            <a:spLocks noGrp="1"/>
+          </p:cNvSpPr>
+          <p:nvPr>
+            <p:ph type="body" sz="quarter" idx="13"/>
+          </p:nvPr>
+        </p:nvSpPr>
+        <p:spPr/>
+        <p:txBody>
+          <a:bodyPr/>
+          <a:lstStyle/>
+          <a:p>
+            <a:endParaRPr lang="de-DE"/>
+          </a:p>
+        </p:txBody>
+      </p:sp>
+      <p:sp>
+        <p:nvSpPr>
+          <p:cNvPr id="9" name="Rechteck 8">
+            <a:extLst>
+              <a:ext uri="{FF2B5EF4-FFF2-40B4-BE49-F238E27FC236}">
+                <a16:creationId xmlns:a16="http://schemas.microsoft.com/office/drawing/2014/main" id="{506E1D6F-3BAC-4497-A889-7A198D2BCB78}"/>
+              </a:ext>
+            </a:extLst>
+          </p:cNvPr>
+          <p:cNvSpPr/>
+          <p:nvPr/>
+        </p:nvSpPr>
+        <p:spPr>
+          <a:xfrm>
+            <a:off x="0" y="0"/>
+            <a:ext cx="9144000" cy="6858000"/>
+          </a:xfrm>
+          <a:prstGeom prst="rect">
+            <a:avLst/>
+          </a:prstGeom>
+          <a:solidFill>
+            <a:schemeClr val="accent1"/>
+          </a:solidFill>
+          <a:ln w="28575">
+            <a:solidFill>
+              <a:srgbClr val="C00000"/>
+            </a:solidFill>
+          </a:ln>
+        </p:spPr>
+        <p:style>
+          <a:lnRef idx="2">
+            <a:schemeClr val="accent1">
+              <a:shade val="50000"/>
+            </a:schemeClr>
+          </a:lnRef>
+          <a:fillRef idx="1">
+            <a:schemeClr val="accent1"/>
+          </a:fillRef>
+          <a:effectRef idx="0">
+            <a:schemeClr val="accent1"/>
+          </a:effectRef>
+          <a:fontRef idx="minor">
+            <a:schemeClr val="lt1"/>
+          </a:fontRef>
+        </p:style>
+        <p:txBody>
+          <a:bodyPr rtlCol="0" anchor="ctr"/>
+          <a:lstStyle/>
+          <a:p>
+            <a:pPr algn="ctr"/>
+            <a:endParaRPr lang="de-DE"/>
+          </a:p>
+        </p:txBody>
+      </p:sp>
+      <p:sp>
+        <p:nvSpPr>
+          <p:cNvPr id="10" name="Textfeld 9">
+            <a:extLst>
+              <a:ext uri="{FF2B5EF4-FFF2-40B4-BE49-F238E27FC236}">
+                <a16:creationId xmlns:a16="http://schemas.microsoft.com/office/drawing/2014/main" id="{37C63480-5CCD-4863-AB1B-3B79B6B2D69A}"/>
+              </a:ext>
+            </a:extLst>
+          </p:cNvPr>
+          <p:cNvSpPr txBox="1"/>
+          <p:nvPr/>
+        </p:nvSpPr>
+        <p:spPr>
+          <a:xfrm>
+            <a:off x="1619672" y="2348880"/>
+            <a:ext cx="6192688" cy="1569660"/>
+          </a:xfrm>
+          <a:prstGeom prst="rect">
+            <a:avLst/>
+          </a:prstGeom>
+          <a:noFill/>
+        </p:spPr>
+        <p:txBody>
+          <a:bodyPr wrap="square" rtlCol="0">
+            <a:spAutoFit/>
+          </a:bodyPr>
+          <a:lstStyle/>
+          <a:p>
+            <a:pPr>
+              <a:buClr>
+                <a:srgbClr val="C00000"/>
+              </a:buClr>
+            </a:pPr>
+            <a:r>
+              <a:rPr lang="de-DE" sz="9600" dirty="0">
+                <a:solidFill>
+                  <a:schemeClr val="bg1"/>
+                </a:solidFill>
+              </a:rPr>
+              <a:t>Feedback</a:t>
+            </a:r>
+          </a:p>
+        </p:txBody>
+      </p:sp>
+    </p:spTree>
+    <p:extLst>
+      <p:ext uri="{BB962C8B-B14F-4D97-AF65-F5344CB8AC3E}">
+        <p14:creationId xmlns:p14="http://schemas.microsoft.com/office/powerpoint/2010/main" val="2979316939"/>
+      </p:ext>
+    </p:extLst>
+  </p:cSld>
+  <p:clrMapOvr>
+    <a:masterClrMapping/>
+  </p:clrMapOvr>
+</p:sld>
+</file>
+
 <file path=ppt/slides/slide2.xml><?xml version="1.0" encoding="utf-8"?>
 <p:sld xmlns:a="http://schemas.openxmlformats.org/drawingml/2006/main" xmlns:r="http://schemas.openxmlformats.org/officeDocument/2006/relationships" xmlns:p="http://schemas.openxmlformats.org/presentationml/2006/main">
   <p:cSld>
@@ -12205,14 +13063,22 @@
             <p:ph type="body" sz="quarter" idx="13"/>
           </p:nvPr>
         </p:nvSpPr>
-        <p:spPr/>
+        <p:spPr>
+          <a:xfrm>
+            <a:off x="791419" y="5136328"/>
+            <a:ext cx="7560518" cy="504104"/>
+          </a:xfrm>
+        </p:spPr>
         <p:txBody>
           <a:bodyPr/>
           <a:lstStyle/>
           <a:p>
+            <a:pPr marL="0" indent="0">
+              <a:buNone/>
+            </a:pPr>
             <a:r>
               <a:rPr lang="de-DE" dirty="0"/>
-              <a:t>Hat jeder </a:t>
+              <a:t>Test: </a:t>
             </a:r>
             <a:r>
               <a:rPr lang="de-DE" dirty="0" err="1"/>
@@ -12220,29 +13086,26 @@
             </a:r>
             <a:r>
               <a:rPr lang="de-DE" dirty="0"/>
-              <a:t> installiert? </a:t>
-            </a:r>
-          </a:p>
-          <a:p>
+              <a:t> </a:t>
+            </a:r>
+            <a:r>
+              <a:rPr lang="de-DE" dirty="0" err="1"/>
+              <a:t>bash</a:t>
+            </a:r>
             <a:r>
               <a:rPr lang="de-DE" dirty="0"/>
-              <a:t>Einmal </a:t>
-            </a:r>
-            <a:r>
-              <a:rPr lang="de-DE" dirty="0" err="1"/>
-              <a:t>cmd</a:t>
+              <a:t> oder die Kommandozeile öffnen und </a:t>
+            </a:r>
+            <a:r>
+              <a:rPr lang="de-DE" dirty="0" err="1">
+                <a:latin typeface="Courier New" panose="02070309020205020404" pitchFamily="49" charset="0"/>
+                <a:cs typeface="Courier New" panose="02070309020205020404" pitchFamily="49" charset="0"/>
+              </a:rPr>
+              <a:t>git</a:t>
             </a:r>
             <a:r>
               <a:rPr lang="de-DE" dirty="0"/>
-              <a:t>/</a:t>
-            </a:r>
-            <a:r>
-              <a:rPr lang="de-DE" dirty="0" err="1"/>
-              <a:t>shell</a:t>
-            </a:r>
-            <a:r>
-              <a:rPr lang="de-DE" dirty="0"/>
-              <a:t> öffnen und GIT eingeben</a:t>
+              <a:t> eingeben</a:t>
             </a:r>
           </a:p>
         </p:txBody>
@@ -12272,6 +13135,118 @@
           </a:p>
         </p:txBody>
       </p:sp>
+      <p:sp>
+        <p:nvSpPr>
+          <p:cNvPr id="2" name="Rechteck: abgerundete Ecken 1">
+            <a:extLst>
+              <a:ext uri="{FF2B5EF4-FFF2-40B4-BE49-F238E27FC236}">
+                <a16:creationId xmlns:a16="http://schemas.microsoft.com/office/drawing/2014/main" id="{85A18FB1-7E99-41CE-A622-3BA1A6193F3D}"/>
+              </a:ext>
+            </a:extLst>
+          </p:cNvPr>
+          <p:cNvSpPr/>
+          <p:nvPr/>
+        </p:nvSpPr>
+        <p:spPr>
+          <a:xfrm>
+            <a:off x="2447764" y="1845247"/>
+            <a:ext cx="4248472" cy="1564200"/>
+          </a:xfrm>
+          <a:prstGeom prst="roundRect">
+            <a:avLst/>
+          </a:prstGeom>
+          <a:noFill/>
+          <a:ln w="28575">
+            <a:solidFill>
+              <a:srgbClr val="C00000"/>
+            </a:solidFill>
+            <a:prstDash val="dash"/>
+          </a:ln>
+        </p:spPr>
+        <p:style>
+          <a:lnRef idx="2">
+            <a:schemeClr val="accent1">
+              <a:shade val="50000"/>
+            </a:schemeClr>
+          </a:lnRef>
+          <a:fillRef idx="1">
+            <a:schemeClr val="accent1"/>
+          </a:fillRef>
+          <a:effectRef idx="0">
+            <a:schemeClr val="accent1"/>
+          </a:effectRef>
+          <a:fontRef idx="minor">
+            <a:schemeClr val="lt1"/>
+          </a:fontRef>
+        </p:style>
+        <p:txBody>
+          <a:bodyPr rtlCol="0" anchor="ctr"/>
+          <a:lstStyle/>
+          <a:p>
+            <a:pPr algn="ctr"/>
+            <a:r>
+              <a:rPr lang="de-DE" sz="3200" dirty="0">
+                <a:solidFill>
+                  <a:schemeClr val="tx1"/>
+                </a:solidFill>
+              </a:rPr>
+              <a:t>Hat jeder </a:t>
+            </a:r>
+            <a:r>
+              <a:rPr lang="de-DE" sz="3200" dirty="0" err="1">
+                <a:solidFill>
+                  <a:schemeClr val="tx1"/>
+                </a:solidFill>
+              </a:rPr>
+              <a:t>git</a:t>
+            </a:r>
+            <a:r>
+              <a:rPr lang="de-DE" sz="3200" dirty="0">
+                <a:solidFill>
+                  <a:schemeClr val="tx1"/>
+                </a:solidFill>
+              </a:rPr>
+              <a:t> installiert?</a:t>
+            </a:r>
+          </a:p>
+        </p:txBody>
+      </p:sp>
+      <p:pic>
+        <p:nvPicPr>
+          <p:cNvPr id="4" name="Grafik 3">
+            <a:extLst>
+              <a:ext uri="{FF2B5EF4-FFF2-40B4-BE49-F238E27FC236}">
+                <a16:creationId xmlns:a16="http://schemas.microsoft.com/office/drawing/2014/main" id="{4FF2CF30-BBB1-40FC-BF49-E283B580431D}"/>
+              </a:ext>
+            </a:extLst>
+          </p:cNvPr>
+          <p:cNvPicPr>
+            <a:picLocks noChangeAspect="1"/>
+          </p:cNvPicPr>
+          <p:nvPr/>
+        </p:nvPicPr>
+        <p:blipFill>
+          <a:blip r:embed="rId3">
+            <a:extLst>
+              <a:ext uri="{28A0092B-C50C-407E-A947-70E740481C1C}">
+                <a14:useLocalDpi xmlns:a14="http://schemas.microsoft.com/office/drawing/2010/main" val="0"/>
+              </a:ext>
+            </a:extLst>
+          </a:blip>
+          <a:stretch>
+            <a:fillRect/>
+          </a:stretch>
+        </p:blipFill>
+        <p:spPr>
+          <a:xfrm>
+            <a:off x="2034925" y="1469620"/>
+            <a:ext cx="825677" cy="825677"/>
+          </a:xfrm>
+          <a:prstGeom prst="rect">
+            <a:avLst/>
+          </a:prstGeom>
+        </p:spPr>
+      </p:pic>
     </p:spTree>
     <p:extLst>
       <p:ext uri="{BB962C8B-B14F-4D97-AF65-F5344CB8AC3E}">
@@ -12401,6 +13376,60 @@
               <a:rPr lang="de-DE" dirty="0"/>
               <a:t>Analogie</a:t>
             </a:r>
+          </a:p>
+        </p:txBody>
+      </p:sp>
+      <p:sp>
+        <p:nvSpPr>
+          <p:cNvPr id="3" name="Rechteck 2">
+            <a:extLst>
+              <a:ext uri="{FF2B5EF4-FFF2-40B4-BE49-F238E27FC236}">
+                <a16:creationId xmlns:a16="http://schemas.microsoft.com/office/drawing/2014/main" id="{7976462E-8EB9-46BE-9B9D-BC8AA42CBA20}"/>
+              </a:ext>
+            </a:extLst>
+          </p:cNvPr>
+          <p:cNvSpPr/>
+          <p:nvPr/>
+        </p:nvSpPr>
+        <p:spPr>
+          <a:xfrm>
+            <a:off x="0" y="0"/>
+            <a:ext cx="9144000" cy="6858000"/>
+          </a:xfrm>
+          <a:prstGeom prst="rect">
+            <a:avLst/>
+          </a:prstGeom>
+          <a:solidFill>
+            <a:schemeClr val="tx1"/>
+          </a:solidFill>
+          <a:ln w="28575">
+            <a:solidFill>
+              <a:schemeClr val="tx1"/>
+            </a:solidFill>
+          </a:ln>
+        </p:spPr>
+        <p:style>
+          <a:lnRef idx="2">
+            <a:schemeClr val="accent1">
+              <a:shade val="50000"/>
+            </a:schemeClr>
+          </a:lnRef>
+          <a:fillRef idx="1">
+            <a:schemeClr val="accent1"/>
+          </a:fillRef>
+          <a:effectRef idx="0">
+            <a:schemeClr val="accent1"/>
+          </a:effectRef>
+          <a:fontRef idx="minor">
+            <a:schemeClr val="lt1"/>
+          </a:fontRef>
+        </p:style>
+        <p:txBody>
+          <a:bodyPr rtlCol="0" anchor="ctr"/>
+          <a:lstStyle/>
+          <a:p>
+            <a:pPr algn="ctr"/>
+            <a:endParaRPr lang="de-DE"/>
           </a:p>
         </p:txBody>
       </p:sp>
@@ -12975,19 +14004,17 @@
             <p:ph type="body" sz="quarter" idx="13"/>
           </p:nvPr>
         </p:nvSpPr>
-        <p:spPr/>
-        <p:txBody>
-          <a:bodyPr/>
+        <p:spPr>
+          <a:xfrm>
+            <a:off x="1187624" y="2996952"/>
+            <a:ext cx="6769074" cy="1439689"/>
+          </a:xfrm>
+        </p:spPr>
+        <p:txBody>
+          <a:bodyPr>
+            <a:normAutofit lnSpcReduction="10000"/>
+          </a:bodyPr>
           <a:lstStyle/>
-          <a:p>
-            <a:pPr marL="0" indent="0">
-              <a:buNone/>
-            </a:pPr>
-            <a:r>
-              <a:rPr lang="de-DE" dirty="0"/>
-              <a:t>Aufgabe 1:</a:t>
-            </a:r>
-          </a:p>
           <a:p>
             <a:pPr marL="0" indent="0">
               <a:buNone/>
@@ -13021,122 +14048,8 @@
             </a:pPr>
             <a:r>
               <a:rPr lang="de-DE" dirty="0"/>
-              <a:t>Lade danach deine Änderungen wieder hoch. </a:t>
-            </a:r>
-          </a:p>
-          <a:p>
-            <a:pPr marL="0" indent="0">
-              <a:buNone/>
-            </a:pPr>
-            <a:endParaRPr lang="de-DE" dirty="0"/>
-          </a:p>
-          <a:p>
-            <a:pPr marL="0" indent="0">
-              <a:buNone/>
-            </a:pPr>
-            <a:r>
-              <a:rPr lang="de-DE" dirty="0"/>
-              <a:t>Hinweise:</a:t>
-            </a:r>
-          </a:p>
-          <a:p>
-            <a:r>
-              <a:rPr lang="de-DE" dirty="0"/>
-              <a:t>Nutze </a:t>
-            </a:r>
-            <a:r>
-              <a:rPr lang="de-DE" dirty="0" err="1"/>
-              <a:t>git</a:t>
-            </a:r>
-            <a:r>
-              <a:rPr lang="de-DE" dirty="0"/>
-              <a:t> </a:t>
-            </a:r>
-            <a:r>
-              <a:rPr lang="de-DE" dirty="0" err="1"/>
-              <a:t>clone</a:t>
-            </a:r>
-            <a:r>
-              <a:rPr lang="de-DE" dirty="0"/>
-              <a:t> um dir das Repository herunterzuladen</a:t>
-            </a:r>
-          </a:p>
-          <a:p>
-            <a:r>
-              <a:rPr lang="de-DE" dirty="0"/>
-              <a:t>Die Datei kannst du ganz normal im Explorer erstellen</a:t>
-            </a:r>
-          </a:p>
-          <a:p>
-            <a:r>
-              <a:rPr lang="de-DE" dirty="0"/>
-              <a:t>Mit </a:t>
-            </a:r>
-            <a:r>
-              <a:rPr lang="de-DE" dirty="0" err="1"/>
-              <a:t>git</a:t>
-            </a:r>
-            <a:r>
-              <a:rPr lang="de-DE" dirty="0"/>
-              <a:t> </a:t>
-            </a:r>
-            <a:r>
-              <a:rPr lang="de-DE" dirty="0" err="1"/>
-              <a:t>status</a:t>
-            </a:r>
-            <a:r>
-              <a:rPr lang="de-DE" dirty="0"/>
-              <a:t> kannst du dir deine Änderungen anschauen</a:t>
-            </a:r>
-          </a:p>
-          <a:p>
-            <a:r>
-              <a:rPr lang="de-DE" dirty="0"/>
-              <a:t>Verwende </a:t>
-            </a:r>
-            <a:r>
-              <a:rPr lang="de-DE" dirty="0" err="1"/>
-              <a:t>git</a:t>
-            </a:r>
-            <a:r>
-              <a:rPr lang="de-DE" dirty="0"/>
-              <a:t> </a:t>
-            </a:r>
-            <a:r>
-              <a:rPr lang="de-DE" dirty="0" err="1"/>
-              <a:t>add</a:t>
-            </a:r>
-            <a:r>
-              <a:rPr lang="de-DE" dirty="0"/>
-              <a:t>, </a:t>
-            </a:r>
-            <a:r>
-              <a:rPr lang="de-DE" dirty="0" err="1"/>
-              <a:t>git</a:t>
-            </a:r>
-            <a:r>
-              <a:rPr lang="de-DE" dirty="0"/>
-              <a:t> </a:t>
-            </a:r>
-            <a:r>
-              <a:rPr lang="de-DE" dirty="0" err="1"/>
-              <a:t>commit</a:t>
-            </a:r>
-            <a:r>
-              <a:rPr lang="de-DE" dirty="0"/>
-              <a:t> und </a:t>
-            </a:r>
-            <a:r>
-              <a:rPr lang="de-DE" dirty="0" err="1"/>
-              <a:t>git</a:t>
-            </a:r>
-            <a:r>
-              <a:rPr lang="de-DE" dirty="0"/>
-              <a:t> push um deine Änderungen hochzuladen</a:t>
-            </a:r>
-          </a:p>
-          <a:p>
-            <a:endParaRPr lang="de-DE" dirty="0"/>
+              <a:t>Lade danach deine Änderungen wieder hoch.</a:t>
+            </a:r>
           </a:p>
           <a:p>
             <a:endParaRPr lang="de-DE" dirty="0"/>
@@ -13158,9 +14071,70 @@
           <a:bodyPr/>
           <a:lstStyle/>
           <a:p>
-            <a:r>
-              <a:rPr lang="de-DE" dirty="0"/>
-              <a:t>Grundlagen</a:t>
+            <a:endParaRPr lang="de-DE" dirty="0"/>
+          </a:p>
+        </p:txBody>
+      </p:sp>
+      <p:sp>
+        <p:nvSpPr>
+          <p:cNvPr id="3" name="Rechteck: abgerundete Ecken 2">
+            <a:extLst>
+              <a:ext uri="{FF2B5EF4-FFF2-40B4-BE49-F238E27FC236}">
+                <a16:creationId xmlns:a16="http://schemas.microsoft.com/office/drawing/2014/main" id="{3CE9FA32-6D59-4CA8-9F8C-C7123564038F}"/>
+              </a:ext>
+            </a:extLst>
+          </p:cNvPr>
+          <p:cNvSpPr/>
+          <p:nvPr/>
+        </p:nvSpPr>
+        <p:spPr>
+          <a:xfrm>
+            <a:off x="1115294" y="1508400"/>
+            <a:ext cx="6912768" cy="1301304"/>
+          </a:xfrm>
+          <a:prstGeom prst="roundRect">
+            <a:avLst/>
+          </a:prstGeom>
+          <a:solidFill>
+            <a:schemeClr val="tx2">
+              <a:lumMod val="20000"/>
+              <a:lumOff val="80000"/>
+            </a:schemeClr>
+          </a:solidFill>
+          <a:ln w="28575">
+            <a:solidFill>
+              <a:srgbClr val="C00000"/>
+            </a:solidFill>
+          </a:ln>
+        </p:spPr>
+        <p:style>
+          <a:lnRef idx="2">
+            <a:schemeClr val="accent1">
+              <a:shade val="50000"/>
+            </a:schemeClr>
+          </a:lnRef>
+          <a:fillRef idx="1">
+            <a:schemeClr val="accent1"/>
+          </a:fillRef>
+          <a:effectRef idx="0">
+            <a:schemeClr val="accent1"/>
+          </a:effectRef>
+          <a:fontRef idx="minor">
+            <a:schemeClr val="lt1"/>
+          </a:fontRef>
+        </p:style>
+        <p:txBody>
+          <a:bodyPr rtlCol="0" anchor="ctr"/>
+          <a:lstStyle/>
+          <a:p>
+            <a:pPr algn="ctr"/>
+            <a:r>
+              <a:rPr lang="de-DE" sz="4800" dirty="0">
+                <a:solidFill>
+                  <a:schemeClr val="tx1"/>
+                </a:solidFill>
+              </a:rPr>
+              <a:t>Aufgabe 1</a:t>
             </a:r>
           </a:p>
         </p:txBody>
@@ -13258,167 +14232,24 @@
             <p:ph type="body" sz="quarter" idx="13"/>
           </p:nvPr>
         </p:nvSpPr>
-        <p:spPr/>
-        <p:txBody>
-          <a:bodyPr/>
+        <p:spPr>
+          <a:xfrm>
+            <a:off x="1187624" y="2996952"/>
+            <a:ext cx="6769074" cy="1439689"/>
+          </a:xfrm>
+        </p:spPr>
+        <p:txBody>
+          <a:bodyPr>
+            <a:normAutofit/>
+          </a:bodyPr>
           <a:lstStyle/>
           <a:p>
-            <a:r>
-              <a:rPr lang="de-DE" dirty="0">
-                <a:latin typeface="Courier New" panose="02070309020205020404" pitchFamily="49" charset="0"/>
-                <a:cs typeface="Courier New" panose="02070309020205020404" pitchFamily="49" charset="0"/>
-              </a:rPr>
-              <a:t>cd C:/Pfad/zu/deinem/Ordner</a:t>
-            </a:r>
-          </a:p>
-          <a:p>
-            <a:r>
-              <a:rPr lang="de-DE" dirty="0" err="1">
-                <a:latin typeface="Courier New" panose="02070309020205020404" pitchFamily="49" charset="0"/>
-                <a:cs typeface="Courier New" panose="02070309020205020404" pitchFamily="49" charset="0"/>
-              </a:rPr>
-              <a:t>git</a:t>
-            </a:r>
-            <a:r>
-              <a:rPr lang="de-DE" dirty="0">
-                <a:latin typeface="Courier New" panose="02070309020205020404" pitchFamily="49" charset="0"/>
-                <a:cs typeface="Courier New" panose="02070309020205020404" pitchFamily="49" charset="0"/>
-              </a:rPr>
-              <a:t> </a:t>
-            </a:r>
-            <a:r>
-              <a:rPr lang="de-DE" dirty="0" err="1">
-                <a:latin typeface="Courier New" panose="02070309020205020404" pitchFamily="49" charset="0"/>
-                <a:cs typeface="Courier New" panose="02070309020205020404" pitchFamily="49" charset="0"/>
-              </a:rPr>
-              <a:t>clone</a:t>
-            </a:r>
-            <a:r>
-              <a:rPr lang="de-DE" dirty="0">
-                <a:latin typeface="Courier New" panose="02070309020205020404" pitchFamily="49" charset="0"/>
-                <a:cs typeface="Courier New" panose="02070309020205020404" pitchFamily="49" charset="0"/>
-              </a:rPr>
-              <a:t> https://github.com/PhillyVsWilly/Freibier.git </a:t>
-            </a:r>
-          </a:p>
-          <a:p>
-            <a:r>
-              <a:rPr lang="de-DE" dirty="0" err="1">
-                <a:latin typeface="Courier New" panose="02070309020205020404" pitchFamily="49" charset="0"/>
-                <a:cs typeface="Courier New" panose="02070309020205020404" pitchFamily="49" charset="0"/>
-              </a:rPr>
-              <a:t>git</a:t>
-            </a:r>
-            <a:r>
-              <a:rPr lang="de-DE" dirty="0">
-                <a:latin typeface="Courier New" panose="02070309020205020404" pitchFamily="49" charset="0"/>
-                <a:cs typeface="Courier New" panose="02070309020205020404" pitchFamily="49" charset="0"/>
-              </a:rPr>
-              <a:t> </a:t>
-            </a:r>
-            <a:r>
-              <a:rPr lang="de-DE" dirty="0" err="1">
-                <a:latin typeface="Courier New" panose="02070309020205020404" pitchFamily="49" charset="0"/>
-                <a:cs typeface="Courier New" panose="02070309020205020404" pitchFamily="49" charset="0"/>
-              </a:rPr>
-              <a:t>status</a:t>
-            </a:r>
-            <a:r>
-              <a:rPr lang="de-DE" dirty="0">
-                <a:latin typeface="Courier New" panose="02070309020205020404" pitchFamily="49" charset="0"/>
-                <a:cs typeface="Courier New" panose="02070309020205020404" pitchFamily="49" charset="0"/>
-              </a:rPr>
-              <a:t> </a:t>
-            </a:r>
-          </a:p>
-          <a:p>
-            <a:r>
-              <a:rPr lang="de-DE" dirty="0" err="1">
-                <a:latin typeface="Courier New" panose="02070309020205020404" pitchFamily="49" charset="0"/>
-                <a:cs typeface="Courier New" panose="02070309020205020404" pitchFamily="49" charset="0"/>
-              </a:rPr>
-              <a:t>git</a:t>
-            </a:r>
-            <a:r>
-              <a:rPr lang="de-DE" dirty="0">
-                <a:latin typeface="Courier New" panose="02070309020205020404" pitchFamily="49" charset="0"/>
-                <a:cs typeface="Courier New" panose="02070309020205020404" pitchFamily="49" charset="0"/>
-              </a:rPr>
-              <a:t> </a:t>
-            </a:r>
-            <a:r>
-              <a:rPr lang="de-DE" dirty="0" err="1">
-                <a:latin typeface="Courier New" panose="02070309020205020404" pitchFamily="49" charset="0"/>
-                <a:cs typeface="Courier New" panose="02070309020205020404" pitchFamily="49" charset="0"/>
-              </a:rPr>
-              <a:t>add</a:t>
-            </a:r>
-            <a:r>
-              <a:rPr lang="de-DE" dirty="0">
-                <a:latin typeface="Courier New" panose="02070309020205020404" pitchFamily="49" charset="0"/>
-                <a:cs typeface="Courier New" panose="02070309020205020404" pitchFamily="49" charset="0"/>
-              </a:rPr>
-              <a:t> FB_DeinName.txt</a:t>
-            </a:r>
-          </a:p>
-          <a:p>
-            <a:r>
-              <a:rPr lang="de-DE" dirty="0" err="1">
-                <a:latin typeface="Courier New" panose="02070309020205020404" pitchFamily="49" charset="0"/>
-                <a:cs typeface="Courier New" panose="02070309020205020404" pitchFamily="49" charset="0"/>
-              </a:rPr>
-              <a:t>git</a:t>
-            </a:r>
-            <a:r>
-              <a:rPr lang="de-DE" dirty="0">
-                <a:latin typeface="Courier New" panose="02070309020205020404" pitchFamily="49" charset="0"/>
-                <a:cs typeface="Courier New" panose="02070309020205020404" pitchFamily="49" charset="0"/>
-              </a:rPr>
-              <a:t> </a:t>
-            </a:r>
-            <a:r>
-              <a:rPr lang="de-DE" dirty="0" err="1">
-                <a:latin typeface="Courier New" panose="02070309020205020404" pitchFamily="49" charset="0"/>
-                <a:cs typeface="Courier New" panose="02070309020205020404" pitchFamily="49" charset="0"/>
-              </a:rPr>
-              <a:t>commit</a:t>
-            </a:r>
-            <a:r>
-              <a:rPr lang="de-DE" dirty="0">
-                <a:latin typeface="Courier New" panose="02070309020205020404" pitchFamily="49" charset="0"/>
-                <a:cs typeface="Courier New" panose="02070309020205020404" pitchFamily="49" charset="0"/>
-              </a:rPr>
-              <a:t> –m „Freibier </a:t>
-            </a:r>
-            <a:r>
-              <a:rPr lang="de-DE" dirty="0" err="1">
-                <a:latin typeface="Courier New" panose="02070309020205020404" pitchFamily="49" charset="0"/>
-                <a:cs typeface="Courier New" panose="02070309020205020404" pitchFamily="49" charset="0"/>
-              </a:rPr>
-              <a:t>fuer</a:t>
-            </a:r>
-            <a:r>
-              <a:rPr lang="de-DE" dirty="0">
-                <a:latin typeface="Courier New" panose="02070309020205020404" pitchFamily="49" charset="0"/>
-                <a:cs typeface="Courier New" panose="02070309020205020404" pitchFamily="49" charset="0"/>
-              </a:rPr>
-              <a:t> mich“</a:t>
-            </a:r>
-          </a:p>
-          <a:p>
-            <a:r>
-              <a:rPr lang="de-DE" dirty="0" err="1">
-                <a:latin typeface="Courier New" panose="02070309020205020404" pitchFamily="49" charset="0"/>
-                <a:cs typeface="Courier New" panose="02070309020205020404" pitchFamily="49" charset="0"/>
-              </a:rPr>
-              <a:t>git</a:t>
-            </a:r>
-            <a:r>
-              <a:rPr lang="de-DE" dirty="0">
-                <a:latin typeface="Courier New" panose="02070309020205020404" pitchFamily="49" charset="0"/>
-                <a:cs typeface="Courier New" panose="02070309020205020404" pitchFamily="49" charset="0"/>
-              </a:rPr>
-              <a:t> push</a:t>
+            <a:pPr marL="0" indent="0">
+              <a:buNone/>
+            </a:pPr>
+            <a:r>
+              <a:rPr lang="de-DE" dirty="0"/>
+              <a:t>Wenn alle Teilnehmer ihre Änderungen hochgeladen haben, lade dir diese Änderungen herunter, damit du sie auch auf deinem Rechner hast.</a:t>
             </a:r>
           </a:p>
         </p:txBody>
@@ -13438,9 +14269,70 @@
           <a:bodyPr/>
           <a:lstStyle/>
           <a:p>
-            <a:r>
-              <a:rPr lang="de-DE" dirty="0"/>
-              <a:t>Grundlagen</a:t>
+            <a:endParaRPr lang="de-DE" dirty="0"/>
+          </a:p>
+        </p:txBody>
+      </p:sp>
+      <p:sp>
+        <p:nvSpPr>
+          <p:cNvPr id="3" name="Rechteck: abgerundete Ecken 2">
+            <a:extLst>
+              <a:ext uri="{FF2B5EF4-FFF2-40B4-BE49-F238E27FC236}">
+                <a16:creationId xmlns:a16="http://schemas.microsoft.com/office/drawing/2014/main" id="{3CE9FA32-6D59-4CA8-9F8C-C7123564038F}"/>
+              </a:ext>
+            </a:extLst>
+          </p:cNvPr>
+          <p:cNvSpPr/>
+          <p:nvPr/>
+        </p:nvSpPr>
+        <p:spPr>
+          <a:xfrm>
+            <a:off x="1115294" y="1508400"/>
+            <a:ext cx="6912768" cy="1301304"/>
+          </a:xfrm>
+          <a:prstGeom prst="roundRect">
+            <a:avLst/>
+          </a:prstGeom>
+          <a:solidFill>
+            <a:schemeClr val="tx2">
+              <a:lumMod val="20000"/>
+              <a:lumOff val="80000"/>
+            </a:schemeClr>
+          </a:solidFill>
+          <a:ln w="28575">
+            <a:solidFill>
+              <a:srgbClr val="C00000"/>
+            </a:solidFill>
+          </a:ln>
+        </p:spPr>
+        <p:style>
+          <a:lnRef idx="2">
+            <a:schemeClr val="accent1">
+              <a:shade val="50000"/>
+            </a:schemeClr>
+          </a:lnRef>
+          <a:fillRef idx="1">
+            <a:schemeClr val="accent1"/>
+          </a:fillRef>
+          <a:effectRef idx="0">
+            <a:schemeClr val="accent1"/>
+          </a:effectRef>
+          <a:fontRef idx="minor">
+            <a:schemeClr val="lt1"/>
+          </a:fontRef>
+        </p:style>
+        <p:txBody>
+          <a:bodyPr rtlCol="0" anchor="ctr"/>
+          <a:lstStyle/>
+          <a:p>
+            <a:pPr algn="ctr"/>
+            <a:r>
+              <a:rPr lang="de-DE" sz="4800" dirty="0">
+                <a:solidFill>
+                  <a:schemeClr val="tx1"/>
+                </a:solidFill>
+              </a:rPr>
+              <a:t>Aufgabe 2</a:t>
             </a:r>
           </a:p>
         </p:txBody>
@@ -13448,7 +14340,628 @@
     </p:spTree>
     <p:extLst>
       <p:ext uri="{BB962C8B-B14F-4D97-AF65-F5344CB8AC3E}">
-        <p14:creationId xmlns:p14="http://schemas.microsoft.com/office/powerpoint/2010/main" val="456091616"/>
+        <p14:creationId xmlns:p14="http://schemas.microsoft.com/office/powerpoint/2010/main" val="520685451"/>
+      </p:ext>
+    </p:extLst>
+  </p:cSld>
+  <p:clrMapOvr>
+    <a:masterClrMapping/>
+  </p:clrMapOvr>
+</p:sld>
+</file>
+
+<file path=ppt/slides/slide7.xml><?xml version="1.0" encoding="utf-8"?>
+<p:sld xmlns:a="http://schemas.openxmlformats.org/drawingml/2006/main" xmlns:r="http://schemas.openxmlformats.org/officeDocument/2006/relationships" xmlns:p="http://schemas.openxmlformats.org/presentationml/2006/main">
+  <p:cSld>
+    <p:spTree>
+      <p:nvGrpSpPr>
+        <p:cNvPr id="1" name=""/>
+        <p:cNvGrpSpPr/>
+        <p:nvPr/>
+      </p:nvGrpSpPr>
+      <p:grpSpPr>
+        <a:xfrm>
+          <a:off x="0" y="0"/>
+          <a:ext cx="0" cy="0"/>
+          <a:chOff x="0" y="0"/>
+          <a:chExt cx="0" cy="0"/>
+        </a:xfrm>
+      </p:grpSpPr>
+      <p:sp>
+        <p:nvSpPr>
+          <p:cNvPr id="2" name="Titel 1"/>
+          <p:cNvSpPr>
+            <a:spLocks noGrp="1"/>
+          </p:cNvSpPr>
+          <p:nvPr>
+            <p:ph type="title"/>
+          </p:nvPr>
+        </p:nvSpPr>
+        <p:spPr/>
+        <p:txBody>
+          <a:bodyPr/>
+          <a:lstStyle/>
+          <a:p>
+            <a:r>
+              <a:rPr lang="de-DE" dirty="0"/>
+              <a:t>Hands-On</a:t>
+            </a:r>
+          </a:p>
+        </p:txBody>
+      </p:sp>
+      <p:pic>
+        <p:nvPicPr>
+          <p:cNvPr id="7" name="Bildplatzhalter 6" descr="Ein Bild, das ClipArt enthält.&#10;&#10;Mit hoher Zuverlässigkeit generierte Beschreibung">
+            <a:extLst>
+              <a:ext uri="{FF2B5EF4-FFF2-40B4-BE49-F238E27FC236}">
+                <a16:creationId xmlns:a16="http://schemas.microsoft.com/office/drawing/2014/main" id="{139C5A7F-A204-41EC-9889-C7B002A21534}"/>
+              </a:ext>
+            </a:extLst>
+          </p:cNvPr>
+          <p:cNvPicPr>
+            <a:picLocks noGrp="1" noChangeAspect="1"/>
+          </p:cNvPicPr>
+          <p:nvPr>
+            <p:ph type="pic" sz="quarter" idx="12"/>
+          </p:nvPr>
+        </p:nvPicPr>
+        <p:blipFill>
+          <a:blip r:embed="rId2">
+            <a:extLst>
+              <a:ext uri="{28A0092B-C50C-407E-A947-70E740481C1C}">
+                <a14:useLocalDpi xmlns:a14="http://schemas.microsoft.com/office/drawing/2010/main" val="0"/>
+              </a:ext>
+            </a:extLst>
+          </a:blip>
+          <a:srcRect t="6324" b="6324"/>
+          <a:stretch>
+            <a:fillRect/>
+          </a:stretch>
+        </p:blipFill>
+        <p:spPr/>
+      </p:pic>
+      <p:sp>
+        <p:nvSpPr>
+          <p:cNvPr id="4" name="Textplatzhalter 3"/>
+          <p:cNvSpPr>
+            <a:spLocks noGrp="1"/>
+          </p:cNvSpPr>
+          <p:nvPr>
+            <p:ph type="body" sz="quarter" idx="13"/>
+          </p:nvPr>
+        </p:nvSpPr>
+        <p:spPr>
+          <a:xfrm>
+            <a:off x="1187624" y="2996952"/>
+            <a:ext cx="6769074" cy="1439689"/>
+          </a:xfrm>
+        </p:spPr>
+        <p:txBody>
+          <a:bodyPr>
+            <a:normAutofit fontScale="85000" lnSpcReduction="10000"/>
+          </a:bodyPr>
+          <a:lstStyle/>
+          <a:p>
+            <a:pPr marL="0" indent="0">
+              <a:buNone/>
+            </a:pPr>
+            <a:r>
+              <a:rPr lang="de-DE" dirty="0"/>
+              <a:t>Die Freibiermaschine wurde von einem </a:t>
+            </a:r>
+            <a:r>
+              <a:rPr lang="de-DE" dirty="0" err="1"/>
+              <a:t>WiWi</a:t>
+            </a:r>
+            <a:r>
+              <a:rPr lang="de-DE" dirty="0"/>
+              <a:t> so optimiert, so dass sie nur noch eine einzelne Datei braucht: FB_Alle.txt. Lade dir den aktuellen Stand des </a:t>
+            </a:r>
+            <a:r>
+              <a:rPr lang="de-DE" dirty="0" err="1"/>
+              <a:t>Repositories</a:t>
+            </a:r>
+            <a:r>
+              <a:rPr lang="de-DE" dirty="0"/>
+              <a:t> herunter. Warte, bis die Schulungsleiter ihre Namen eingetragen haben. Trage dann deinen Namen in die Datei ein und lade deine Änderungen wieder hoch.</a:t>
+            </a:r>
+          </a:p>
+        </p:txBody>
+      </p:sp>
+      <p:sp>
+        <p:nvSpPr>
+          <p:cNvPr id="5" name="Textplatzhalter 4"/>
+          <p:cNvSpPr>
+            <a:spLocks noGrp="1"/>
+          </p:cNvSpPr>
+          <p:nvPr>
+            <p:ph type="body" sz="quarter" idx="15"/>
+          </p:nvPr>
+        </p:nvSpPr>
+        <p:spPr/>
+        <p:txBody>
+          <a:bodyPr/>
+          <a:lstStyle/>
+          <a:p>
+            <a:endParaRPr lang="de-DE" dirty="0"/>
+          </a:p>
+        </p:txBody>
+      </p:sp>
+      <p:sp>
+        <p:nvSpPr>
+          <p:cNvPr id="3" name="Rechteck: abgerundete Ecken 2">
+            <a:extLst>
+              <a:ext uri="{FF2B5EF4-FFF2-40B4-BE49-F238E27FC236}">
+                <a16:creationId xmlns:a16="http://schemas.microsoft.com/office/drawing/2014/main" id="{3CE9FA32-6D59-4CA8-9F8C-C7123564038F}"/>
+              </a:ext>
+            </a:extLst>
+          </p:cNvPr>
+          <p:cNvSpPr/>
+          <p:nvPr/>
+        </p:nvSpPr>
+        <p:spPr>
+          <a:xfrm>
+            <a:off x="1115294" y="1508400"/>
+            <a:ext cx="6912768" cy="1301304"/>
+          </a:xfrm>
+          <a:prstGeom prst="roundRect">
+            <a:avLst/>
+          </a:prstGeom>
+          <a:solidFill>
+            <a:schemeClr val="tx2">
+              <a:lumMod val="20000"/>
+              <a:lumOff val="80000"/>
+            </a:schemeClr>
+          </a:solidFill>
+          <a:ln w="28575">
+            <a:solidFill>
+              <a:srgbClr val="C00000"/>
+            </a:solidFill>
+          </a:ln>
+        </p:spPr>
+        <p:style>
+          <a:lnRef idx="2">
+            <a:schemeClr val="accent1">
+              <a:shade val="50000"/>
+            </a:schemeClr>
+          </a:lnRef>
+          <a:fillRef idx="1">
+            <a:schemeClr val="accent1"/>
+          </a:fillRef>
+          <a:effectRef idx="0">
+            <a:schemeClr val="accent1"/>
+          </a:effectRef>
+          <a:fontRef idx="minor">
+            <a:schemeClr val="lt1"/>
+          </a:fontRef>
+        </p:style>
+        <p:txBody>
+          <a:bodyPr rtlCol="0" anchor="ctr"/>
+          <a:lstStyle/>
+          <a:p>
+            <a:pPr algn="ctr"/>
+            <a:r>
+              <a:rPr lang="de-DE" sz="4800" dirty="0">
+                <a:solidFill>
+                  <a:schemeClr val="tx1"/>
+                </a:solidFill>
+              </a:rPr>
+              <a:t>Aufgabe 3</a:t>
+            </a:r>
+          </a:p>
+        </p:txBody>
+      </p:sp>
+    </p:spTree>
+    <p:extLst>
+      <p:ext uri="{BB962C8B-B14F-4D97-AF65-F5344CB8AC3E}">
+        <p14:creationId xmlns:p14="http://schemas.microsoft.com/office/powerpoint/2010/main" val="3956944149"/>
+      </p:ext>
+    </p:extLst>
+  </p:cSld>
+  <p:clrMapOvr>
+    <a:masterClrMapping/>
+  </p:clrMapOvr>
+</p:sld>
+</file>
+
+<file path=ppt/slides/slide8.xml><?xml version="1.0" encoding="utf-8"?>
+<p:sld xmlns:a="http://schemas.openxmlformats.org/drawingml/2006/main" xmlns:r="http://schemas.openxmlformats.org/officeDocument/2006/relationships" xmlns:p="http://schemas.openxmlformats.org/presentationml/2006/main">
+  <p:cSld>
+    <p:spTree>
+      <p:nvGrpSpPr>
+        <p:cNvPr id="1" name=""/>
+        <p:cNvGrpSpPr/>
+        <p:nvPr/>
+      </p:nvGrpSpPr>
+      <p:grpSpPr>
+        <a:xfrm>
+          <a:off x="0" y="0"/>
+          <a:ext cx="0" cy="0"/>
+          <a:chOff x="0" y="0"/>
+          <a:chExt cx="0" cy="0"/>
+        </a:xfrm>
+      </p:grpSpPr>
+      <p:sp>
+        <p:nvSpPr>
+          <p:cNvPr id="2" name="Titel 1"/>
+          <p:cNvSpPr>
+            <a:spLocks noGrp="1"/>
+          </p:cNvSpPr>
+          <p:nvPr>
+            <p:ph type="title"/>
+          </p:nvPr>
+        </p:nvSpPr>
+        <p:spPr/>
+        <p:txBody>
+          <a:bodyPr/>
+          <a:lstStyle/>
+          <a:p>
+            <a:r>
+              <a:rPr lang="de-DE" dirty="0"/>
+              <a:t>Hands-On</a:t>
+            </a:r>
+          </a:p>
+        </p:txBody>
+      </p:sp>
+      <p:pic>
+        <p:nvPicPr>
+          <p:cNvPr id="7" name="Bildplatzhalter 6" descr="Ein Bild, das ClipArt enthält.&#10;&#10;Mit hoher Zuverlässigkeit generierte Beschreibung">
+            <a:extLst>
+              <a:ext uri="{FF2B5EF4-FFF2-40B4-BE49-F238E27FC236}">
+                <a16:creationId xmlns:a16="http://schemas.microsoft.com/office/drawing/2014/main" id="{139C5A7F-A204-41EC-9889-C7B002A21534}"/>
+              </a:ext>
+            </a:extLst>
+          </p:cNvPr>
+          <p:cNvPicPr>
+            <a:picLocks noGrp="1" noChangeAspect="1"/>
+          </p:cNvPicPr>
+          <p:nvPr>
+            <p:ph type="pic" sz="quarter" idx="12"/>
+          </p:nvPr>
+        </p:nvPicPr>
+        <p:blipFill>
+          <a:blip r:embed="rId2">
+            <a:extLst>
+              <a:ext uri="{28A0092B-C50C-407E-A947-70E740481C1C}">
+                <a14:useLocalDpi xmlns:a14="http://schemas.microsoft.com/office/drawing/2010/main" val="0"/>
+              </a:ext>
+            </a:extLst>
+          </a:blip>
+          <a:srcRect t="6324" b="6324"/>
+          <a:stretch>
+            <a:fillRect/>
+          </a:stretch>
+        </p:blipFill>
+        <p:spPr/>
+      </p:pic>
+      <p:sp>
+        <p:nvSpPr>
+          <p:cNvPr id="4" name="Textplatzhalter 3"/>
+          <p:cNvSpPr>
+            <a:spLocks noGrp="1"/>
+          </p:cNvSpPr>
+          <p:nvPr>
+            <p:ph type="body" sz="quarter" idx="13"/>
+          </p:nvPr>
+        </p:nvSpPr>
+        <p:spPr>
+          <a:xfrm>
+            <a:off x="1187624" y="2996952"/>
+            <a:ext cx="6769074" cy="1439689"/>
+          </a:xfrm>
+        </p:spPr>
+        <p:txBody>
+          <a:bodyPr>
+            <a:normAutofit/>
+          </a:bodyPr>
+          <a:lstStyle/>
+          <a:p>
+            <a:pPr marL="0" indent="0">
+              <a:buNone/>
+            </a:pPr>
+            <a:r>
+              <a:rPr lang="de-DE" dirty="0"/>
+              <a:t>Löse den aufgetretenen </a:t>
+            </a:r>
+            <a:r>
+              <a:rPr lang="de-DE" dirty="0" err="1"/>
+              <a:t>Merge-Konfikt</a:t>
+            </a:r>
+            <a:r>
+              <a:rPr lang="de-DE" dirty="0"/>
+              <a:t>. </a:t>
+            </a:r>
+          </a:p>
+        </p:txBody>
+      </p:sp>
+      <p:sp>
+        <p:nvSpPr>
+          <p:cNvPr id="5" name="Textplatzhalter 4"/>
+          <p:cNvSpPr>
+            <a:spLocks noGrp="1"/>
+          </p:cNvSpPr>
+          <p:nvPr>
+            <p:ph type="body" sz="quarter" idx="15"/>
+          </p:nvPr>
+        </p:nvSpPr>
+        <p:spPr/>
+        <p:txBody>
+          <a:bodyPr/>
+          <a:lstStyle/>
+          <a:p>
+            <a:endParaRPr lang="de-DE" dirty="0"/>
+          </a:p>
+        </p:txBody>
+      </p:sp>
+      <p:sp>
+        <p:nvSpPr>
+          <p:cNvPr id="3" name="Rechteck: abgerundete Ecken 2">
+            <a:extLst>
+              <a:ext uri="{FF2B5EF4-FFF2-40B4-BE49-F238E27FC236}">
+                <a16:creationId xmlns:a16="http://schemas.microsoft.com/office/drawing/2014/main" id="{3CE9FA32-6D59-4CA8-9F8C-C7123564038F}"/>
+              </a:ext>
+            </a:extLst>
+          </p:cNvPr>
+          <p:cNvSpPr/>
+          <p:nvPr/>
+        </p:nvSpPr>
+        <p:spPr>
+          <a:xfrm>
+            <a:off x="1115294" y="1508400"/>
+            <a:ext cx="6912768" cy="1301304"/>
+          </a:xfrm>
+          <a:prstGeom prst="roundRect">
+            <a:avLst/>
+          </a:prstGeom>
+          <a:solidFill>
+            <a:schemeClr val="tx2">
+              <a:lumMod val="20000"/>
+              <a:lumOff val="80000"/>
+            </a:schemeClr>
+          </a:solidFill>
+          <a:ln w="28575">
+            <a:solidFill>
+              <a:srgbClr val="C00000"/>
+            </a:solidFill>
+          </a:ln>
+        </p:spPr>
+        <p:style>
+          <a:lnRef idx="2">
+            <a:schemeClr val="accent1">
+              <a:shade val="50000"/>
+            </a:schemeClr>
+          </a:lnRef>
+          <a:fillRef idx="1">
+            <a:schemeClr val="accent1"/>
+          </a:fillRef>
+          <a:effectRef idx="0">
+            <a:schemeClr val="accent1"/>
+          </a:effectRef>
+          <a:fontRef idx="minor">
+            <a:schemeClr val="lt1"/>
+          </a:fontRef>
+        </p:style>
+        <p:txBody>
+          <a:bodyPr rtlCol="0" anchor="ctr"/>
+          <a:lstStyle/>
+          <a:p>
+            <a:pPr algn="ctr"/>
+            <a:r>
+              <a:rPr lang="de-DE" sz="4800" dirty="0">
+                <a:solidFill>
+                  <a:schemeClr val="tx1"/>
+                </a:solidFill>
+              </a:rPr>
+              <a:t>Aufgabe 3b</a:t>
+            </a:r>
+          </a:p>
+        </p:txBody>
+      </p:sp>
+    </p:spTree>
+    <p:extLst>
+      <p:ext uri="{BB962C8B-B14F-4D97-AF65-F5344CB8AC3E}">
+        <p14:creationId xmlns:p14="http://schemas.microsoft.com/office/powerpoint/2010/main" val="3017831674"/>
+      </p:ext>
+    </p:extLst>
+  </p:cSld>
+  <p:clrMapOvr>
+    <a:masterClrMapping/>
+  </p:clrMapOvr>
+</p:sld>
+</file>
+
+<file path=ppt/slides/slide9.xml><?xml version="1.0" encoding="utf-8"?>
+<p:sld xmlns:a="http://schemas.openxmlformats.org/drawingml/2006/main" xmlns:r="http://schemas.openxmlformats.org/officeDocument/2006/relationships" xmlns:p="http://schemas.openxmlformats.org/presentationml/2006/main">
+  <p:cSld>
+    <p:spTree>
+      <p:nvGrpSpPr>
+        <p:cNvPr id="1" name=""/>
+        <p:cNvGrpSpPr/>
+        <p:nvPr/>
+      </p:nvGrpSpPr>
+      <p:grpSpPr>
+        <a:xfrm>
+          <a:off x="0" y="0"/>
+          <a:ext cx="0" cy="0"/>
+          <a:chOff x="0" y="0"/>
+          <a:chExt cx="0" cy="0"/>
+        </a:xfrm>
+      </p:grpSpPr>
+      <p:sp>
+        <p:nvSpPr>
+          <p:cNvPr id="2" name="Titel 1"/>
+          <p:cNvSpPr>
+            <a:spLocks noGrp="1"/>
+          </p:cNvSpPr>
+          <p:nvPr>
+            <p:ph type="title"/>
+          </p:nvPr>
+        </p:nvSpPr>
+        <p:spPr/>
+        <p:txBody>
+          <a:bodyPr/>
+          <a:lstStyle/>
+          <a:p>
+            <a:r>
+              <a:rPr lang="de-DE" dirty="0"/>
+              <a:t>Hands-On</a:t>
+            </a:r>
+          </a:p>
+        </p:txBody>
+      </p:sp>
+      <p:pic>
+        <p:nvPicPr>
+          <p:cNvPr id="7" name="Bildplatzhalter 6" descr="Ein Bild, das ClipArt enthält.&#10;&#10;Mit hoher Zuverlässigkeit generierte Beschreibung">
+            <a:extLst>
+              <a:ext uri="{FF2B5EF4-FFF2-40B4-BE49-F238E27FC236}">
+                <a16:creationId xmlns:a16="http://schemas.microsoft.com/office/drawing/2014/main" id="{139C5A7F-A204-41EC-9889-C7B002A21534}"/>
+              </a:ext>
+            </a:extLst>
+          </p:cNvPr>
+          <p:cNvPicPr>
+            <a:picLocks noGrp="1" noChangeAspect="1"/>
+          </p:cNvPicPr>
+          <p:nvPr>
+            <p:ph type="pic" sz="quarter" idx="12"/>
+          </p:nvPr>
+        </p:nvPicPr>
+        <p:blipFill>
+          <a:blip r:embed="rId2">
+            <a:extLst>
+              <a:ext uri="{28A0092B-C50C-407E-A947-70E740481C1C}">
+                <a14:useLocalDpi xmlns:a14="http://schemas.microsoft.com/office/drawing/2010/main" val="0"/>
+              </a:ext>
+            </a:extLst>
+          </a:blip>
+          <a:srcRect t="6324" b="6324"/>
+          <a:stretch>
+            <a:fillRect/>
+          </a:stretch>
+        </p:blipFill>
+        <p:spPr/>
+      </p:pic>
+      <p:sp>
+        <p:nvSpPr>
+          <p:cNvPr id="4" name="Textplatzhalter 3"/>
+          <p:cNvSpPr>
+            <a:spLocks noGrp="1"/>
+          </p:cNvSpPr>
+          <p:nvPr>
+            <p:ph type="body" sz="quarter" idx="13"/>
+          </p:nvPr>
+        </p:nvSpPr>
+        <p:spPr>
+          <a:xfrm>
+            <a:off x="1187624" y="2996952"/>
+            <a:ext cx="6769074" cy="1439689"/>
+          </a:xfrm>
+        </p:spPr>
+        <p:txBody>
+          <a:bodyPr>
+            <a:normAutofit/>
+          </a:bodyPr>
+          <a:lstStyle/>
+          <a:p>
+            <a:pPr marL="0" indent="0">
+              <a:buNone/>
+            </a:pPr>
+            <a:r>
+              <a:rPr lang="de-DE" dirty="0"/>
+              <a:t>Anne ändert aus Versehen das Freibier zu Freibrokkoli. Philipp findet das nicht so gut und möchte die Änderungen von Anne rückgängig machen. Was hat er hier für Möglichkeiten?</a:t>
+            </a:r>
+          </a:p>
+          <a:p>
+            <a:endParaRPr lang="de-DE" dirty="0"/>
+          </a:p>
+        </p:txBody>
+      </p:sp>
+      <p:sp>
+        <p:nvSpPr>
+          <p:cNvPr id="5" name="Textplatzhalter 4"/>
+          <p:cNvSpPr>
+            <a:spLocks noGrp="1"/>
+          </p:cNvSpPr>
+          <p:nvPr>
+            <p:ph type="body" sz="quarter" idx="15"/>
+          </p:nvPr>
+        </p:nvSpPr>
+        <p:spPr/>
+        <p:txBody>
+          <a:bodyPr/>
+          <a:lstStyle/>
+          <a:p>
+            <a:endParaRPr lang="de-DE" dirty="0"/>
+          </a:p>
+        </p:txBody>
+      </p:sp>
+      <p:sp>
+        <p:nvSpPr>
+          <p:cNvPr id="3" name="Rechteck: abgerundete Ecken 2">
+            <a:extLst>
+              <a:ext uri="{FF2B5EF4-FFF2-40B4-BE49-F238E27FC236}">
+                <a16:creationId xmlns:a16="http://schemas.microsoft.com/office/drawing/2014/main" id="{3CE9FA32-6D59-4CA8-9F8C-C7123564038F}"/>
+              </a:ext>
+            </a:extLst>
+          </p:cNvPr>
+          <p:cNvSpPr/>
+          <p:nvPr/>
+        </p:nvSpPr>
+        <p:spPr>
+          <a:xfrm>
+            <a:off x="1115294" y="1508400"/>
+            <a:ext cx="6912768" cy="1301304"/>
+          </a:xfrm>
+          <a:prstGeom prst="roundRect">
+            <a:avLst/>
+          </a:prstGeom>
+          <a:solidFill>
+            <a:schemeClr val="tx2">
+              <a:lumMod val="20000"/>
+              <a:lumOff val="80000"/>
+            </a:schemeClr>
+          </a:solidFill>
+          <a:ln w="28575">
+            <a:solidFill>
+              <a:srgbClr val="C00000"/>
+            </a:solidFill>
+          </a:ln>
+        </p:spPr>
+        <p:style>
+          <a:lnRef idx="2">
+            <a:schemeClr val="accent1">
+              <a:shade val="50000"/>
+            </a:schemeClr>
+          </a:lnRef>
+          <a:fillRef idx="1">
+            <a:schemeClr val="accent1"/>
+          </a:fillRef>
+          <a:effectRef idx="0">
+            <a:schemeClr val="accent1"/>
+          </a:effectRef>
+          <a:fontRef idx="minor">
+            <a:schemeClr val="lt1"/>
+          </a:fontRef>
+        </p:style>
+        <p:txBody>
+          <a:bodyPr rtlCol="0" anchor="ctr"/>
+          <a:lstStyle/>
+          <a:p>
+            <a:pPr algn="ctr"/>
+            <a:r>
+              <a:rPr lang="de-DE" sz="4800" dirty="0">
+                <a:solidFill>
+                  <a:schemeClr val="tx1"/>
+                </a:solidFill>
+              </a:rPr>
+              <a:t>Aufgabe 4</a:t>
+            </a:r>
+          </a:p>
+        </p:txBody>
+      </p:sp>
+    </p:spTree>
+    <p:extLst>
+      <p:ext uri="{BB962C8B-B14F-4D97-AF65-F5344CB8AC3E}">
+        <p14:creationId xmlns:p14="http://schemas.microsoft.com/office/powerpoint/2010/main" val="3565894616"/>
       </p:ext>
     </p:extLst>
   </p:cSld>

</xml_diff>

<commit_message>
Befehle für das Improtheater in die Präsentation hingefügt
</commit_message>
<xml_diff>
--- a/git Schulung.pptx
+++ b/git Schulung.pptx
@@ -5,25 +5,32 @@
     <p:sldMasterId id="2147483648" r:id="rId1"/>
   </p:sldMasterIdLst>
   <p:notesMasterIdLst>
-    <p:notesMasterId r:id="rId15"/>
+    <p:notesMasterId r:id="rId22"/>
   </p:notesMasterIdLst>
   <p:handoutMasterIdLst>
-    <p:handoutMasterId r:id="rId16"/>
+    <p:handoutMasterId r:id="rId23"/>
   </p:handoutMasterIdLst>
   <p:sldIdLst>
     <p:sldId id="257" r:id="rId2"/>
     <p:sldId id="258" r:id="rId3"/>
     <p:sldId id="256" r:id="rId4"/>
-    <p:sldId id="259" r:id="rId5"/>
-    <p:sldId id="260" r:id="rId6"/>
-    <p:sldId id="261" r:id="rId7"/>
-    <p:sldId id="262" r:id="rId8"/>
-    <p:sldId id="263" r:id="rId9"/>
-    <p:sldId id="264" r:id="rId10"/>
-    <p:sldId id="265" r:id="rId11"/>
-    <p:sldId id="266" r:id="rId12"/>
-    <p:sldId id="267" r:id="rId13"/>
-    <p:sldId id="268" r:id="rId14"/>
+    <p:sldId id="269" r:id="rId5"/>
+    <p:sldId id="270" r:id="rId6"/>
+    <p:sldId id="271" r:id="rId7"/>
+    <p:sldId id="272" r:id="rId8"/>
+    <p:sldId id="273" r:id="rId9"/>
+    <p:sldId id="274" r:id="rId10"/>
+    <p:sldId id="275" r:id="rId11"/>
+    <p:sldId id="259" r:id="rId12"/>
+    <p:sldId id="260" r:id="rId13"/>
+    <p:sldId id="261" r:id="rId14"/>
+    <p:sldId id="262" r:id="rId15"/>
+    <p:sldId id="263" r:id="rId16"/>
+    <p:sldId id="264" r:id="rId17"/>
+    <p:sldId id="265" r:id="rId18"/>
+    <p:sldId id="266" r:id="rId19"/>
+    <p:sldId id="267" r:id="rId20"/>
+    <p:sldId id="268" r:id="rId21"/>
   </p:sldIdLst>
   <p:sldSz cx="9144000" cy="6858000" type="screen4x3"/>
   <p:notesSz cx="6858000" cy="9144000"/>
@@ -12154,7 +12161,7 @@
           <a:p>
             <a:r>
               <a:rPr lang="de-DE" dirty="0"/>
-              <a:t>Hands-On</a:t>
+              <a:t>Einleitung</a:t>
             </a:r>
           </a:p>
         </p:txBody>
@@ -12200,30 +12207,20 @@
             <p:ph type="body" sz="quarter" idx="13"/>
           </p:nvPr>
         </p:nvSpPr>
-        <p:spPr>
-          <a:xfrm>
-            <a:off x="1187624" y="2996952"/>
-            <a:ext cx="6769074" cy="1439689"/>
-          </a:xfrm>
-        </p:spPr>
-        <p:txBody>
-          <a:bodyPr>
-            <a:normAutofit fontScale="70000" lnSpcReduction="20000"/>
-          </a:bodyPr>
+        <p:spPr/>
+        <p:txBody>
+          <a:bodyPr/>
           <a:lstStyle/>
           <a:p>
             <a:r>
               <a:rPr lang="de-DE" dirty="0"/>
-              <a:t>Anne hat schon wieder (!!) das Bier zu einem gesunden Gemüse geändert. Direkt danach hat Philipp wichtige Änderungen an der Datei FB_Alle.txt gemacht und diese hochgeladen. Erst danach stellt er fest, dass sein Freund Herbert, den er in die Datei eingetragen hat, Spinat anstatt Bier bekommt! Da seine eigenen Änderungen so aufwändig sind, dass er sie nicht nochmal machen möchte, kommt ein </a:t>
+              <a:t>Supertolle </a:t>
             </a:r>
             <a:r>
               <a:rPr lang="de-DE" dirty="0" err="1"/>
-              <a:t>reset</a:t>
-            </a:r>
-            <a:r>
-              <a:rPr lang="de-DE" dirty="0"/>
-              <a:t> nicht in Frage.  Was hätte er rückblickend besser machen können? </a:t>
-            </a:r>
+              <a:t>Annelogie</a:t>
+            </a:r>
+            <a:endParaRPr lang="de-DE" dirty="0"/>
           </a:p>
         </p:txBody>
       </p:sp>
@@ -12242,16 +12239,19 @@
           <a:bodyPr/>
           <a:lstStyle/>
           <a:p>
-            <a:endParaRPr lang="de-DE" dirty="0"/>
-          </a:p>
-        </p:txBody>
-      </p:sp>
-      <p:sp>
-        <p:nvSpPr>
-          <p:cNvPr id="3" name="Rechteck: abgerundete Ecken 2">
+            <a:r>
+              <a:rPr lang="de-DE" dirty="0"/>
+              <a:t>Analogie</a:t>
+            </a:r>
+          </a:p>
+        </p:txBody>
+      </p:sp>
+      <p:sp>
+        <p:nvSpPr>
+          <p:cNvPr id="3" name="Rechteck 2">
             <a:extLst>
               <a:ext uri="{FF2B5EF4-FFF2-40B4-BE49-F238E27FC236}">
-                <a16:creationId xmlns:a16="http://schemas.microsoft.com/office/drawing/2014/main" id="{3CE9FA32-6D59-4CA8-9F8C-C7123564038F}"/>
+                <a16:creationId xmlns:a16="http://schemas.microsoft.com/office/drawing/2014/main" id="{7976462E-8EB9-46BE-9B9D-BC8AA42CBA20}"/>
               </a:ext>
             </a:extLst>
           </p:cNvPr>
@@ -12260,21 +12260,18 @@
         </p:nvSpPr>
         <p:spPr>
           <a:xfrm>
-            <a:off x="1115294" y="1508400"/>
-            <a:ext cx="6912768" cy="1301304"/>
-          </a:xfrm>
-          <a:prstGeom prst="roundRect">
+            <a:off x="0" y="0"/>
+            <a:ext cx="9144000" cy="6858000"/>
+          </a:xfrm>
+          <a:prstGeom prst="rect">
             <a:avLst/>
           </a:prstGeom>
           <a:solidFill>
-            <a:schemeClr val="tx2">
-              <a:lumMod val="20000"/>
-              <a:lumOff val="80000"/>
-            </a:schemeClr>
+            <a:schemeClr val="bg1"/>
           </a:solidFill>
           <a:ln w="28575">
             <a:solidFill>
-              <a:srgbClr val="C00000"/>
+              <a:schemeClr val="bg1"/>
             </a:solidFill>
           </a:ln>
         </p:spPr>
@@ -12299,21 +12296,55 @@
           <a:lstStyle/>
           <a:p>
             <a:pPr algn="ctr"/>
-            <a:r>
-              <a:rPr lang="de-DE" sz="4800" dirty="0">
-                <a:solidFill>
-                  <a:schemeClr val="tx1"/>
-                </a:solidFill>
-              </a:rPr>
-              <a:t>Aufgabe 5</a:t>
-            </a:r>
+            <a:endParaRPr lang="de-DE"/>
+          </a:p>
+        </p:txBody>
+      </p:sp>
+      <p:sp>
+        <p:nvSpPr>
+          <p:cNvPr id="6" name="Textfeld 5">
+            <a:extLst>
+              <a:ext uri="{FF2B5EF4-FFF2-40B4-BE49-F238E27FC236}">
+                <a16:creationId xmlns:a16="http://schemas.microsoft.com/office/drawing/2014/main" id="{296021C2-D1A8-4421-90E4-5871158F5F43}"/>
+              </a:ext>
+            </a:extLst>
+          </p:cNvPr>
+          <p:cNvSpPr txBox="1"/>
+          <p:nvPr/>
+        </p:nvSpPr>
+        <p:spPr>
+          <a:xfrm>
+            <a:off x="2123728" y="404664"/>
+            <a:ext cx="4392488" cy="1200329"/>
+          </a:xfrm>
+          <a:prstGeom prst="rect">
+            <a:avLst/>
+          </a:prstGeom>
+          <a:noFill/>
+        </p:spPr>
+        <p:txBody>
+          <a:bodyPr wrap="square" rtlCol="0">
+            <a:spAutoFit/>
+          </a:bodyPr>
+          <a:lstStyle/>
+          <a:p>
+            <a:pPr algn="ctr">
+              <a:buClr>
+                <a:srgbClr val="C00000"/>
+              </a:buClr>
+            </a:pPr>
+            <a:r>
+              <a:rPr lang="de-DE" sz="7200" b="1" dirty="0" err="1"/>
+              <a:t>branches</a:t>
+            </a:r>
+            <a:endParaRPr lang="de-DE" sz="2000" b="1" dirty="0"/>
           </a:p>
         </p:txBody>
       </p:sp>
     </p:spTree>
     <p:extLst>
       <p:ext uri="{BB962C8B-B14F-4D97-AF65-F5344CB8AC3E}">
-        <p14:creationId xmlns:p14="http://schemas.microsoft.com/office/powerpoint/2010/main" val="110835878"/>
+        <p14:creationId xmlns:p14="http://schemas.microsoft.com/office/powerpoint/2010/main" val="1407601968"/>
       </p:ext>
     </p:extLst>
   </p:cSld>
@@ -12324,1129 +12355,6 @@
 </file>
 
 <file path=ppt/slides/slide11.xml><?xml version="1.0" encoding="utf-8"?>
-<p:sld xmlns:a="http://schemas.openxmlformats.org/drawingml/2006/main" xmlns:r="http://schemas.openxmlformats.org/officeDocument/2006/relationships" xmlns:p="http://schemas.openxmlformats.org/presentationml/2006/main">
-  <p:cSld>
-    <p:spTree>
-      <p:nvGrpSpPr>
-        <p:cNvPr id="1" name=""/>
-        <p:cNvGrpSpPr/>
-        <p:nvPr/>
-      </p:nvGrpSpPr>
-      <p:grpSpPr>
-        <a:xfrm>
-          <a:off x="0" y="0"/>
-          <a:ext cx="0" cy="0"/>
-          <a:chOff x="0" y="0"/>
-          <a:chExt cx="0" cy="0"/>
-        </a:xfrm>
-      </p:grpSpPr>
-      <p:sp>
-        <p:nvSpPr>
-          <p:cNvPr id="2" name="Titel 1"/>
-          <p:cNvSpPr>
-            <a:spLocks noGrp="1"/>
-          </p:cNvSpPr>
-          <p:nvPr>
-            <p:ph type="title"/>
-          </p:nvPr>
-        </p:nvSpPr>
-        <p:spPr/>
-        <p:txBody>
-          <a:bodyPr/>
-          <a:lstStyle/>
-          <a:p>
-            <a:r>
-              <a:rPr lang="de-DE" dirty="0"/>
-              <a:t>Hands-On</a:t>
-            </a:r>
-          </a:p>
-        </p:txBody>
-      </p:sp>
-      <p:pic>
-        <p:nvPicPr>
-          <p:cNvPr id="7" name="Bildplatzhalter 6" descr="Ein Bild, das ClipArt enthält.&#10;&#10;Mit hoher Zuverlässigkeit generierte Beschreibung">
-            <a:extLst>
-              <a:ext uri="{FF2B5EF4-FFF2-40B4-BE49-F238E27FC236}">
-                <a16:creationId xmlns:a16="http://schemas.microsoft.com/office/drawing/2014/main" id="{139C5A7F-A204-41EC-9889-C7B002A21534}"/>
-              </a:ext>
-            </a:extLst>
-          </p:cNvPr>
-          <p:cNvPicPr>
-            <a:picLocks noGrp="1" noChangeAspect="1"/>
-          </p:cNvPicPr>
-          <p:nvPr>
-            <p:ph type="pic" sz="quarter" idx="12"/>
-          </p:nvPr>
-        </p:nvPicPr>
-        <p:blipFill>
-          <a:blip r:embed="rId2">
-            <a:extLst>
-              <a:ext uri="{28A0092B-C50C-407E-A947-70E740481C1C}">
-                <a14:useLocalDpi xmlns:a14="http://schemas.microsoft.com/office/drawing/2010/main" val="0"/>
-              </a:ext>
-            </a:extLst>
-          </a:blip>
-          <a:srcRect t="6324" b="6324"/>
-          <a:stretch>
-            <a:fillRect/>
-          </a:stretch>
-        </p:blipFill>
-        <p:spPr/>
-      </p:pic>
-      <p:sp>
-        <p:nvSpPr>
-          <p:cNvPr id="4" name="Textplatzhalter 3"/>
-          <p:cNvSpPr>
-            <a:spLocks noGrp="1"/>
-          </p:cNvSpPr>
-          <p:nvPr>
-            <p:ph type="body" sz="quarter" idx="13"/>
-          </p:nvPr>
-        </p:nvSpPr>
-        <p:spPr>
-          <a:xfrm>
-            <a:off x="1187624" y="2996952"/>
-            <a:ext cx="6769074" cy="1439689"/>
-          </a:xfrm>
-        </p:spPr>
-        <p:txBody>
-          <a:bodyPr>
-            <a:normAutofit/>
-          </a:bodyPr>
-          <a:lstStyle/>
-          <a:p>
-            <a:pPr marL="0" indent="0">
-              <a:buNone/>
-            </a:pPr>
-            <a:r>
-              <a:rPr lang="de-DE" dirty="0"/>
-              <a:t>Erstelle deinen eigenen Branch und trage in die ausführbare Datei dein Lieblingsgemüse ein.</a:t>
-            </a:r>
-          </a:p>
-        </p:txBody>
-      </p:sp>
-      <p:sp>
-        <p:nvSpPr>
-          <p:cNvPr id="5" name="Textplatzhalter 4"/>
-          <p:cNvSpPr>
-            <a:spLocks noGrp="1"/>
-          </p:cNvSpPr>
-          <p:nvPr>
-            <p:ph type="body" sz="quarter" idx="15"/>
-          </p:nvPr>
-        </p:nvSpPr>
-        <p:spPr/>
-        <p:txBody>
-          <a:bodyPr/>
-          <a:lstStyle/>
-          <a:p>
-            <a:endParaRPr lang="de-DE" dirty="0"/>
-          </a:p>
-        </p:txBody>
-      </p:sp>
-      <p:sp>
-        <p:nvSpPr>
-          <p:cNvPr id="3" name="Rechteck: abgerundete Ecken 2">
-            <a:extLst>
-              <a:ext uri="{FF2B5EF4-FFF2-40B4-BE49-F238E27FC236}">
-                <a16:creationId xmlns:a16="http://schemas.microsoft.com/office/drawing/2014/main" id="{3CE9FA32-6D59-4CA8-9F8C-C7123564038F}"/>
-              </a:ext>
-            </a:extLst>
-          </p:cNvPr>
-          <p:cNvSpPr/>
-          <p:nvPr/>
-        </p:nvSpPr>
-        <p:spPr>
-          <a:xfrm>
-            <a:off x="1115294" y="1508400"/>
-            <a:ext cx="6912768" cy="1301304"/>
-          </a:xfrm>
-          <a:prstGeom prst="roundRect">
-            <a:avLst/>
-          </a:prstGeom>
-          <a:solidFill>
-            <a:schemeClr val="tx2">
-              <a:lumMod val="20000"/>
-              <a:lumOff val="80000"/>
-            </a:schemeClr>
-          </a:solidFill>
-          <a:ln w="28575">
-            <a:solidFill>
-              <a:srgbClr val="C00000"/>
-            </a:solidFill>
-          </a:ln>
-        </p:spPr>
-        <p:style>
-          <a:lnRef idx="2">
-            <a:schemeClr val="accent1">
-              <a:shade val="50000"/>
-            </a:schemeClr>
-          </a:lnRef>
-          <a:fillRef idx="1">
-            <a:schemeClr val="accent1"/>
-          </a:fillRef>
-          <a:effectRef idx="0">
-            <a:schemeClr val="accent1"/>
-          </a:effectRef>
-          <a:fontRef idx="minor">
-            <a:schemeClr val="lt1"/>
-          </a:fontRef>
-        </p:style>
-        <p:txBody>
-          <a:bodyPr rtlCol="0" anchor="ctr"/>
-          <a:lstStyle/>
-          <a:p>
-            <a:pPr algn="ctr"/>
-            <a:r>
-              <a:rPr lang="de-DE" sz="4800" dirty="0">
-                <a:solidFill>
-                  <a:schemeClr val="tx1"/>
-                </a:solidFill>
-              </a:rPr>
-              <a:t>Aufgabe 6</a:t>
-            </a:r>
-          </a:p>
-        </p:txBody>
-      </p:sp>
-    </p:spTree>
-    <p:extLst>
-      <p:ext uri="{BB962C8B-B14F-4D97-AF65-F5344CB8AC3E}">
-        <p14:creationId xmlns:p14="http://schemas.microsoft.com/office/powerpoint/2010/main" val="1421577261"/>
-      </p:ext>
-    </p:extLst>
-  </p:cSld>
-  <p:clrMapOvr>
-    <a:masterClrMapping/>
-  </p:clrMapOvr>
-</p:sld>
-</file>
-
-<file path=ppt/slides/slide12.xml><?xml version="1.0" encoding="utf-8"?>
-<p:sld xmlns:a="http://schemas.openxmlformats.org/drawingml/2006/main" xmlns:r="http://schemas.openxmlformats.org/officeDocument/2006/relationships" xmlns:p="http://schemas.openxmlformats.org/presentationml/2006/main">
-  <p:cSld>
-    <p:spTree>
-      <p:nvGrpSpPr>
-        <p:cNvPr id="1" name=""/>
-        <p:cNvGrpSpPr/>
-        <p:nvPr/>
-      </p:nvGrpSpPr>
-      <p:grpSpPr>
-        <a:xfrm>
-          <a:off x="0" y="0"/>
-          <a:ext cx="0" cy="0"/>
-          <a:chOff x="0" y="0"/>
-          <a:chExt cx="0" cy="0"/>
-        </a:xfrm>
-      </p:grpSpPr>
-      <p:sp>
-        <p:nvSpPr>
-          <p:cNvPr id="2" name="Titel 1"/>
-          <p:cNvSpPr>
-            <a:spLocks noGrp="1"/>
-          </p:cNvSpPr>
-          <p:nvPr>
-            <p:ph type="title"/>
-          </p:nvPr>
-        </p:nvSpPr>
-        <p:spPr/>
-        <p:txBody>
-          <a:bodyPr/>
-          <a:lstStyle/>
-          <a:p>
-            <a:r>
-              <a:rPr lang="de-DE" dirty="0"/>
-              <a:t>Hands-On</a:t>
-            </a:r>
-          </a:p>
-        </p:txBody>
-      </p:sp>
-      <p:pic>
-        <p:nvPicPr>
-          <p:cNvPr id="7" name="Bildplatzhalter 6" descr="Ein Bild, das ClipArt enthält.&#10;&#10;Mit hoher Zuverlässigkeit generierte Beschreibung">
-            <a:extLst>
-              <a:ext uri="{FF2B5EF4-FFF2-40B4-BE49-F238E27FC236}">
-                <a16:creationId xmlns:a16="http://schemas.microsoft.com/office/drawing/2014/main" id="{139C5A7F-A204-41EC-9889-C7B002A21534}"/>
-              </a:ext>
-            </a:extLst>
-          </p:cNvPr>
-          <p:cNvPicPr>
-            <a:picLocks noGrp="1" noChangeAspect="1"/>
-          </p:cNvPicPr>
-          <p:nvPr>
-            <p:ph type="pic" sz="quarter" idx="12"/>
-          </p:nvPr>
-        </p:nvPicPr>
-        <p:blipFill>
-          <a:blip r:embed="rId2">
-            <a:extLst>
-              <a:ext uri="{28A0092B-C50C-407E-A947-70E740481C1C}">
-                <a14:useLocalDpi xmlns:a14="http://schemas.microsoft.com/office/drawing/2010/main" val="0"/>
-              </a:ext>
-            </a:extLst>
-          </a:blip>
-          <a:srcRect t="6324" b="6324"/>
-          <a:stretch>
-            <a:fillRect/>
-          </a:stretch>
-        </p:blipFill>
-        <p:spPr/>
-      </p:pic>
-      <p:sp>
-        <p:nvSpPr>
-          <p:cNvPr id="5" name="Textplatzhalter 4"/>
-          <p:cNvSpPr>
-            <a:spLocks noGrp="1"/>
-          </p:cNvSpPr>
-          <p:nvPr>
-            <p:ph type="body" sz="quarter" idx="15"/>
-          </p:nvPr>
-        </p:nvSpPr>
-        <p:spPr/>
-        <p:txBody>
-          <a:bodyPr/>
-          <a:lstStyle/>
-          <a:p>
-            <a:endParaRPr lang="de-DE" dirty="0"/>
-          </a:p>
-        </p:txBody>
-      </p:sp>
-      <p:sp>
-        <p:nvSpPr>
-          <p:cNvPr id="8" name="Textplatzhalter 7">
-            <a:extLst>
-              <a:ext uri="{FF2B5EF4-FFF2-40B4-BE49-F238E27FC236}">
-                <a16:creationId xmlns:a16="http://schemas.microsoft.com/office/drawing/2014/main" id="{0F35EED6-E9E8-4369-860F-9927E646E322}"/>
-              </a:ext>
-            </a:extLst>
-          </p:cNvPr>
-          <p:cNvSpPr>
-            <a:spLocks noGrp="1"/>
-          </p:cNvSpPr>
-          <p:nvPr>
-            <p:ph type="body" sz="quarter" idx="13"/>
-          </p:nvPr>
-        </p:nvSpPr>
-        <p:spPr/>
-        <p:txBody>
-          <a:bodyPr/>
-          <a:lstStyle/>
-          <a:p>
-            <a:endParaRPr lang="de-DE"/>
-          </a:p>
-        </p:txBody>
-      </p:sp>
-      <p:sp>
-        <p:nvSpPr>
-          <p:cNvPr id="9" name="Rechteck 8">
-            <a:extLst>
-              <a:ext uri="{FF2B5EF4-FFF2-40B4-BE49-F238E27FC236}">
-                <a16:creationId xmlns:a16="http://schemas.microsoft.com/office/drawing/2014/main" id="{506E1D6F-3BAC-4497-A889-7A198D2BCB78}"/>
-              </a:ext>
-            </a:extLst>
-          </p:cNvPr>
-          <p:cNvSpPr/>
-          <p:nvPr/>
-        </p:nvSpPr>
-        <p:spPr>
-          <a:xfrm>
-            <a:off x="0" y="0"/>
-            <a:ext cx="9144000" cy="6858000"/>
-          </a:xfrm>
-          <a:prstGeom prst="rect">
-            <a:avLst/>
-          </a:prstGeom>
-          <a:solidFill>
-            <a:schemeClr val="accent1"/>
-          </a:solidFill>
-          <a:ln w="28575">
-            <a:solidFill>
-              <a:srgbClr val="C00000"/>
-            </a:solidFill>
-          </a:ln>
-        </p:spPr>
-        <p:style>
-          <a:lnRef idx="2">
-            <a:schemeClr val="accent1">
-              <a:shade val="50000"/>
-            </a:schemeClr>
-          </a:lnRef>
-          <a:fillRef idx="1">
-            <a:schemeClr val="accent1"/>
-          </a:fillRef>
-          <a:effectRef idx="0">
-            <a:schemeClr val="accent1"/>
-          </a:effectRef>
-          <a:fontRef idx="minor">
-            <a:schemeClr val="lt1"/>
-          </a:fontRef>
-        </p:style>
-        <p:txBody>
-          <a:bodyPr rtlCol="0" anchor="ctr"/>
-          <a:lstStyle/>
-          <a:p>
-            <a:pPr algn="ctr"/>
-            <a:endParaRPr lang="de-DE"/>
-          </a:p>
-        </p:txBody>
-      </p:sp>
-      <p:sp>
-        <p:nvSpPr>
-          <p:cNvPr id="10" name="Textfeld 9">
-            <a:extLst>
-              <a:ext uri="{FF2B5EF4-FFF2-40B4-BE49-F238E27FC236}">
-                <a16:creationId xmlns:a16="http://schemas.microsoft.com/office/drawing/2014/main" id="{37C63480-5CCD-4863-AB1B-3B79B6B2D69A}"/>
-              </a:ext>
-            </a:extLst>
-          </p:cNvPr>
-          <p:cNvSpPr txBox="1"/>
-          <p:nvPr/>
-        </p:nvSpPr>
-        <p:spPr>
-          <a:xfrm>
-            <a:off x="1619672" y="2348880"/>
-            <a:ext cx="6192688" cy="1862048"/>
-          </a:xfrm>
-          <a:prstGeom prst="rect">
-            <a:avLst/>
-          </a:prstGeom>
-          <a:noFill/>
-        </p:spPr>
-        <p:txBody>
-          <a:bodyPr wrap="square" rtlCol="0">
-            <a:spAutoFit/>
-          </a:bodyPr>
-          <a:lstStyle/>
-          <a:p>
-            <a:pPr>
-              <a:buClr>
-                <a:srgbClr val="C00000"/>
-              </a:buClr>
-            </a:pPr>
-            <a:r>
-              <a:rPr lang="de-DE" sz="11500" dirty="0">
-                <a:solidFill>
-                  <a:schemeClr val="bg1"/>
-                </a:solidFill>
-              </a:rPr>
-              <a:t>Fragen?</a:t>
-            </a:r>
-          </a:p>
-        </p:txBody>
-      </p:sp>
-    </p:spTree>
-    <p:extLst>
-      <p:ext uri="{BB962C8B-B14F-4D97-AF65-F5344CB8AC3E}">
-        <p14:creationId xmlns:p14="http://schemas.microsoft.com/office/powerpoint/2010/main" val="3297582077"/>
-      </p:ext>
-    </p:extLst>
-  </p:cSld>
-  <p:clrMapOvr>
-    <a:masterClrMapping/>
-  </p:clrMapOvr>
-</p:sld>
-</file>
-
-<file path=ppt/slides/slide13.xml><?xml version="1.0" encoding="utf-8"?>
-<p:sld xmlns:a="http://schemas.openxmlformats.org/drawingml/2006/main" xmlns:r="http://schemas.openxmlformats.org/officeDocument/2006/relationships" xmlns:p="http://schemas.openxmlformats.org/presentationml/2006/main">
-  <p:cSld>
-    <p:spTree>
-      <p:nvGrpSpPr>
-        <p:cNvPr id="1" name=""/>
-        <p:cNvGrpSpPr/>
-        <p:nvPr/>
-      </p:nvGrpSpPr>
-      <p:grpSpPr>
-        <a:xfrm>
-          <a:off x="0" y="0"/>
-          <a:ext cx="0" cy="0"/>
-          <a:chOff x="0" y="0"/>
-          <a:chExt cx="0" cy="0"/>
-        </a:xfrm>
-      </p:grpSpPr>
-      <p:sp>
-        <p:nvSpPr>
-          <p:cNvPr id="2" name="Titel 1"/>
-          <p:cNvSpPr>
-            <a:spLocks noGrp="1"/>
-          </p:cNvSpPr>
-          <p:nvPr>
-            <p:ph type="title"/>
-          </p:nvPr>
-        </p:nvSpPr>
-        <p:spPr/>
-        <p:txBody>
-          <a:bodyPr/>
-          <a:lstStyle/>
-          <a:p>
-            <a:r>
-              <a:rPr lang="de-DE" dirty="0"/>
-              <a:t>Hands-On</a:t>
-            </a:r>
-          </a:p>
-        </p:txBody>
-      </p:sp>
-      <p:pic>
-        <p:nvPicPr>
-          <p:cNvPr id="7" name="Bildplatzhalter 6" descr="Ein Bild, das ClipArt enthält.&#10;&#10;Mit hoher Zuverlässigkeit generierte Beschreibung">
-            <a:extLst>
-              <a:ext uri="{FF2B5EF4-FFF2-40B4-BE49-F238E27FC236}">
-                <a16:creationId xmlns:a16="http://schemas.microsoft.com/office/drawing/2014/main" id="{139C5A7F-A204-41EC-9889-C7B002A21534}"/>
-              </a:ext>
-            </a:extLst>
-          </p:cNvPr>
-          <p:cNvPicPr>
-            <a:picLocks noGrp="1" noChangeAspect="1"/>
-          </p:cNvPicPr>
-          <p:nvPr>
-            <p:ph type="pic" sz="quarter" idx="12"/>
-          </p:nvPr>
-        </p:nvPicPr>
-        <p:blipFill>
-          <a:blip r:embed="rId2">
-            <a:extLst>
-              <a:ext uri="{28A0092B-C50C-407E-A947-70E740481C1C}">
-                <a14:useLocalDpi xmlns:a14="http://schemas.microsoft.com/office/drawing/2010/main" val="0"/>
-              </a:ext>
-            </a:extLst>
-          </a:blip>
-          <a:srcRect t="6324" b="6324"/>
-          <a:stretch>
-            <a:fillRect/>
-          </a:stretch>
-        </p:blipFill>
-        <p:spPr/>
-      </p:pic>
-      <p:sp>
-        <p:nvSpPr>
-          <p:cNvPr id="5" name="Textplatzhalter 4"/>
-          <p:cNvSpPr>
-            <a:spLocks noGrp="1"/>
-          </p:cNvSpPr>
-          <p:nvPr>
-            <p:ph type="body" sz="quarter" idx="15"/>
-          </p:nvPr>
-        </p:nvSpPr>
-        <p:spPr/>
-        <p:txBody>
-          <a:bodyPr/>
-          <a:lstStyle/>
-          <a:p>
-            <a:endParaRPr lang="de-DE" dirty="0"/>
-          </a:p>
-        </p:txBody>
-      </p:sp>
-      <p:sp>
-        <p:nvSpPr>
-          <p:cNvPr id="8" name="Textplatzhalter 7">
-            <a:extLst>
-              <a:ext uri="{FF2B5EF4-FFF2-40B4-BE49-F238E27FC236}">
-                <a16:creationId xmlns:a16="http://schemas.microsoft.com/office/drawing/2014/main" id="{0F35EED6-E9E8-4369-860F-9927E646E322}"/>
-              </a:ext>
-            </a:extLst>
-          </p:cNvPr>
-          <p:cNvSpPr>
-            <a:spLocks noGrp="1"/>
-          </p:cNvSpPr>
-          <p:nvPr>
-            <p:ph type="body" sz="quarter" idx="13"/>
-          </p:nvPr>
-        </p:nvSpPr>
-        <p:spPr/>
-        <p:txBody>
-          <a:bodyPr/>
-          <a:lstStyle/>
-          <a:p>
-            <a:endParaRPr lang="de-DE"/>
-          </a:p>
-        </p:txBody>
-      </p:sp>
-      <p:sp>
-        <p:nvSpPr>
-          <p:cNvPr id="9" name="Rechteck 8">
-            <a:extLst>
-              <a:ext uri="{FF2B5EF4-FFF2-40B4-BE49-F238E27FC236}">
-                <a16:creationId xmlns:a16="http://schemas.microsoft.com/office/drawing/2014/main" id="{506E1D6F-3BAC-4497-A889-7A198D2BCB78}"/>
-              </a:ext>
-            </a:extLst>
-          </p:cNvPr>
-          <p:cNvSpPr/>
-          <p:nvPr/>
-        </p:nvSpPr>
-        <p:spPr>
-          <a:xfrm>
-            <a:off x="0" y="0"/>
-            <a:ext cx="9144000" cy="6858000"/>
-          </a:xfrm>
-          <a:prstGeom prst="rect">
-            <a:avLst/>
-          </a:prstGeom>
-          <a:solidFill>
-            <a:schemeClr val="accent1"/>
-          </a:solidFill>
-          <a:ln w="28575">
-            <a:solidFill>
-              <a:srgbClr val="C00000"/>
-            </a:solidFill>
-          </a:ln>
-        </p:spPr>
-        <p:style>
-          <a:lnRef idx="2">
-            <a:schemeClr val="accent1">
-              <a:shade val="50000"/>
-            </a:schemeClr>
-          </a:lnRef>
-          <a:fillRef idx="1">
-            <a:schemeClr val="accent1"/>
-          </a:fillRef>
-          <a:effectRef idx="0">
-            <a:schemeClr val="accent1"/>
-          </a:effectRef>
-          <a:fontRef idx="minor">
-            <a:schemeClr val="lt1"/>
-          </a:fontRef>
-        </p:style>
-        <p:txBody>
-          <a:bodyPr rtlCol="0" anchor="ctr"/>
-          <a:lstStyle/>
-          <a:p>
-            <a:pPr algn="ctr"/>
-            <a:endParaRPr lang="de-DE"/>
-          </a:p>
-        </p:txBody>
-      </p:sp>
-      <p:sp>
-        <p:nvSpPr>
-          <p:cNvPr id="10" name="Textfeld 9">
-            <a:extLst>
-              <a:ext uri="{FF2B5EF4-FFF2-40B4-BE49-F238E27FC236}">
-                <a16:creationId xmlns:a16="http://schemas.microsoft.com/office/drawing/2014/main" id="{37C63480-5CCD-4863-AB1B-3B79B6B2D69A}"/>
-              </a:ext>
-            </a:extLst>
-          </p:cNvPr>
-          <p:cNvSpPr txBox="1"/>
-          <p:nvPr/>
-        </p:nvSpPr>
-        <p:spPr>
-          <a:xfrm>
-            <a:off x="1619672" y="2348880"/>
-            <a:ext cx="6192688" cy="1569660"/>
-          </a:xfrm>
-          <a:prstGeom prst="rect">
-            <a:avLst/>
-          </a:prstGeom>
-          <a:noFill/>
-        </p:spPr>
-        <p:txBody>
-          <a:bodyPr wrap="square" rtlCol="0">
-            <a:spAutoFit/>
-          </a:bodyPr>
-          <a:lstStyle/>
-          <a:p>
-            <a:pPr>
-              <a:buClr>
-                <a:srgbClr val="C00000"/>
-              </a:buClr>
-            </a:pPr>
-            <a:r>
-              <a:rPr lang="de-DE" sz="9600" dirty="0">
-                <a:solidFill>
-                  <a:schemeClr val="bg1"/>
-                </a:solidFill>
-              </a:rPr>
-              <a:t>Feedback</a:t>
-            </a:r>
-          </a:p>
-        </p:txBody>
-      </p:sp>
-    </p:spTree>
-    <p:extLst>
-      <p:ext uri="{BB962C8B-B14F-4D97-AF65-F5344CB8AC3E}">
-        <p14:creationId xmlns:p14="http://schemas.microsoft.com/office/powerpoint/2010/main" val="2979316939"/>
-      </p:ext>
-    </p:extLst>
-  </p:cSld>
-  <p:clrMapOvr>
-    <a:masterClrMapping/>
-  </p:clrMapOvr>
-</p:sld>
-</file>
-
-<file path=ppt/slides/slide2.xml><?xml version="1.0" encoding="utf-8"?>
-<p:sld xmlns:a="http://schemas.openxmlformats.org/drawingml/2006/main" xmlns:r="http://schemas.openxmlformats.org/officeDocument/2006/relationships" xmlns:p="http://schemas.openxmlformats.org/presentationml/2006/main">
-  <p:cSld>
-    <p:spTree>
-      <p:nvGrpSpPr>
-        <p:cNvPr id="1" name=""/>
-        <p:cNvGrpSpPr/>
-        <p:nvPr/>
-      </p:nvGrpSpPr>
-      <p:grpSpPr>
-        <a:xfrm>
-          <a:off x="0" y="0"/>
-          <a:ext cx="0" cy="0"/>
-          <a:chOff x="0" y="0"/>
-          <a:chExt cx="0" cy="0"/>
-        </a:xfrm>
-      </p:grpSpPr>
-      <p:sp>
-        <p:nvSpPr>
-          <p:cNvPr id="5" name="Titel 4">
-            <a:extLst>
-              <a:ext uri="{FF2B5EF4-FFF2-40B4-BE49-F238E27FC236}">
-                <a16:creationId xmlns:a16="http://schemas.microsoft.com/office/drawing/2014/main" id="{FFA47E91-D080-4AEB-AC56-D41416F4C2FD}"/>
-              </a:ext>
-            </a:extLst>
-          </p:cNvPr>
-          <p:cNvSpPr>
-            <a:spLocks noGrp="1"/>
-          </p:cNvSpPr>
-          <p:nvPr>
-            <p:ph type="title"/>
-          </p:nvPr>
-        </p:nvSpPr>
-        <p:spPr/>
-        <p:txBody>
-          <a:bodyPr/>
-          <a:lstStyle/>
-          <a:p>
-            <a:r>
-              <a:rPr lang="de-DE" dirty="0"/>
-              <a:t>Check</a:t>
-            </a:r>
-          </a:p>
-        </p:txBody>
-      </p:sp>
-      <p:pic>
-        <p:nvPicPr>
-          <p:cNvPr id="11" name="Bildplatzhalter 10" descr="Ein Bild, das ClipArt enthält.&#10;&#10;Mit hoher Zuverlässigkeit generierte Beschreibung">
-            <a:extLst>
-              <a:ext uri="{FF2B5EF4-FFF2-40B4-BE49-F238E27FC236}">
-                <a16:creationId xmlns:a16="http://schemas.microsoft.com/office/drawing/2014/main" id="{EB69DEE8-73DA-483F-815D-66AA82DCE44A}"/>
-              </a:ext>
-            </a:extLst>
-          </p:cNvPr>
-          <p:cNvPicPr>
-            <a:picLocks noGrp="1" noChangeAspect="1"/>
-          </p:cNvPicPr>
-          <p:nvPr>
-            <p:ph type="pic" sz="quarter" idx="12"/>
-          </p:nvPr>
-        </p:nvPicPr>
-        <p:blipFill>
-          <a:blip r:embed="rId2">
-            <a:extLst>
-              <a:ext uri="{28A0092B-C50C-407E-A947-70E740481C1C}">
-                <a14:useLocalDpi xmlns:a14="http://schemas.microsoft.com/office/drawing/2010/main" val="0"/>
-              </a:ext>
-            </a:extLst>
-          </a:blip>
-          <a:srcRect t="6324" b="6324"/>
-          <a:stretch>
-            <a:fillRect/>
-          </a:stretch>
-        </p:blipFill>
-        <p:spPr/>
-      </p:pic>
-      <p:sp>
-        <p:nvSpPr>
-          <p:cNvPr id="7" name="Textplatzhalter 6">
-            <a:extLst>
-              <a:ext uri="{FF2B5EF4-FFF2-40B4-BE49-F238E27FC236}">
-                <a16:creationId xmlns:a16="http://schemas.microsoft.com/office/drawing/2014/main" id="{6F7E6FB1-BFCE-4167-AA6F-1C667BDE1CFA}"/>
-              </a:ext>
-            </a:extLst>
-          </p:cNvPr>
-          <p:cNvSpPr>
-            <a:spLocks noGrp="1"/>
-          </p:cNvSpPr>
-          <p:nvPr>
-            <p:ph type="body" sz="quarter" idx="13"/>
-          </p:nvPr>
-        </p:nvSpPr>
-        <p:spPr>
-          <a:xfrm>
-            <a:off x="791419" y="5136328"/>
-            <a:ext cx="7560518" cy="504104"/>
-          </a:xfrm>
-        </p:spPr>
-        <p:txBody>
-          <a:bodyPr/>
-          <a:lstStyle/>
-          <a:p>
-            <a:pPr marL="0" indent="0">
-              <a:buNone/>
-            </a:pPr>
-            <a:r>
-              <a:rPr lang="de-DE" dirty="0"/>
-              <a:t>Test: </a:t>
-            </a:r>
-            <a:r>
-              <a:rPr lang="de-DE" dirty="0" err="1"/>
-              <a:t>git</a:t>
-            </a:r>
-            <a:r>
-              <a:rPr lang="de-DE" dirty="0"/>
-              <a:t> </a:t>
-            </a:r>
-            <a:r>
-              <a:rPr lang="de-DE" dirty="0" err="1"/>
-              <a:t>bash</a:t>
-            </a:r>
-            <a:r>
-              <a:rPr lang="de-DE" dirty="0"/>
-              <a:t> oder die Kommandozeile öffnen und </a:t>
-            </a:r>
-            <a:r>
-              <a:rPr lang="de-DE" dirty="0" err="1">
-                <a:latin typeface="Courier New" panose="02070309020205020404" pitchFamily="49" charset="0"/>
-                <a:cs typeface="Courier New" panose="02070309020205020404" pitchFamily="49" charset="0"/>
-              </a:rPr>
-              <a:t>git</a:t>
-            </a:r>
-            <a:r>
-              <a:rPr lang="de-DE" dirty="0"/>
-              <a:t> eingeben</a:t>
-            </a:r>
-          </a:p>
-        </p:txBody>
-      </p:sp>
-      <p:sp>
-        <p:nvSpPr>
-          <p:cNvPr id="8" name="Textplatzhalter 7">
-            <a:extLst>
-              <a:ext uri="{FF2B5EF4-FFF2-40B4-BE49-F238E27FC236}">
-                <a16:creationId xmlns:a16="http://schemas.microsoft.com/office/drawing/2014/main" id="{0F0E9C74-A01A-4236-9478-B0AC9F13E040}"/>
-              </a:ext>
-            </a:extLst>
-          </p:cNvPr>
-          <p:cNvSpPr>
-            <a:spLocks noGrp="1"/>
-          </p:cNvSpPr>
-          <p:nvPr>
-            <p:ph type="body" sz="quarter" idx="15"/>
-          </p:nvPr>
-        </p:nvSpPr>
-        <p:spPr/>
-        <p:txBody>
-          <a:bodyPr/>
-          <a:lstStyle/>
-          <a:p>
-            <a:endParaRPr lang="de-DE" dirty="0"/>
-          </a:p>
-        </p:txBody>
-      </p:sp>
-      <p:sp>
-        <p:nvSpPr>
-          <p:cNvPr id="2" name="Rechteck: abgerundete Ecken 1">
-            <a:extLst>
-              <a:ext uri="{FF2B5EF4-FFF2-40B4-BE49-F238E27FC236}">
-                <a16:creationId xmlns:a16="http://schemas.microsoft.com/office/drawing/2014/main" id="{85A18FB1-7E99-41CE-A622-3BA1A6193F3D}"/>
-              </a:ext>
-            </a:extLst>
-          </p:cNvPr>
-          <p:cNvSpPr/>
-          <p:nvPr/>
-        </p:nvSpPr>
-        <p:spPr>
-          <a:xfrm>
-            <a:off x="2447764" y="1845247"/>
-            <a:ext cx="4248472" cy="1564200"/>
-          </a:xfrm>
-          <a:prstGeom prst="roundRect">
-            <a:avLst/>
-          </a:prstGeom>
-          <a:noFill/>
-          <a:ln w="28575">
-            <a:solidFill>
-              <a:srgbClr val="C00000"/>
-            </a:solidFill>
-            <a:prstDash val="dash"/>
-          </a:ln>
-        </p:spPr>
-        <p:style>
-          <a:lnRef idx="2">
-            <a:schemeClr val="accent1">
-              <a:shade val="50000"/>
-            </a:schemeClr>
-          </a:lnRef>
-          <a:fillRef idx="1">
-            <a:schemeClr val="accent1"/>
-          </a:fillRef>
-          <a:effectRef idx="0">
-            <a:schemeClr val="accent1"/>
-          </a:effectRef>
-          <a:fontRef idx="minor">
-            <a:schemeClr val="lt1"/>
-          </a:fontRef>
-        </p:style>
-        <p:txBody>
-          <a:bodyPr rtlCol="0" anchor="ctr"/>
-          <a:lstStyle/>
-          <a:p>
-            <a:pPr algn="ctr"/>
-            <a:r>
-              <a:rPr lang="de-DE" sz="3200" dirty="0">
-                <a:solidFill>
-                  <a:schemeClr val="tx1"/>
-                </a:solidFill>
-              </a:rPr>
-              <a:t>Hat jeder </a:t>
-            </a:r>
-            <a:r>
-              <a:rPr lang="de-DE" sz="3200" dirty="0" err="1">
-                <a:solidFill>
-                  <a:schemeClr val="tx1"/>
-                </a:solidFill>
-              </a:rPr>
-              <a:t>git</a:t>
-            </a:r>
-            <a:r>
-              <a:rPr lang="de-DE" sz="3200" dirty="0">
-                <a:solidFill>
-                  <a:schemeClr val="tx1"/>
-                </a:solidFill>
-              </a:rPr>
-              <a:t> installiert?</a:t>
-            </a:r>
-          </a:p>
-        </p:txBody>
-      </p:sp>
-      <p:pic>
-        <p:nvPicPr>
-          <p:cNvPr id="4" name="Grafik 3">
-            <a:extLst>
-              <a:ext uri="{FF2B5EF4-FFF2-40B4-BE49-F238E27FC236}">
-                <a16:creationId xmlns:a16="http://schemas.microsoft.com/office/drawing/2014/main" id="{4FF2CF30-BBB1-40FC-BF49-E283B580431D}"/>
-              </a:ext>
-            </a:extLst>
-          </p:cNvPr>
-          <p:cNvPicPr>
-            <a:picLocks noChangeAspect="1"/>
-          </p:cNvPicPr>
-          <p:nvPr/>
-        </p:nvPicPr>
-        <p:blipFill>
-          <a:blip r:embed="rId3">
-            <a:extLst>
-              <a:ext uri="{28A0092B-C50C-407E-A947-70E740481C1C}">
-                <a14:useLocalDpi xmlns:a14="http://schemas.microsoft.com/office/drawing/2010/main" val="0"/>
-              </a:ext>
-            </a:extLst>
-          </a:blip>
-          <a:stretch>
-            <a:fillRect/>
-          </a:stretch>
-        </p:blipFill>
-        <p:spPr>
-          <a:xfrm>
-            <a:off x="2034925" y="1469620"/>
-            <a:ext cx="825677" cy="825677"/>
-          </a:xfrm>
-          <a:prstGeom prst="rect">
-            <a:avLst/>
-          </a:prstGeom>
-        </p:spPr>
-      </p:pic>
-    </p:spTree>
-    <p:extLst>
-      <p:ext uri="{BB962C8B-B14F-4D97-AF65-F5344CB8AC3E}">
-        <p14:creationId xmlns:p14="http://schemas.microsoft.com/office/powerpoint/2010/main" val="1096923965"/>
-      </p:ext>
-    </p:extLst>
-  </p:cSld>
-  <p:clrMapOvr>
-    <a:masterClrMapping/>
-  </p:clrMapOvr>
-</p:sld>
-</file>
-
-<file path=ppt/slides/slide3.xml><?xml version="1.0" encoding="utf-8"?>
-<p:sld xmlns:a="http://schemas.openxmlformats.org/drawingml/2006/main" xmlns:r="http://schemas.openxmlformats.org/officeDocument/2006/relationships" xmlns:p="http://schemas.openxmlformats.org/presentationml/2006/main">
-  <p:cSld>
-    <p:spTree>
-      <p:nvGrpSpPr>
-        <p:cNvPr id="1" name=""/>
-        <p:cNvGrpSpPr/>
-        <p:nvPr/>
-      </p:nvGrpSpPr>
-      <p:grpSpPr>
-        <a:xfrm>
-          <a:off x="0" y="0"/>
-          <a:ext cx="0" cy="0"/>
-          <a:chOff x="0" y="0"/>
-          <a:chExt cx="0" cy="0"/>
-        </a:xfrm>
-      </p:grpSpPr>
-      <p:sp>
-        <p:nvSpPr>
-          <p:cNvPr id="2" name="Titel 1"/>
-          <p:cNvSpPr>
-            <a:spLocks noGrp="1"/>
-          </p:cNvSpPr>
-          <p:nvPr>
-            <p:ph type="title"/>
-          </p:nvPr>
-        </p:nvSpPr>
-        <p:spPr/>
-        <p:txBody>
-          <a:bodyPr/>
-          <a:lstStyle/>
-          <a:p>
-            <a:r>
-              <a:rPr lang="de-DE" dirty="0"/>
-              <a:t>Einleitung</a:t>
-            </a:r>
-          </a:p>
-        </p:txBody>
-      </p:sp>
-      <p:pic>
-        <p:nvPicPr>
-          <p:cNvPr id="7" name="Bildplatzhalter 6" descr="Ein Bild, das ClipArt enthält.&#10;&#10;Mit hoher Zuverlässigkeit generierte Beschreibung">
-            <a:extLst>
-              <a:ext uri="{FF2B5EF4-FFF2-40B4-BE49-F238E27FC236}">
-                <a16:creationId xmlns:a16="http://schemas.microsoft.com/office/drawing/2014/main" id="{139C5A7F-A204-41EC-9889-C7B002A21534}"/>
-              </a:ext>
-            </a:extLst>
-          </p:cNvPr>
-          <p:cNvPicPr>
-            <a:picLocks noGrp="1" noChangeAspect="1"/>
-          </p:cNvPicPr>
-          <p:nvPr>
-            <p:ph type="pic" sz="quarter" idx="12"/>
-          </p:nvPr>
-        </p:nvPicPr>
-        <p:blipFill>
-          <a:blip r:embed="rId2">
-            <a:extLst>
-              <a:ext uri="{28A0092B-C50C-407E-A947-70E740481C1C}">
-                <a14:useLocalDpi xmlns:a14="http://schemas.microsoft.com/office/drawing/2010/main" val="0"/>
-              </a:ext>
-            </a:extLst>
-          </a:blip>
-          <a:srcRect t="6324" b="6324"/>
-          <a:stretch>
-            <a:fillRect/>
-          </a:stretch>
-        </p:blipFill>
-        <p:spPr/>
-      </p:pic>
-      <p:sp>
-        <p:nvSpPr>
-          <p:cNvPr id="4" name="Textplatzhalter 3"/>
-          <p:cNvSpPr>
-            <a:spLocks noGrp="1"/>
-          </p:cNvSpPr>
-          <p:nvPr>
-            <p:ph type="body" sz="quarter" idx="13"/>
-          </p:nvPr>
-        </p:nvSpPr>
-        <p:spPr/>
-        <p:txBody>
-          <a:bodyPr/>
-          <a:lstStyle/>
-          <a:p>
-            <a:r>
-              <a:rPr lang="de-DE" dirty="0"/>
-              <a:t>Supertolle </a:t>
-            </a:r>
-            <a:r>
-              <a:rPr lang="de-DE" dirty="0" err="1"/>
-              <a:t>Annelogie</a:t>
-            </a:r>
-            <a:endParaRPr lang="de-DE" dirty="0"/>
-          </a:p>
-        </p:txBody>
-      </p:sp>
-      <p:sp>
-        <p:nvSpPr>
-          <p:cNvPr id="5" name="Textplatzhalter 4"/>
-          <p:cNvSpPr>
-            <a:spLocks noGrp="1"/>
-          </p:cNvSpPr>
-          <p:nvPr>
-            <p:ph type="body" sz="quarter" idx="15"/>
-          </p:nvPr>
-        </p:nvSpPr>
-        <p:spPr/>
-        <p:txBody>
-          <a:bodyPr/>
-          <a:lstStyle/>
-          <a:p>
-            <a:r>
-              <a:rPr lang="de-DE" dirty="0"/>
-              <a:t>Analogie</a:t>
-            </a:r>
-          </a:p>
-        </p:txBody>
-      </p:sp>
-      <p:sp>
-        <p:nvSpPr>
-          <p:cNvPr id="3" name="Rechteck 2">
-            <a:extLst>
-              <a:ext uri="{FF2B5EF4-FFF2-40B4-BE49-F238E27FC236}">
-                <a16:creationId xmlns:a16="http://schemas.microsoft.com/office/drawing/2014/main" id="{7976462E-8EB9-46BE-9B9D-BC8AA42CBA20}"/>
-              </a:ext>
-            </a:extLst>
-          </p:cNvPr>
-          <p:cNvSpPr/>
-          <p:nvPr/>
-        </p:nvSpPr>
-        <p:spPr>
-          <a:xfrm>
-            <a:off x="0" y="0"/>
-            <a:ext cx="9144000" cy="6858000"/>
-          </a:xfrm>
-          <a:prstGeom prst="rect">
-            <a:avLst/>
-          </a:prstGeom>
-          <a:solidFill>
-            <a:schemeClr val="tx1"/>
-          </a:solidFill>
-          <a:ln w="28575">
-            <a:solidFill>
-              <a:schemeClr val="tx1"/>
-            </a:solidFill>
-          </a:ln>
-        </p:spPr>
-        <p:style>
-          <a:lnRef idx="2">
-            <a:schemeClr val="accent1">
-              <a:shade val="50000"/>
-            </a:schemeClr>
-          </a:lnRef>
-          <a:fillRef idx="1">
-            <a:schemeClr val="accent1"/>
-          </a:fillRef>
-          <a:effectRef idx="0">
-            <a:schemeClr val="accent1"/>
-          </a:effectRef>
-          <a:fontRef idx="minor">
-            <a:schemeClr val="lt1"/>
-          </a:fontRef>
-        </p:style>
-        <p:txBody>
-          <a:bodyPr rtlCol="0" anchor="ctr"/>
-          <a:lstStyle/>
-          <a:p>
-            <a:pPr algn="ctr"/>
-            <a:endParaRPr lang="de-DE"/>
-          </a:p>
-        </p:txBody>
-      </p:sp>
-    </p:spTree>
-    <p:extLst>
-      <p:ext uri="{BB962C8B-B14F-4D97-AF65-F5344CB8AC3E}">
-        <p14:creationId xmlns:p14="http://schemas.microsoft.com/office/powerpoint/2010/main" val="1848984826"/>
-      </p:ext>
-    </p:extLst>
-  </p:cSld>
-  <p:clrMapOvr>
-    <a:masterClrMapping/>
-  </p:clrMapOvr>
-</p:sld>
-</file>
-
-<file path=ppt/slides/slide4.xml><?xml version="1.0" encoding="utf-8"?>
 <p:sld xmlns:a="http://schemas.openxmlformats.org/drawingml/2006/main" xmlns:r="http://schemas.openxmlformats.org/officeDocument/2006/relationships" xmlns:p="http://schemas.openxmlformats.org/presentationml/2006/main">
   <p:cSld>
     <p:spTree>
@@ -13924,7 +12832,7 @@
 </p:sld>
 </file>
 
-<file path=ppt/slides/slide5.xml><?xml version="1.0" encoding="utf-8"?>
+<file path=ppt/slides/slide12.xml><?xml version="1.0" encoding="utf-8"?>
 <p:sld xmlns:a="http://schemas.openxmlformats.org/drawingml/2006/main" xmlns:r="http://schemas.openxmlformats.org/officeDocument/2006/relationships" xmlns:p="http://schemas.openxmlformats.org/presentationml/2006/main">
   <p:cSld>
     <p:spTree>
@@ -14152,7 +13060,7 @@
 </p:sld>
 </file>
 
-<file path=ppt/slides/slide6.xml><?xml version="1.0" encoding="utf-8"?>
+<file path=ppt/slides/slide13.xml><?xml version="1.0" encoding="utf-8"?>
 <p:sld xmlns:a="http://schemas.openxmlformats.org/drawingml/2006/main" xmlns:r="http://schemas.openxmlformats.org/officeDocument/2006/relationships" xmlns:p="http://schemas.openxmlformats.org/presentationml/2006/main">
   <p:cSld>
     <p:spTree>
@@ -14350,7 +13258,7 @@
 </p:sld>
 </file>
 
-<file path=ppt/slides/slide7.xml><?xml version="1.0" encoding="utf-8"?>
+<file path=ppt/slides/slide14.xml><?xml version="1.0" encoding="utf-8"?>
 <p:sld xmlns:a="http://schemas.openxmlformats.org/drawingml/2006/main" xmlns:r="http://schemas.openxmlformats.org/officeDocument/2006/relationships" xmlns:p="http://schemas.openxmlformats.org/presentationml/2006/main">
   <p:cSld>
     <p:spTree>
@@ -14564,7 +13472,7 @@
 </p:sld>
 </file>
 
-<file path=ppt/slides/slide8.xml><?xml version="1.0" encoding="utf-8"?>
+<file path=ppt/slides/slide15.xml><?xml version="1.0" encoding="utf-8"?>
 <p:sld xmlns:a="http://schemas.openxmlformats.org/drawingml/2006/main" xmlns:r="http://schemas.openxmlformats.org/officeDocument/2006/relationships" xmlns:p="http://schemas.openxmlformats.org/presentationml/2006/main">
   <p:cSld>
     <p:spTree>
@@ -14770,7 +13678,7 @@
 </p:sld>
 </file>
 
-<file path=ppt/slides/slide9.xml><?xml version="1.0" encoding="utf-8"?>
+<file path=ppt/slides/slide16.xml><?xml version="1.0" encoding="utf-8"?>
 <p:sld xmlns:a="http://schemas.openxmlformats.org/drawingml/2006/main" xmlns:r="http://schemas.openxmlformats.org/officeDocument/2006/relationships" xmlns:p="http://schemas.openxmlformats.org/presentationml/2006/main">
   <p:cSld>
     <p:spTree>
@@ -14962,6 +13870,2694 @@
     <p:extLst>
       <p:ext uri="{BB962C8B-B14F-4D97-AF65-F5344CB8AC3E}">
         <p14:creationId xmlns:p14="http://schemas.microsoft.com/office/powerpoint/2010/main" val="3565894616"/>
+      </p:ext>
+    </p:extLst>
+  </p:cSld>
+  <p:clrMapOvr>
+    <a:masterClrMapping/>
+  </p:clrMapOvr>
+</p:sld>
+</file>
+
+<file path=ppt/slides/slide17.xml><?xml version="1.0" encoding="utf-8"?>
+<p:sld xmlns:a="http://schemas.openxmlformats.org/drawingml/2006/main" xmlns:r="http://schemas.openxmlformats.org/officeDocument/2006/relationships" xmlns:p="http://schemas.openxmlformats.org/presentationml/2006/main">
+  <p:cSld>
+    <p:spTree>
+      <p:nvGrpSpPr>
+        <p:cNvPr id="1" name=""/>
+        <p:cNvGrpSpPr/>
+        <p:nvPr/>
+      </p:nvGrpSpPr>
+      <p:grpSpPr>
+        <a:xfrm>
+          <a:off x="0" y="0"/>
+          <a:ext cx="0" cy="0"/>
+          <a:chOff x="0" y="0"/>
+          <a:chExt cx="0" cy="0"/>
+        </a:xfrm>
+      </p:grpSpPr>
+      <p:sp>
+        <p:nvSpPr>
+          <p:cNvPr id="2" name="Titel 1"/>
+          <p:cNvSpPr>
+            <a:spLocks noGrp="1"/>
+          </p:cNvSpPr>
+          <p:nvPr>
+            <p:ph type="title"/>
+          </p:nvPr>
+        </p:nvSpPr>
+        <p:spPr/>
+        <p:txBody>
+          <a:bodyPr/>
+          <a:lstStyle/>
+          <a:p>
+            <a:r>
+              <a:rPr lang="de-DE" dirty="0"/>
+              <a:t>Hands-On</a:t>
+            </a:r>
+          </a:p>
+        </p:txBody>
+      </p:sp>
+      <p:pic>
+        <p:nvPicPr>
+          <p:cNvPr id="7" name="Bildplatzhalter 6" descr="Ein Bild, das ClipArt enthält.&#10;&#10;Mit hoher Zuverlässigkeit generierte Beschreibung">
+            <a:extLst>
+              <a:ext uri="{FF2B5EF4-FFF2-40B4-BE49-F238E27FC236}">
+                <a16:creationId xmlns:a16="http://schemas.microsoft.com/office/drawing/2014/main" id="{139C5A7F-A204-41EC-9889-C7B002A21534}"/>
+              </a:ext>
+            </a:extLst>
+          </p:cNvPr>
+          <p:cNvPicPr>
+            <a:picLocks noGrp="1" noChangeAspect="1"/>
+          </p:cNvPicPr>
+          <p:nvPr>
+            <p:ph type="pic" sz="quarter" idx="12"/>
+          </p:nvPr>
+        </p:nvPicPr>
+        <p:blipFill>
+          <a:blip r:embed="rId2">
+            <a:extLst>
+              <a:ext uri="{28A0092B-C50C-407E-A947-70E740481C1C}">
+                <a14:useLocalDpi xmlns:a14="http://schemas.microsoft.com/office/drawing/2010/main" val="0"/>
+              </a:ext>
+            </a:extLst>
+          </a:blip>
+          <a:srcRect t="6324" b="6324"/>
+          <a:stretch>
+            <a:fillRect/>
+          </a:stretch>
+        </p:blipFill>
+        <p:spPr/>
+      </p:pic>
+      <p:sp>
+        <p:nvSpPr>
+          <p:cNvPr id="4" name="Textplatzhalter 3"/>
+          <p:cNvSpPr>
+            <a:spLocks noGrp="1"/>
+          </p:cNvSpPr>
+          <p:nvPr>
+            <p:ph type="body" sz="quarter" idx="13"/>
+          </p:nvPr>
+        </p:nvSpPr>
+        <p:spPr>
+          <a:xfrm>
+            <a:off x="1187624" y="2996952"/>
+            <a:ext cx="6769074" cy="1439689"/>
+          </a:xfrm>
+        </p:spPr>
+        <p:txBody>
+          <a:bodyPr>
+            <a:normAutofit fontScale="70000" lnSpcReduction="20000"/>
+          </a:bodyPr>
+          <a:lstStyle/>
+          <a:p>
+            <a:r>
+              <a:rPr lang="de-DE" dirty="0"/>
+              <a:t>Anne hat schon wieder (!!) das Bier zu einem gesunden Gemüse geändert. Direkt danach hat Philipp wichtige Änderungen an der Datei FB_Alle.txt gemacht und diese hochgeladen. Erst danach stellt er fest, dass sein Freund Herbert, den er in die Datei eingetragen hat, Spinat anstatt Bier bekommt! Da seine eigenen Änderungen so aufwändig sind, dass er sie nicht nochmal machen möchte, kommt ein </a:t>
+            </a:r>
+            <a:r>
+              <a:rPr lang="de-DE" dirty="0" err="1"/>
+              <a:t>reset</a:t>
+            </a:r>
+            <a:r>
+              <a:rPr lang="de-DE" dirty="0"/>
+              <a:t> nicht in Frage.  Was hätte er rückblickend besser machen können? </a:t>
+            </a:r>
+          </a:p>
+        </p:txBody>
+      </p:sp>
+      <p:sp>
+        <p:nvSpPr>
+          <p:cNvPr id="5" name="Textplatzhalter 4"/>
+          <p:cNvSpPr>
+            <a:spLocks noGrp="1"/>
+          </p:cNvSpPr>
+          <p:nvPr>
+            <p:ph type="body" sz="quarter" idx="15"/>
+          </p:nvPr>
+        </p:nvSpPr>
+        <p:spPr/>
+        <p:txBody>
+          <a:bodyPr/>
+          <a:lstStyle/>
+          <a:p>
+            <a:endParaRPr lang="de-DE" dirty="0"/>
+          </a:p>
+        </p:txBody>
+      </p:sp>
+      <p:sp>
+        <p:nvSpPr>
+          <p:cNvPr id="3" name="Rechteck: abgerundete Ecken 2">
+            <a:extLst>
+              <a:ext uri="{FF2B5EF4-FFF2-40B4-BE49-F238E27FC236}">
+                <a16:creationId xmlns:a16="http://schemas.microsoft.com/office/drawing/2014/main" id="{3CE9FA32-6D59-4CA8-9F8C-C7123564038F}"/>
+              </a:ext>
+            </a:extLst>
+          </p:cNvPr>
+          <p:cNvSpPr/>
+          <p:nvPr/>
+        </p:nvSpPr>
+        <p:spPr>
+          <a:xfrm>
+            <a:off x="1115294" y="1508400"/>
+            <a:ext cx="6912768" cy="1301304"/>
+          </a:xfrm>
+          <a:prstGeom prst="roundRect">
+            <a:avLst/>
+          </a:prstGeom>
+          <a:solidFill>
+            <a:schemeClr val="tx2">
+              <a:lumMod val="20000"/>
+              <a:lumOff val="80000"/>
+            </a:schemeClr>
+          </a:solidFill>
+          <a:ln w="28575">
+            <a:solidFill>
+              <a:srgbClr val="C00000"/>
+            </a:solidFill>
+          </a:ln>
+        </p:spPr>
+        <p:style>
+          <a:lnRef idx="2">
+            <a:schemeClr val="accent1">
+              <a:shade val="50000"/>
+            </a:schemeClr>
+          </a:lnRef>
+          <a:fillRef idx="1">
+            <a:schemeClr val="accent1"/>
+          </a:fillRef>
+          <a:effectRef idx="0">
+            <a:schemeClr val="accent1"/>
+          </a:effectRef>
+          <a:fontRef idx="minor">
+            <a:schemeClr val="lt1"/>
+          </a:fontRef>
+        </p:style>
+        <p:txBody>
+          <a:bodyPr rtlCol="0" anchor="ctr"/>
+          <a:lstStyle/>
+          <a:p>
+            <a:pPr algn="ctr"/>
+            <a:r>
+              <a:rPr lang="de-DE" sz="4800" dirty="0">
+                <a:solidFill>
+                  <a:schemeClr val="tx1"/>
+                </a:solidFill>
+              </a:rPr>
+              <a:t>Aufgabe 5</a:t>
+            </a:r>
+          </a:p>
+        </p:txBody>
+      </p:sp>
+    </p:spTree>
+    <p:extLst>
+      <p:ext uri="{BB962C8B-B14F-4D97-AF65-F5344CB8AC3E}">
+        <p14:creationId xmlns:p14="http://schemas.microsoft.com/office/powerpoint/2010/main" val="110835878"/>
+      </p:ext>
+    </p:extLst>
+  </p:cSld>
+  <p:clrMapOvr>
+    <a:masterClrMapping/>
+  </p:clrMapOvr>
+</p:sld>
+</file>
+
+<file path=ppt/slides/slide18.xml><?xml version="1.0" encoding="utf-8"?>
+<p:sld xmlns:a="http://schemas.openxmlformats.org/drawingml/2006/main" xmlns:r="http://schemas.openxmlformats.org/officeDocument/2006/relationships" xmlns:p="http://schemas.openxmlformats.org/presentationml/2006/main">
+  <p:cSld>
+    <p:spTree>
+      <p:nvGrpSpPr>
+        <p:cNvPr id="1" name=""/>
+        <p:cNvGrpSpPr/>
+        <p:nvPr/>
+      </p:nvGrpSpPr>
+      <p:grpSpPr>
+        <a:xfrm>
+          <a:off x="0" y="0"/>
+          <a:ext cx="0" cy="0"/>
+          <a:chOff x="0" y="0"/>
+          <a:chExt cx="0" cy="0"/>
+        </a:xfrm>
+      </p:grpSpPr>
+      <p:sp>
+        <p:nvSpPr>
+          <p:cNvPr id="2" name="Titel 1"/>
+          <p:cNvSpPr>
+            <a:spLocks noGrp="1"/>
+          </p:cNvSpPr>
+          <p:nvPr>
+            <p:ph type="title"/>
+          </p:nvPr>
+        </p:nvSpPr>
+        <p:spPr/>
+        <p:txBody>
+          <a:bodyPr/>
+          <a:lstStyle/>
+          <a:p>
+            <a:r>
+              <a:rPr lang="de-DE" dirty="0"/>
+              <a:t>Hands-On</a:t>
+            </a:r>
+          </a:p>
+        </p:txBody>
+      </p:sp>
+      <p:pic>
+        <p:nvPicPr>
+          <p:cNvPr id="7" name="Bildplatzhalter 6" descr="Ein Bild, das ClipArt enthält.&#10;&#10;Mit hoher Zuverlässigkeit generierte Beschreibung">
+            <a:extLst>
+              <a:ext uri="{FF2B5EF4-FFF2-40B4-BE49-F238E27FC236}">
+                <a16:creationId xmlns:a16="http://schemas.microsoft.com/office/drawing/2014/main" id="{139C5A7F-A204-41EC-9889-C7B002A21534}"/>
+              </a:ext>
+            </a:extLst>
+          </p:cNvPr>
+          <p:cNvPicPr>
+            <a:picLocks noGrp="1" noChangeAspect="1"/>
+          </p:cNvPicPr>
+          <p:nvPr>
+            <p:ph type="pic" sz="quarter" idx="12"/>
+          </p:nvPr>
+        </p:nvPicPr>
+        <p:blipFill>
+          <a:blip r:embed="rId2">
+            <a:extLst>
+              <a:ext uri="{28A0092B-C50C-407E-A947-70E740481C1C}">
+                <a14:useLocalDpi xmlns:a14="http://schemas.microsoft.com/office/drawing/2010/main" val="0"/>
+              </a:ext>
+            </a:extLst>
+          </a:blip>
+          <a:srcRect t="6324" b="6324"/>
+          <a:stretch>
+            <a:fillRect/>
+          </a:stretch>
+        </p:blipFill>
+        <p:spPr/>
+      </p:pic>
+      <p:sp>
+        <p:nvSpPr>
+          <p:cNvPr id="4" name="Textplatzhalter 3"/>
+          <p:cNvSpPr>
+            <a:spLocks noGrp="1"/>
+          </p:cNvSpPr>
+          <p:nvPr>
+            <p:ph type="body" sz="quarter" idx="13"/>
+          </p:nvPr>
+        </p:nvSpPr>
+        <p:spPr>
+          <a:xfrm>
+            <a:off x="1187624" y="2996952"/>
+            <a:ext cx="6769074" cy="1439689"/>
+          </a:xfrm>
+        </p:spPr>
+        <p:txBody>
+          <a:bodyPr>
+            <a:normAutofit/>
+          </a:bodyPr>
+          <a:lstStyle/>
+          <a:p>
+            <a:pPr marL="0" indent="0">
+              <a:buNone/>
+            </a:pPr>
+            <a:r>
+              <a:rPr lang="de-DE" dirty="0"/>
+              <a:t>Erstelle deinen eigenen Branch und trage in die ausführbare Datei dein Lieblingsgemüse ein.</a:t>
+            </a:r>
+          </a:p>
+        </p:txBody>
+      </p:sp>
+      <p:sp>
+        <p:nvSpPr>
+          <p:cNvPr id="5" name="Textplatzhalter 4"/>
+          <p:cNvSpPr>
+            <a:spLocks noGrp="1"/>
+          </p:cNvSpPr>
+          <p:nvPr>
+            <p:ph type="body" sz="quarter" idx="15"/>
+          </p:nvPr>
+        </p:nvSpPr>
+        <p:spPr/>
+        <p:txBody>
+          <a:bodyPr/>
+          <a:lstStyle/>
+          <a:p>
+            <a:endParaRPr lang="de-DE" dirty="0"/>
+          </a:p>
+        </p:txBody>
+      </p:sp>
+      <p:sp>
+        <p:nvSpPr>
+          <p:cNvPr id="3" name="Rechteck: abgerundete Ecken 2">
+            <a:extLst>
+              <a:ext uri="{FF2B5EF4-FFF2-40B4-BE49-F238E27FC236}">
+                <a16:creationId xmlns:a16="http://schemas.microsoft.com/office/drawing/2014/main" id="{3CE9FA32-6D59-4CA8-9F8C-C7123564038F}"/>
+              </a:ext>
+            </a:extLst>
+          </p:cNvPr>
+          <p:cNvSpPr/>
+          <p:nvPr/>
+        </p:nvSpPr>
+        <p:spPr>
+          <a:xfrm>
+            <a:off x="1115294" y="1508400"/>
+            <a:ext cx="6912768" cy="1301304"/>
+          </a:xfrm>
+          <a:prstGeom prst="roundRect">
+            <a:avLst/>
+          </a:prstGeom>
+          <a:solidFill>
+            <a:schemeClr val="tx2">
+              <a:lumMod val="20000"/>
+              <a:lumOff val="80000"/>
+            </a:schemeClr>
+          </a:solidFill>
+          <a:ln w="28575">
+            <a:solidFill>
+              <a:srgbClr val="C00000"/>
+            </a:solidFill>
+          </a:ln>
+        </p:spPr>
+        <p:style>
+          <a:lnRef idx="2">
+            <a:schemeClr val="accent1">
+              <a:shade val="50000"/>
+            </a:schemeClr>
+          </a:lnRef>
+          <a:fillRef idx="1">
+            <a:schemeClr val="accent1"/>
+          </a:fillRef>
+          <a:effectRef idx="0">
+            <a:schemeClr val="accent1"/>
+          </a:effectRef>
+          <a:fontRef idx="minor">
+            <a:schemeClr val="lt1"/>
+          </a:fontRef>
+        </p:style>
+        <p:txBody>
+          <a:bodyPr rtlCol="0" anchor="ctr"/>
+          <a:lstStyle/>
+          <a:p>
+            <a:pPr algn="ctr"/>
+            <a:r>
+              <a:rPr lang="de-DE" sz="4800" dirty="0">
+                <a:solidFill>
+                  <a:schemeClr val="tx1"/>
+                </a:solidFill>
+              </a:rPr>
+              <a:t>Aufgabe 6</a:t>
+            </a:r>
+          </a:p>
+        </p:txBody>
+      </p:sp>
+    </p:spTree>
+    <p:extLst>
+      <p:ext uri="{BB962C8B-B14F-4D97-AF65-F5344CB8AC3E}">
+        <p14:creationId xmlns:p14="http://schemas.microsoft.com/office/powerpoint/2010/main" val="1421577261"/>
+      </p:ext>
+    </p:extLst>
+  </p:cSld>
+  <p:clrMapOvr>
+    <a:masterClrMapping/>
+  </p:clrMapOvr>
+</p:sld>
+</file>
+
+<file path=ppt/slides/slide19.xml><?xml version="1.0" encoding="utf-8"?>
+<p:sld xmlns:a="http://schemas.openxmlformats.org/drawingml/2006/main" xmlns:r="http://schemas.openxmlformats.org/officeDocument/2006/relationships" xmlns:p="http://schemas.openxmlformats.org/presentationml/2006/main">
+  <p:cSld>
+    <p:spTree>
+      <p:nvGrpSpPr>
+        <p:cNvPr id="1" name=""/>
+        <p:cNvGrpSpPr/>
+        <p:nvPr/>
+      </p:nvGrpSpPr>
+      <p:grpSpPr>
+        <a:xfrm>
+          <a:off x="0" y="0"/>
+          <a:ext cx="0" cy="0"/>
+          <a:chOff x="0" y="0"/>
+          <a:chExt cx="0" cy="0"/>
+        </a:xfrm>
+      </p:grpSpPr>
+      <p:sp>
+        <p:nvSpPr>
+          <p:cNvPr id="2" name="Titel 1"/>
+          <p:cNvSpPr>
+            <a:spLocks noGrp="1"/>
+          </p:cNvSpPr>
+          <p:nvPr>
+            <p:ph type="title"/>
+          </p:nvPr>
+        </p:nvSpPr>
+        <p:spPr/>
+        <p:txBody>
+          <a:bodyPr/>
+          <a:lstStyle/>
+          <a:p>
+            <a:r>
+              <a:rPr lang="de-DE" dirty="0"/>
+              <a:t>Hands-On</a:t>
+            </a:r>
+          </a:p>
+        </p:txBody>
+      </p:sp>
+      <p:pic>
+        <p:nvPicPr>
+          <p:cNvPr id="7" name="Bildplatzhalter 6" descr="Ein Bild, das ClipArt enthält.&#10;&#10;Mit hoher Zuverlässigkeit generierte Beschreibung">
+            <a:extLst>
+              <a:ext uri="{FF2B5EF4-FFF2-40B4-BE49-F238E27FC236}">
+                <a16:creationId xmlns:a16="http://schemas.microsoft.com/office/drawing/2014/main" id="{139C5A7F-A204-41EC-9889-C7B002A21534}"/>
+              </a:ext>
+            </a:extLst>
+          </p:cNvPr>
+          <p:cNvPicPr>
+            <a:picLocks noGrp="1" noChangeAspect="1"/>
+          </p:cNvPicPr>
+          <p:nvPr>
+            <p:ph type="pic" sz="quarter" idx="12"/>
+          </p:nvPr>
+        </p:nvPicPr>
+        <p:blipFill>
+          <a:blip r:embed="rId2">
+            <a:extLst>
+              <a:ext uri="{28A0092B-C50C-407E-A947-70E740481C1C}">
+                <a14:useLocalDpi xmlns:a14="http://schemas.microsoft.com/office/drawing/2010/main" val="0"/>
+              </a:ext>
+            </a:extLst>
+          </a:blip>
+          <a:srcRect t="6324" b="6324"/>
+          <a:stretch>
+            <a:fillRect/>
+          </a:stretch>
+        </p:blipFill>
+        <p:spPr/>
+      </p:pic>
+      <p:sp>
+        <p:nvSpPr>
+          <p:cNvPr id="5" name="Textplatzhalter 4"/>
+          <p:cNvSpPr>
+            <a:spLocks noGrp="1"/>
+          </p:cNvSpPr>
+          <p:nvPr>
+            <p:ph type="body" sz="quarter" idx="15"/>
+          </p:nvPr>
+        </p:nvSpPr>
+        <p:spPr/>
+        <p:txBody>
+          <a:bodyPr/>
+          <a:lstStyle/>
+          <a:p>
+            <a:endParaRPr lang="de-DE" dirty="0"/>
+          </a:p>
+        </p:txBody>
+      </p:sp>
+      <p:sp>
+        <p:nvSpPr>
+          <p:cNvPr id="8" name="Textplatzhalter 7">
+            <a:extLst>
+              <a:ext uri="{FF2B5EF4-FFF2-40B4-BE49-F238E27FC236}">
+                <a16:creationId xmlns:a16="http://schemas.microsoft.com/office/drawing/2014/main" id="{0F35EED6-E9E8-4369-860F-9927E646E322}"/>
+              </a:ext>
+            </a:extLst>
+          </p:cNvPr>
+          <p:cNvSpPr>
+            <a:spLocks noGrp="1"/>
+          </p:cNvSpPr>
+          <p:nvPr>
+            <p:ph type="body" sz="quarter" idx="13"/>
+          </p:nvPr>
+        </p:nvSpPr>
+        <p:spPr/>
+        <p:txBody>
+          <a:bodyPr/>
+          <a:lstStyle/>
+          <a:p>
+            <a:endParaRPr lang="de-DE"/>
+          </a:p>
+        </p:txBody>
+      </p:sp>
+      <p:sp>
+        <p:nvSpPr>
+          <p:cNvPr id="9" name="Rechteck 8">
+            <a:extLst>
+              <a:ext uri="{FF2B5EF4-FFF2-40B4-BE49-F238E27FC236}">
+                <a16:creationId xmlns:a16="http://schemas.microsoft.com/office/drawing/2014/main" id="{506E1D6F-3BAC-4497-A889-7A198D2BCB78}"/>
+              </a:ext>
+            </a:extLst>
+          </p:cNvPr>
+          <p:cNvSpPr/>
+          <p:nvPr/>
+        </p:nvSpPr>
+        <p:spPr>
+          <a:xfrm>
+            <a:off x="0" y="0"/>
+            <a:ext cx="9144000" cy="6858000"/>
+          </a:xfrm>
+          <a:prstGeom prst="rect">
+            <a:avLst/>
+          </a:prstGeom>
+          <a:solidFill>
+            <a:schemeClr val="accent1"/>
+          </a:solidFill>
+          <a:ln w="28575">
+            <a:solidFill>
+              <a:srgbClr val="C00000"/>
+            </a:solidFill>
+          </a:ln>
+        </p:spPr>
+        <p:style>
+          <a:lnRef idx="2">
+            <a:schemeClr val="accent1">
+              <a:shade val="50000"/>
+            </a:schemeClr>
+          </a:lnRef>
+          <a:fillRef idx="1">
+            <a:schemeClr val="accent1"/>
+          </a:fillRef>
+          <a:effectRef idx="0">
+            <a:schemeClr val="accent1"/>
+          </a:effectRef>
+          <a:fontRef idx="minor">
+            <a:schemeClr val="lt1"/>
+          </a:fontRef>
+        </p:style>
+        <p:txBody>
+          <a:bodyPr rtlCol="0" anchor="ctr"/>
+          <a:lstStyle/>
+          <a:p>
+            <a:pPr algn="ctr"/>
+            <a:endParaRPr lang="de-DE"/>
+          </a:p>
+        </p:txBody>
+      </p:sp>
+      <p:sp>
+        <p:nvSpPr>
+          <p:cNvPr id="10" name="Textfeld 9">
+            <a:extLst>
+              <a:ext uri="{FF2B5EF4-FFF2-40B4-BE49-F238E27FC236}">
+                <a16:creationId xmlns:a16="http://schemas.microsoft.com/office/drawing/2014/main" id="{37C63480-5CCD-4863-AB1B-3B79B6B2D69A}"/>
+              </a:ext>
+            </a:extLst>
+          </p:cNvPr>
+          <p:cNvSpPr txBox="1"/>
+          <p:nvPr/>
+        </p:nvSpPr>
+        <p:spPr>
+          <a:xfrm>
+            <a:off x="1619672" y="2348880"/>
+            <a:ext cx="6192688" cy="1862048"/>
+          </a:xfrm>
+          <a:prstGeom prst="rect">
+            <a:avLst/>
+          </a:prstGeom>
+          <a:noFill/>
+        </p:spPr>
+        <p:txBody>
+          <a:bodyPr wrap="square" rtlCol="0">
+            <a:spAutoFit/>
+          </a:bodyPr>
+          <a:lstStyle/>
+          <a:p>
+            <a:pPr>
+              <a:buClr>
+                <a:srgbClr val="C00000"/>
+              </a:buClr>
+            </a:pPr>
+            <a:r>
+              <a:rPr lang="de-DE" sz="11500" dirty="0">
+                <a:solidFill>
+                  <a:schemeClr val="bg1"/>
+                </a:solidFill>
+              </a:rPr>
+              <a:t>Fragen?</a:t>
+            </a:r>
+          </a:p>
+        </p:txBody>
+      </p:sp>
+    </p:spTree>
+    <p:extLst>
+      <p:ext uri="{BB962C8B-B14F-4D97-AF65-F5344CB8AC3E}">
+        <p14:creationId xmlns:p14="http://schemas.microsoft.com/office/powerpoint/2010/main" val="3297582077"/>
+      </p:ext>
+    </p:extLst>
+  </p:cSld>
+  <p:clrMapOvr>
+    <a:masterClrMapping/>
+  </p:clrMapOvr>
+</p:sld>
+</file>
+
+<file path=ppt/slides/slide2.xml><?xml version="1.0" encoding="utf-8"?>
+<p:sld xmlns:a="http://schemas.openxmlformats.org/drawingml/2006/main" xmlns:r="http://schemas.openxmlformats.org/officeDocument/2006/relationships" xmlns:p="http://schemas.openxmlformats.org/presentationml/2006/main">
+  <p:cSld>
+    <p:spTree>
+      <p:nvGrpSpPr>
+        <p:cNvPr id="1" name=""/>
+        <p:cNvGrpSpPr/>
+        <p:nvPr/>
+      </p:nvGrpSpPr>
+      <p:grpSpPr>
+        <a:xfrm>
+          <a:off x="0" y="0"/>
+          <a:ext cx="0" cy="0"/>
+          <a:chOff x="0" y="0"/>
+          <a:chExt cx="0" cy="0"/>
+        </a:xfrm>
+      </p:grpSpPr>
+      <p:sp>
+        <p:nvSpPr>
+          <p:cNvPr id="5" name="Titel 4">
+            <a:extLst>
+              <a:ext uri="{FF2B5EF4-FFF2-40B4-BE49-F238E27FC236}">
+                <a16:creationId xmlns:a16="http://schemas.microsoft.com/office/drawing/2014/main" id="{FFA47E91-D080-4AEB-AC56-D41416F4C2FD}"/>
+              </a:ext>
+            </a:extLst>
+          </p:cNvPr>
+          <p:cNvSpPr>
+            <a:spLocks noGrp="1"/>
+          </p:cNvSpPr>
+          <p:nvPr>
+            <p:ph type="title"/>
+          </p:nvPr>
+        </p:nvSpPr>
+        <p:spPr/>
+        <p:txBody>
+          <a:bodyPr/>
+          <a:lstStyle/>
+          <a:p>
+            <a:r>
+              <a:rPr lang="de-DE" dirty="0"/>
+              <a:t>Check</a:t>
+            </a:r>
+          </a:p>
+        </p:txBody>
+      </p:sp>
+      <p:pic>
+        <p:nvPicPr>
+          <p:cNvPr id="11" name="Bildplatzhalter 10" descr="Ein Bild, das ClipArt enthält.&#10;&#10;Mit hoher Zuverlässigkeit generierte Beschreibung">
+            <a:extLst>
+              <a:ext uri="{FF2B5EF4-FFF2-40B4-BE49-F238E27FC236}">
+                <a16:creationId xmlns:a16="http://schemas.microsoft.com/office/drawing/2014/main" id="{EB69DEE8-73DA-483F-815D-66AA82DCE44A}"/>
+              </a:ext>
+            </a:extLst>
+          </p:cNvPr>
+          <p:cNvPicPr>
+            <a:picLocks noGrp="1" noChangeAspect="1"/>
+          </p:cNvPicPr>
+          <p:nvPr>
+            <p:ph type="pic" sz="quarter" idx="12"/>
+          </p:nvPr>
+        </p:nvPicPr>
+        <p:blipFill>
+          <a:blip r:embed="rId2">
+            <a:extLst>
+              <a:ext uri="{28A0092B-C50C-407E-A947-70E740481C1C}">
+                <a14:useLocalDpi xmlns:a14="http://schemas.microsoft.com/office/drawing/2010/main" val="0"/>
+              </a:ext>
+            </a:extLst>
+          </a:blip>
+          <a:srcRect t="6324" b="6324"/>
+          <a:stretch>
+            <a:fillRect/>
+          </a:stretch>
+        </p:blipFill>
+        <p:spPr/>
+      </p:pic>
+      <p:sp>
+        <p:nvSpPr>
+          <p:cNvPr id="7" name="Textplatzhalter 6">
+            <a:extLst>
+              <a:ext uri="{FF2B5EF4-FFF2-40B4-BE49-F238E27FC236}">
+                <a16:creationId xmlns:a16="http://schemas.microsoft.com/office/drawing/2014/main" id="{6F7E6FB1-BFCE-4167-AA6F-1C667BDE1CFA}"/>
+              </a:ext>
+            </a:extLst>
+          </p:cNvPr>
+          <p:cNvSpPr>
+            <a:spLocks noGrp="1"/>
+          </p:cNvSpPr>
+          <p:nvPr>
+            <p:ph type="body" sz="quarter" idx="13"/>
+          </p:nvPr>
+        </p:nvSpPr>
+        <p:spPr>
+          <a:xfrm>
+            <a:off x="791419" y="5136328"/>
+            <a:ext cx="7560518" cy="504104"/>
+          </a:xfrm>
+        </p:spPr>
+        <p:txBody>
+          <a:bodyPr/>
+          <a:lstStyle/>
+          <a:p>
+            <a:pPr marL="0" indent="0">
+              <a:buNone/>
+            </a:pPr>
+            <a:r>
+              <a:rPr lang="de-DE" dirty="0"/>
+              <a:t>Test: </a:t>
+            </a:r>
+            <a:r>
+              <a:rPr lang="de-DE" dirty="0" err="1"/>
+              <a:t>git</a:t>
+            </a:r>
+            <a:r>
+              <a:rPr lang="de-DE" dirty="0"/>
+              <a:t> </a:t>
+            </a:r>
+            <a:r>
+              <a:rPr lang="de-DE" dirty="0" err="1"/>
+              <a:t>bash</a:t>
+            </a:r>
+            <a:r>
+              <a:rPr lang="de-DE" dirty="0"/>
+              <a:t> oder die Kommandozeile öffnen und </a:t>
+            </a:r>
+            <a:r>
+              <a:rPr lang="de-DE" dirty="0" err="1">
+                <a:latin typeface="Courier New" panose="02070309020205020404" pitchFamily="49" charset="0"/>
+                <a:cs typeface="Courier New" panose="02070309020205020404" pitchFamily="49" charset="0"/>
+              </a:rPr>
+              <a:t>git</a:t>
+            </a:r>
+            <a:r>
+              <a:rPr lang="de-DE" dirty="0"/>
+              <a:t> eingeben</a:t>
+            </a:r>
+          </a:p>
+        </p:txBody>
+      </p:sp>
+      <p:sp>
+        <p:nvSpPr>
+          <p:cNvPr id="8" name="Textplatzhalter 7">
+            <a:extLst>
+              <a:ext uri="{FF2B5EF4-FFF2-40B4-BE49-F238E27FC236}">
+                <a16:creationId xmlns:a16="http://schemas.microsoft.com/office/drawing/2014/main" id="{0F0E9C74-A01A-4236-9478-B0AC9F13E040}"/>
+              </a:ext>
+            </a:extLst>
+          </p:cNvPr>
+          <p:cNvSpPr>
+            <a:spLocks noGrp="1"/>
+          </p:cNvSpPr>
+          <p:nvPr>
+            <p:ph type="body" sz="quarter" idx="15"/>
+          </p:nvPr>
+        </p:nvSpPr>
+        <p:spPr/>
+        <p:txBody>
+          <a:bodyPr/>
+          <a:lstStyle/>
+          <a:p>
+            <a:endParaRPr lang="de-DE" dirty="0"/>
+          </a:p>
+        </p:txBody>
+      </p:sp>
+      <p:sp>
+        <p:nvSpPr>
+          <p:cNvPr id="2" name="Rechteck: abgerundete Ecken 1">
+            <a:extLst>
+              <a:ext uri="{FF2B5EF4-FFF2-40B4-BE49-F238E27FC236}">
+                <a16:creationId xmlns:a16="http://schemas.microsoft.com/office/drawing/2014/main" id="{85A18FB1-7E99-41CE-A622-3BA1A6193F3D}"/>
+              </a:ext>
+            </a:extLst>
+          </p:cNvPr>
+          <p:cNvSpPr/>
+          <p:nvPr/>
+        </p:nvSpPr>
+        <p:spPr>
+          <a:xfrm>
+            <a:off x="2447764" y="1845247"/>
+            <a:ext cx="4248472" cy="1564200"/>
+          </a:xfrm>
+          <a:prstGeom prst="roundRect">
+            <a:avLst/>
+          </a:prstGeom>
+          <a:noFill/>
+          <a:ln w="28575">
+            <a:solidFill>
+              <a:srgbClr val="C00000"/>
+            </a:solidFill>
+            <a:prstDash val="dash"/>
+          </a:ln>
+        </p:spPr>
+        <p:style>
+          <a:lnRef idx="2">
+            <a:schemeClr val="accent1">
+              <a:shade val="50000"/>
+            </a:schemeClr>
+          </a:lnRef>
+          <a:fillRef idx="1">
+            <a:schemeClr val="accent1"/>
+          </a:fillRef>
+          <a:effectRef idx="0">
+            <a:schemeClr val="accent1"/>
+          </a:effectRef>
+          <a:fontRef idx="minor">
+            <a:schemeClr val="lt1"/>
+          </a:fontRef>
+        </p:style>
+        <p:txBody>
+          <a:bodyPr rtlCol="0" anchor="ctr"/>
+          <a:lstStyle/>
+          <a:p>
+            <a:pPr algn="ctr"/>
+            <a:r>
+              <a:rPr lang="de-DE" sz="3200" dirty="0">
+                <a:solidFill>
+                  <a:schemeClr val="tx1"/>
+                </a:solidFill>
+              </a:rPr>
+              <a:t>Hat jeder </a:t>
+            </a:r>
+            <a:r>
+              <a:rPr lang="de-DE" sz="3200" dirty="0" err="1">
+                <a:solidFill>
+                  <a:schemeClr val="tx1"/>
+                </a:solidFill>
+              </a:rPr>
+              <a:t>git</a:t>
+            </a:r>
+            <a:r>
+              <a:rPr lang="de-DE" sz="3200" dirty="0">
+                <a:solidFill>
+                  <a:schemeClr val="tx1"/>
+                </a:solidFill>
+              </a:rPr>
+              <a:t> installiert?</a:t>
+            </a:r>
+          </a:p>
+        </p:txBody>
+      </p:sp>
+      <p:pic>
+        <p:nvPicPr>
+          <p:cNvPr id="4" name="Grafik 3">
+            <a:extLst>
+              <a:ext uri="{FF2B5EF4-FFF2-40B4-BE49-F238E27FC236}">
+                <a16:creationId xmlns:a16="http://schemas.microsoft.com/office/drawing/2014/main" id="{4FF2CF30-BBB1-40FC-BF49-E283B580431D}"/>
+              </a:ext>
+            </a:extLst>
+          </p:cNvPr>
+          <p:cNvPicPr>
+            <a:picLocks noChangeAspect="1"/>
+          </p:cNvPicPr>
+          <p:nvPr/>
+        </p:nvPicPr>
+        <p:blipFill>
+          <a:blip r:embed="rId3">
+            <a:extLst>
+              <a:ext uri="{28A0092B-C50C-407E-A947-70E740481C1C}">
+                <a14:useLocalDpi xmlns:a14="http://schemas.microsoft.com/office/drawing/2010/main" val="0"/>
+              </a:ext>
+            </a:extLst>
+          </a:blip>
+          <a:stretch>
+            <a:fillRect/>
+          </a:stretch>
+        </p:blipFill>
+        <p:spPr>
+          <a:xfrm>
+            <a:off x="2034925" y="1469620"/>
+            <a:ext cx="825677" cy="825677"/>
+          </a:xfrm>
+          <a:prstGeom prst="rect">
+            <a:avLst/>
+          </a:prstGeom>
+        </p:spPr>
+      </p:pic>
+    </p:spTree>
+    <p:extLst>
+      <p:ext uri="{BB962C8B-B14F-4D97-AF65-F5344CB8AC3E}">
+        <p14:creationId xmlns:p14="http://schemas.microsoft.com/office/powerpoint/2010/main" val="1096923965"/>
+      </p:ext>
+    </p:extLst>
+  </p:cSld>
+  <p:clrMapOvr>
+    <a:masterClrMapping/>
+  </p:clrMapOvr>
+</p:sld>
+</file>
+
+<file path=ppt/slides/slide20.xml><?xml version="1.0" encoding="utf-8"?>
+<p:sld xmlns:a="http://schemas.openxmlformats.org/drawingml/2006/main" xmlns:r="http://schemas.openxmlformats.org/officeDocument/2006/relationships" xmlns:p="http://schemas.openxmlformats.org/presentationml/2006/main">
+  <p:cSld>
+    <p:spTree>
+      <p:nvGrpSpPr>
+        <p:cNvPr id="1" name=""/>
+        <p:cNvGrpSpPr/>
+        <p:nvPr/>
+      </p:nvGrpSpPr>
+      <p:grpSpPr>
+        <a:xfrm>
+          <a:off x="0" y="0"/>
+          <a:ext cx="0" cy="0"/>
+          <a:chOff x="0" y="0"/>
+          <a:chExt cx="0" cy="0"/>
+        </a:xfrm>
+      </p:grpSpPr>
+      <p:sp>
+        <p:nvSpPr>
+          <p:cNvPr id="2" name="Titel 1"/>
+          <p:cNvSpPr>
+            <a:spLocks noGrp="1"/>
+          </p:cNvSpPr>
+          <p:nvPr>
+            <p:ph type="title"/>
+          </p:nvPr>
+        </p:nvSpPr>
+        <p:spPr/>
+        <p:txBody>
+          <a:bodyPr/>
+          <a:lstStyle/>
+          <a:p>
+            <a:r>
+              <a:rPr lang="de-DE" dirty="0"/>
+              <a:t>Hands-On</a:t>
+            </a:r>
+          </a:p>
+        </p:txBody>
+      </p:sp>
+      <p:pic>
+        <p:nvPicPr>
+          <p:cNvPr id="7" name="Bildplatzhalter 6" descr="Ein Bild, das ClipArt enthält.&#10;&#10;Mit hoher Zuverlässigkeit generierte Beschreibung">
+            <a:extLst>
+              <a:ext uri="{FF2B5EF4-FFF2-40B4-BE49-F238E27FC236}">
+                <a16:creationId xmlns:a16="http://schemas.microsoft.com/office/drawing/2014/main" id="{139C5A7F-A204-41EC-9889-C7B002A21534}"/>
+              </a:ext>
+            </a:extLst>
+          </p:cNvPr>
+          <p:cNvPicPr>
+            <a:picLocks noGrp="1" noChangeAspect="1"/>
+          </p:cNvPicPr>
+          <p:nvPr>
+            <p:ph type="pic" sz="quarter" idx="12"/>
+          </p:nvPr>
+        </p:nvPicPr>
+        <p:blipFill>
+          <a:blip r:embed="rId2">
+            <a:extLst>
+              <a:ext uri="{28A0092B-C50C-407E-A947-70E740481C1C}">
+                <a14:useLocalDpi xmlns:a14="http://schemas.microsoft.com/office/drawing/2010/main" val="0"/>
+              </a:ext>
+            </a:extLst>
+          </a:blip>
+          <a:srcRect t="6324" b="6324"/>
+          <a:stretch>
+            <a:fillRect/>
+          </a:stretch>
+        </p:blipFill>
+        <p:spPr/>
+      </p:pic>
+      <p:sp>
+        <p:nvSpPr>
+          <p:cNvPr id="5" name="Textplatzhalter 4"/>
+          <p:cNvSpPr>
+            <a:spLocks noGrp="1"/>
+          </p:cNvSpPr>
+          <p:nvPr>
+            <p:ph type="body" sz="quarter" idx="15"/>
+          </p:nvPr>
+        </p:nvSpPr>
+        <p:spPr/>
+        <p:txBody>
+          <a:bodyPr/>
+          <a:lstStyle/>
+          <a:p>
+            <a:endParaRPr lang="de-DE" dirty="0"/>
+          </a:p>
+        </p:txBody>
+      </p:sp>
+      <p:sp>
+        <p:nvSpPr>
+          <p:cNvPr id="8" name="Textplatzhalter 7">
+            <a:extLst>
+              <a:ext uri="{FF2B5EF4-FFF2-40B4-BE49-F238E27FC236}">
+                <a16:creationId xmlns:a16="http://schemas.microsoft.com/office/drawing/2014/main" id="{0F35EED6-E9E8-4369-860F-9927E646E322}"/>
+              </a:ext>
+            </a:extLst>
+          </p:cNvPr>
+          <p:cNvSpPr>
+            <a:spLocks noGrp="1"/>
+          </p:cNvSpPr>
+          <p:nvPr>
+            <p:ph type="body" sz="quarter" idx="13"/>
+          </p:nvPr>
+        </p:nvSpPr>
+        <p:spPr/>
+        <p:txBody>
+          <a:bodyPr/>
+          <a:lstStyle/>
+          <a:p>
+            <a:endParaRPr lang="de-DE"/>
+          </a:p>
+        </p:txBody>
+      </p:sp>
+      <p:sp>
+        <p:nvSpPr>
+          <p:cNvPr id="9" name="Rechteck 8">
+            <a:extLst>
+              <a:ext uri="{FF2B5EF4-FFF2-40B4-BE49-F238E27FC236}">
+                <a16:creationId xmlns:a16="http://schemas.microsoft.com/office/drawing/2014/main" id="{506E1D6F-3BAC-4497-A889-7A198D2BCB78}"/>
+              </a:ext>
+            </a:extLst>
+          </p:cNvPr>
+          <p:cNvSpPr/>
+          <p:nvPr/>
+        </p:nvSpPr>
+        <p:spPr>
+          <a:xfrm>
+            <a:off x="0" y="0"/>
+            <a:ext cx="9144000" cy="6858000"/>
+          </a:xfrm>
+          <a:prstGeom prst="rect">
+            <a:avLst/>
+          </a:prstGeom>
+          <a:solidFill>
+            <a:schemeClr val="accent1"/>
+          </a:solidFill>
+          <a:ln w="28575">
+            <a:solidFill>
+              <a:srgbClr val="C00000"/>
+            </a:solidFill>
+          </a:ln>
+        </p:spPr>
+        <p:style>
+          <a:lnRef idx="2">
+            <a:schemeClr val="accent1">
+              <a:shade val="50000"/>
+            </a:schemeClr>
+          </a:lnRef>
+          <a:fillRef idx="1">
+            <a:schemeClr val="accent1"/>
+          </a:fillRef>
+          <a:effectRef idx="0">
+            <a:schemeClr val="accent1"/>
+          </a:effectRef>
+          <a:fontRef idx="minor">
+            <a:schemeClr val="lt1"/>
+          </a:fontRef>
+        </p:style>
+        <p:txBody>
+          <a:bodyPr rtlCol="0" anchor="ctr"/>
+          <a:lstStyle/>
+          <a:p>
+            <a:pPr algn="ctr"/>
+            <a:endParaRPr lang="de-DE"/>
+          </a:p>
+        </p:txBody>
+      </p:sp>
+      <p:sp>
+        <p:nvSpPr>
+          <p:cNvPr id="10" name="Textfeld 9">
+            <a:extLst>
+              <a:ext uri="{FF2B5EF4-FFF2-40B4-BE49-F238E27FC236}">
+                <a16:creationId xmlns:a16="http://schemas.microsoft.com/office/drawing/2014/main" id="{37C63480-5CCD-4863-AB1B-3B79B6B2D69A}"/>
+              </a:ext>
+            </a:extLst>
+          </p:cNvPr>
+          <p:cNvSpPr txBox="1"/>
+          <p:nvPr/>
+        </p:nvSpPr>
+        <p:spPr>
+          <a:xfrm>
+            <a:off x="1619672" y="2348880"/>
+            <a:ext cx="6192688" cy="1569660"/>
+          </a:xfrm>
+          <a:prstGeom prst="rect">
+            <a:avLst/>
+          </a:prstGeom>
+          <a:noFill/>
+        </p:spPr>
+        <p:txBody>
+          <a:bodyPr wrap="square" rtlCol="0">
+            <a:spAutoFit/>
+          </a:bodyPr>
+          <a:lstStyle/>
+          <a:p>
+            <a:pPr>
+              <a:buClr>
+                <a:srgbClr val="C00000"/>
+              </a:buClr>
+            </a:pPr>
+            <a:r>
+              <a:rPr lang="de-DE" sz="9600" dirty="0">
+                <a:solidFill>
+                  <a:schemeClr val="bg1"/>
+                </a:solidFill>
+              </a:rPr>
+              <a:t>Feedback</a:t>
+            </a:r>
+          </a:p>
+        </p:txBody>
+      </p:sp>
+    </p:spTree>
+    <p:extLst>
+      <p:ext uri="{BB962C8B-B14F-4D97-AF65-F5344CB8AC3E}">
+        <p14:creationId xmlns:p14="http://schemas.microsoft.com/office/powerpoint/2010/main" val="2979316939"/>
+      </p:ext>
+    </p:extLst>
+  </p:cSld>
+  <p:clrMapOvr>
+    <a:masterClrMapping/>
+  </p:clrMapOvr>
+</p:sld>
+</file>
+
+<file path=ppt/slides/slide3.xml><?xml version="1.0" encoding="utf-8"?>
+<p:sld xmlns:a="http://schemas.openxmlformats.org/drawingml/2006/main" xmlns:r="http://schemas.openxmlformats.org/officeDocument/2006/relationships" xmlns:p="http://schemas.openxmlformats.org/presentationml/2006/main">
+  <p:cSld>
+    <p:spTree>
+      <p:nvGrpSpPr>
+        <p:cNvPr id="1" name=""/>
+        <p:cNvGrpSpPr/>
+        <p:nvPr/>
+      </p:nvGrpSpPr>
+      <p:grpSpPr>
+        <a:xfrm>
+          <a:off x="0" y="0"/>
+          <a:ext cx="0" cy="0"/>
+          <a:chOff x="0" y="0"/>
+          <a:chExt cx="0" cy="0"/>
+        </a:xfrm>
+      </p:grpSpPr>
+      <p:sp>
+        <p:nvSpPr>
+          <p:cNvPr id="2" name="Titel 1"/>
+          <p:cNvSpPr>
+            <a:spLocks noGrp="1"/>
+          </p:cNvSpPr>
+          <p:nvPr>
+            <p:ph type="title"/>
+          </p:nvPr>
+        </p:nvSpPr>
+        <p:spPr/>
+        <p:txBody>
+          <a:bodyPr/>
+          <a:lstStyle/>
+          <a:p>
+            <a:r>
+              <a:rPr lang="de-DE" dirty="0"/>
+              <a:t>Einleitung</a:t>
+            </a:r>
+          </a:p>
+        </p:txBody>
+      </p:sp>
+      <p:pic>
+        <p:nvPicPr>
+          <p:cNvPr id="7" name="Bildplatzhalter 6" descr="Ein Bild, das ClipArt enthält.&#10;&#10;Mit hoher Zuverlässigkeit generierte Beschreibung">
+            <a:extLst>
+              <a:ext uri="{FF2B5EF4-FFF2-40B4-BE49-F238E27FC236}">
+                <a16:creationId xmlns:a16="http://schemas.microsoft.com/office/drawing/2014/main" id="{139C5A7F-A204-41EC-9889-C7B002A21534}"/>
+              </a:ext>
+            </a:extLst>
+          </p:cNvPr>
+          <p:cNvPicPr>
+            <a:picLocks noGrp="1" noChangeAspect="1"/>
+          </p:cNvPicPr>
+          <p:nvPr>
+            <p:ph type="pic" sz="quarter" idx="12"/>
+          </p:nvPr>
+        </p:nvPicPr>
+        <p:blipFill>
+          <a:blip r:embed="rId2">
+            <a:extLst>
+              <a:ext uri="{28A0092B-C50C-407E-A947-70E740481C1C}">
+                <a14:useLocalDpi xmlns:a14="http://schemas.microsoft.com/office/drawing/2010/main" val="0"/>
+              </a:ext>
+            </a:extLst>
+          </a:blip>
+          <a:srcRect t="6324" b="6324"/>
+          <a:stretch>
+            <a:fillRect/>
+          </a:stretch>
+        </p:blipFill>
+        <p:spPr/>
+      </p:pic>
+      <p:sp>
+        <p:nvSpPr>
+          <p:cNvPr id="4" name="Textplatzhalter 3"/>
+          <p:cNvSpPr>
+            <a:spLocks noGrp="1"/>
+          </p:cNvSpPr>
+          <p:nvPr>
+            <p:ph type="body" sz="quarter" idx="13"/>
+          </p:nvPr>
+        </p:nvSpPr>
+        <p:spPr/>
+        <p:txBody>
+          <a:bodyPr/>
+          <a:lstStyle/>
+          <a:p>
+            <a:r>
+              <a:rPr lang="de-DE" dirty="0"/>
+              <a:t>Supertolle </a:t>
+            </a:r>
+            <a:r>
+              <a:rPr lang="de-DE" dirty="0" err="1"/>
+              <a:t>Annelogie</a:t>
+            </a:r>
+            <a:endParaRPr lang="de-DE" dirty="0"/>
+          </a:p>
+        </p:txBody>
+      </p:sp>
+      <p:sp>
+        <p:nvSpPr>
+          <p:cNvPr id="5" name="Textplatzhalter 4"/>
+          <p:cNvSpPr>
+            <a:spLocks noGrp="1"/>
+          </p:cNvSpPr>
+          <p:nvPr>
+            <p:ph type="body" sz="quarter" idx="15"/>
+          </p:nvPr>
+        </p:nvSpPr>
+        <p:spPr/>
+        <p:txBody>
+          <a:bodyPr/>
+          <a:lstStyle/>
+          <a:p>
+            <a:r>
+              <a:rPr lang="de-DE" dirty="0"/>
+              <a:t>Analogie</a:t>
+            </a:r>
+          </a:p>
+        </p:txBody>
+      </p:sp>
+      <p:sp>
+        <p:nvSpPr>
+          <p:cNvPr id="3" name="Rechteck 2">
+            <a:extLst>
+              <a:ext uri="{FF2B5EF4-FFF2-40B4-BE49-F238E27FC236}">
+                <a16:creationId xmlns:a16="http://schemas.microsoft.com/office/drawing/2014/main" id="{7976462E-8EB9-46BE-9B9D-BC8AA42CBA20}"/>
+              </a:ext>
+            </a:extLst>
+          </p:cNvPr>
+          <p:cNvSpPr/>
+          <p:nvPr/>
+        </p:nvSpPr>
+        <p:spPr>
+          <a:xfrm>
+            <a:off x="0" y="0"/>
+            <a:ext cx="9144000" cy="6858000"/>
+          </a:xfrm>
+          <a:prstGeom prst="rect">
+            <a:avLst/>
+          </a:prstGeom>
+          <a:solidFill>
+            <a:schemeClr val="tx1"/>
+          </a:solidFill>
+          <a:ln w="28575">
+            <a:solidFill>
+              <a:schemeClr val="tx1"/>
+            </a:solidFill>
+          </a:ln>
+        </p:spPr>
+        <p:style>
+          <a:lnRef idx="2">
+            <a:schemeClr val="accent1">
+              <a:shade val="50000"/>
+            </a:schemeClr>
+          </a:lnRef>
+          <a:fillRef idx="1">
+            <a:schemeClr val="accent1"/>
+          </a:fillRef>
+          <a:effectRef idx="0">
+            <a:schemeClr val="accent1"/>
+          </a:effectRef>
+          <a:fontRef idx="minor">
+            <a:schemeClr val="lt1"/>
+          </a:fontRef>
+        </p:style>
+        <p:txBody>
+          <a:bodyPr rtlCol="0" anchor="ctr"/>
+          <a:lstStyle/>
+          <a:p>
+            <a:pPr algn="ctr"/>
+            <a:endParaRPr lang="de-DE"/>
+          </a:p>
+        </p:txBody>
+      </p:sp>
+    </p:spTree>
+    <p:extLst>
+      <p:ext uri="{BB962C8B-B14F-4D97-AF65-F5344CB8AC3E}">
+        <p14:creationId xmlns:p14="http://schemas.microsoft.com/office/powerpoint/2010/main" val="1848984826"/>
+      </p:ext>
+    </p:extLst>
+  </p:cSld>
+  <p:clrMapOvr>
+    <a:masterClrMapping/>
+  </p:clrMapOvr>
+</p:sld>
+</file>
+
+<file path=ppt/slides/slide4.xml><?xml version="1.0" encoding="utf-8"?>
+<p:sld xmlns:a="http://schemas.openxmlformats.org/drawingml/2006/main" xmlns:r="http://schemas.openxmlformats.org/officeDocument/2006/relationships" xmlns:p="http://schemas.openxmlformats.org/presentationml/2006/main">
+  <p:cSld>
+    <p:spTree>
+      <p:nvGrpSpPr>
+        <p:cNvPr id="1" name=""/>
+        <p:cNvGrpSpPr/>
+        <p:nvPr/>
+      </p:nvGrpSpPr>
+      <p:grpSpPr>
+        <a:xfrm>
+          <a:off x="0" y="0"/>
+          <a:ext cx="0" cy="0"/>
+          <a:chOff x="0" y="0"/>
+          <a:chExt cx="0" cy="0"/>
+        </a:xfrm>
+      </p:grpSpPr>
+      <p:sp>
+        <p:nvSpPr>
+          <p:cNvPr id="2" name="Titel 1"/>
+          <p:cNvSpPr>
+            <a:spLocks noGrp="1"/>
+          </p:cNvSpPr>
+          <p:nvPr>
+            <p:ph type="title"/>
+          </p:nvPr>
+        </p:nvSpPr>
+        <p:spPr/>
+        <p:txBody>
+          <a:bodyPr/>
+          <a:lstStyle/>
+          <a:p>
+            <a:r>
+              <a:rPr lang="de-DE" dirty="0"/>
+              <a:t>Einleitung</a:t>
+            </a:r>
+          </a:p>
+        </p:txBody>
+      </p:sp>
+      <p:pic>
+        <p:nvPicPr>
+          <p:cNvPr id="7" name="Bildplatzhalter 6" descr="Ein Bild, das ClipArt enthält.&#10;&#10;Mit hoher Zuverlässigkeit generierte Beschreibung">
+            <a:extLst>
+              <a:ext uri="{FF2B5EF4-FFF2-40B4-BE49-F238E27FC236}">
+                <a16:creationId xmlns:a16="http://schemas.microsoft.com/office/drawing/2014/main" id="{139C5A7F-A204-41EC-9889-C7B002A21534}"/>
+              </a:ext>
+            </a:extLst>
+          </p:cNvPr>
+          <p:cNvPicPr>
+            <a:picLocks noGrp="1" noChangeAspect="1"/>
+          </p:cNvPicPr>
+          <p:nvPr>
+            <p:ph type="pic" sz="quarter" idx="12"/>
+          </p:nvPr>
+        </p:nvPicPr>
+        <p:blipFill>
+          <a:blip r:embed="rId2">
+            <a:extLst>
+              <a:ext uri="{28A0092B-C50C-407E-A947-70E740481C1C}">
+                <a14:useLocalDpi xmlns:a14="http://schemas.microsoft.com/office/drawing/2010/main" val="0"/>
+              </a:ext>
+            </a:extLst>
+          </a:blip>
+          <a:srcRect t="6324" b="6324"/>
+          <a:stretch>
+            <a:fillRect/>
+          </a:stretch>
+        </p:blipFill>
+        <p:spPr/>
+      </p:pic>
+      <p:sp>
+        <p:nvSpPr>
+          <p:cNvPr id="4" name="Textplatzhalter 3"/>
+          <p:cNvSpPr>
+            <a:spLocks noGrp="1"/>
+          </p:cNvSpPr>
+          <p:nvPr>
+            <p:ph type="body" sz="quarter" idx="13"/>
+          </p:nvPr>
+        </p:nvSpPr>
+        <p:spPr/>
+        <p:txBody>
+          <a:bodyPr/>
+          <a:lstStyle/>
+          <a:p>
+            <a:r>
+              <a:rPr lang="de-DE" dirty="0"/>
+              <a:t>Supertolle </a:t>
+            </a:r>
+            <a:r>
+              <a:rPr lang="de-DE" dirty="0" err="1"/>
+              <a:t>Annelogie</a:t>
+            </a:r>
+            <a:endParaRPr lang="de-DE" dirty="0"/>
+          </a:p>
+        </p:txBody>
+      </p:sp>
+      <p:sp>
+        <p:nvSpPr>
+          <p:cNvPr id="5" name="Textplatzhalter 4"/>
+          <p:cNvSpPr>
+            <a:spLocks noGrp="1"/>
+          </p:cNvSpPr>
+          <p:nvPr>
+            <p:ph type="body" sz="quarter" idx="15"/>
+          </p:nvPr>
+        </p:nvSpPr>
+        <p:spPr/>
+        <p:txBody>
+          <a:bodyPr/>
+          <a:lstStyle/>
+          <a:p>
+            <a:r>
+              <a:rPr lang="de-DE" dirty="0"/>
+              <a:t>Analogie</a:t>
+            </a:r>
+          </a:p>
+        </p:txBody>
+      </p:sp>
+      <p:sp>
+        <p:nvSpPr>
+          <p:cNvPr id="3" name="Rechteck 2">
+            <a:extLst>
+              <a:ext uri="{FF2B5EF4-FFF2-40B4-BE49-F238E27FC236}">
+                <a16:creationId xmlns:a16="http://schemas.microsoft.com/office/drawing/2014/main" id="{7976462E-8EB9-46BE-9B9D-BC8AA42CBA20}"/>
+              </a:ext>
+            </a:extLst>
+          </p:cNvPr>
+          <p:cNvSpPr/>
+          <p:nvPr/>
+        </p:nvSpPr>
+        <p:spPr>
+          <a:xfrm>
+            <a:off x="0" y="0"/>
+            <a:ext cx="9144000" cy="6858000"/>
+          </a:xfrm>
+          <a:prstGeom prst="rect">
+            <a:avLst/>
+          </a:prstGeom>
+          <a:solidFill>
+            <a:schemeClr val="bg1"/>
+          </a:solidFill>
+          <a:ln w="28575">
+            <a:solidFill>
+              <a:schemeClr val="bg1"/>
+            </a:solidFill>
+          </a:ln>
+        </p:spPr>
+        <p:style>
+          <a:lnRef idx="2">
+            <a:schemeClr val="accent1">
+              <a:shade val="50000"/>
+            </a:schemeClr>
+          </a:lnRef>
+          <a:fillRef idx="1">
+            <a:schemeClr val="accent1"/>
+          </a:fillRef>
+          <a:effectRef idx="0">
+            <a:schemeClr val="accent1"/>
+          </a:effectRef>
+          <a:fontRef idx="minor">
+            <a:schemeClr val="lt1"/>
+          </a:fontRef>
+        </p:style>
+        <p:txBody>
+          <a:bodyPr rtlCol="0" anchor="ctr"/>
+          <a:lstStyle/>
+          <a:p>
+            <a:pPr algn="ctr"/>
+            <a:endParaRPr lang="de-DE"/>
+          </a:p>
+        </p:txBody>
+      </p:sp>
+      <p:sp>
+        <p:nvSpPr>
+          <p:cNvPr id="6" name="Textfeld 5">
+            <a:extLst>
+              <a:ext uri="{FF2B5EF4-FFF2-40B4-BE49-F238E27FC236}">
+                <a16:creationId xmlns:a16="http://schemas.microsoft.com/office/drawing/2014/main" id="{296021C2-D1A8-4421-90E4-5871158F5F43}"/>
+              </a:ext>
+            </a:extLst>
+          </p:cNvPr>
+          <p:cNvSpPr txBox="1"/>
+          <p:nvPr/>
+        </p:nvSpPr>
+        <p:spPr>
+          <a:xfrm>
+            <a:off x="2123728" y="404664"/>
+            <a:ext cx="4392488" cy="1200329"/>
+          </a:xfrm>
+          <a:prstGeom prst="rect">
+            <a:avLst/>
+          </a:prstGeom>
+          <a:noFill/>
+        </p:spPr>
+        <p:txBody>
+          <a:bodyPr wrap="square" rtlCol="0">
+            <a:spAutoFit/>
+          </a:bodyPr>
+          <a:lstStyle/>
+          <a:p>
+            <a:pPr algn="ctr">
+              <a:buClr>
+                <a:srgbClr val="C00000"/>
+              </a:buClr>
+            </a:pPr>
+            <a:r>
+              <a:rPr lang="de-DE" sz="7200" b="1" dirty="0" err="1"/>
+              <a:t>clone</a:t>
+            </a:r>
+            <a:endParaRPr lang="de-DE" sz="2000" b="1" dirty="0"/>
+          </a:p>
+        </p:txBody>
+      </p:sp>
+    </p:spTree>
+    <p:extLst>
+      <p:ext uri="{BB962C8B-B14F-4D97-AF65-F5344CB8AC3E}">
+        <p14:creationId xmlns:p14="http://schemas.microsoft.com/office/powerpoint/2010/main" val="4225502695"/>
+      </p:ext>
+    </p:extLst>
+  </p:cSld>
+  <p:clrMapOvr>
+    <a:masterClrMapping/>
+  </p:clrMapOvr>
+</p:sld>
+</file>
+
+<file path=ppt/slides/slide5.xml><?xml version="1.0" encoding="utf-8"?>
+<p:sld xmlns:a="http://schemas.openxmlformats.org/drawingml/2006/main" xmlns:r="http://schemas.openxmlformats.org/officeDocument/2006/relationships" xmlns:p="http://schemas.openxmlformats.org/presentationml/2006/main">
+  <p:cSld>
+    <p:spTree>
+      <p:nvGrpSpPr>
+        <p:cNvPr id="1" name=""/>
+        <p:cNvGrpSpPr/>
+        <p:nvPr/>
+      </p:nvGrpSpPr>
+      <p:grpSpPr>
+        <a:xfrm>
+          <a:off x="0" y="0"/>
+          <a:ext cx="0" cy="0"/>
+          <a:chOff x="0" y="0"/>
+          <a:chExt cx="0" cy="0"/>
+        </a:xfrm>
+      </p:grpSpPr>
+      <p:sp>
+        <p:nvSpPr>
+          <p:cNvPr id="2" name="Titel 1"/>
+          <p:cNvSpPr>
+            <a:spLocks noGrp="1"/>
+          </p:cNvSpPr>
+          <p:nvPr>
+            <p:ph type="title"/>
+          </p:nvPr>
+        </p:nvSpPr>
+        <p:spPr/>
+        <p:txBody>
+          <a:bodyPr/>
+          <a:lstStyle/>
+          <a:p>
+            <a:r>
+              <a:rPr lang="de-DE" dirty="0"/>
+              <a:t>Einleitung</a:t>
+            </a:r>
+          </a:p>
+        </p:txBody>
+      </p:sp>
+      <p:pic>
+        <p:nvPicPr>
+          <p:cNvPr id="7" name="Bildplatzhalter 6" descr="Ein Bild, das ClipArt enthält.&#10;&#10;Mit hoher Zuverlässigkeit generierte Beschreibung">
+            <a:extLst>
+              <a:ext uri="{FF2B5EF4-FFF2-40B4-BE49-F238E27FC236}">
+                <a16:creationId xmlns:a16="http://schemas.microsoft.com/office/drawing/2014/main" id="{139C5A7F-A204-41EC-9889-C7B002A21534}"/>
+              </a:ext>
+            </a:extLst>
+          </p:cNvPr>
+          <p:cNvPicPr>
+            <a:picLocks noGrp="1" noChangeAspect="1"/>
+          </p:cNvPicPr>
+          <p:nvPr>
+            <p:ph type="pic" sz="quarter" idx="12"/>
+          </p:nvPr>
+        </p:nvPicPr>
+        <p:blipFill>
+          <a:blip r:embed="rId2">
+            <a:extLst>
+              <a:ext uri="{28A0092B-C50C-407E-A947-70E740481C1C}">
+                <a14:useLocalDpi xmlns:a14="http://schemas.microsoft.com/office/drawing/2010/main" val="0"/>
+              </a:ext>
+            </a:extLst>
+          </a:blip>
+          <a:srcRect t="6324" b="6324"/>
+          <a:stretch>
+            <a:fillRect/>
+          </a:stretch>
+        </p:blipFill>
+        <p:spPr/>
+      </p:pic>
+      <p:sp>
+        <p:nvSpPr>
+          <p:cNvPr id="4" name="Textplatzhalter 3"/>
+          <p:cNvSpPr>
+            <a:spLocks noGrp="1"/>
+          </p:cNvSpPr>
+          <p:nvPr>
+            <p:ph type="body" sz="quarter" idx="13"/>
+          </p:nvPr>
+        </p:nvSpPr>
+        <p:spPr/>
+        <p:txBody>
+          <a:bodyPr/>
+          <a:lstStyle/>
+          <a:p>
+            <a:r>
+              <a:rPr lang="de-DE" dirty="0"/>
+              <a:t>Supertolle </a:t>
+            </a:r>
+            <a:r>
+              <a:rPr lang="de-DE" dirty="0" err="1"/>
+              <a:t>Annelogie</a:t>
+            </a:r>
+            <a:endParaRPr lang="de-DE" dirty="0"/>
+          </a:p>
+        </p:txBody>
+      </p:sp>
+      <p:sp>
+        <p:nvSpPr>
+          <p:cNvPr id="5" name="Textplatzhalter 4"/>
+          <p:cNvSpPr>
+            <a:spLocks noGrp="1"/>
+          </p:cNvSpPr>
+          <p:nvPr>
+            <p:ph type="body" sz="quarter" idx="15"/>
+          </p:nvPr>
+        </p:nvSpPr>
+        <p:spPr/>
+        <p:txBody>
+          <a:bodyPr/>
+          <a:lstStyle/>
+          <a:p>
+            <a:r>
+              <a:rPr lang="de-DE" dirty="0"/>
+              <a:t>Analogie</a:t>
+            </a:r>
+          </a:p>
+        </p:txBody>
+      </p:sp>
+      <p:sp>
+        <p:nvSpPr>
+          <p:cNvPr id="3" name="Rechteck 2">
+            <a:extLst>
+              <a:ext uri="{FF2B5EF4-FFF2-40B4-BE49-F238E27FC236}">
+                <a16:creationId xmlns:a16="http://schemas.microsoft.com/office/drawing/2014/main" id="{7976462E-8EB9-46BE-9B9D-BC8AA42CBA20}"/>
+              </a:ext>
+            </a:extLst>
+          </p:cNvPr>
+          <p:cNvSpPr/>
+          <p:nvPr/>
+        </p:nvSpPr>
+        <p:spPr>
+          <a:xfrm>
+            <a:off x="0" y="0"/>
+            <a:ext cx="9144000" cy="6858000"/>
+          </a:xfrm>
+          <a:prstGeom prst="rect">
+            <a:avLst/>
+          </a:prstGeom>
+          <a:solidFill>
+            <a:schemeClr val="bg1"/>
+          </a:solidFill>
+          <a:ln w="28575">
+            <a:solidFill>
+              <a:schemeClr val="bg1"/>
+            </a:solidFill>
+          </a:ln>
+        </p:spPr>
+        <p:style>
+          <a:lnRef idx="2">
+            <a:schemeClr val="accent1">
+              <a:shade val="50000"/>
+            </a:schemeClr>
+          </a:lnRef>
+          <a:fillRef idx="1">
+            <a:schemeClr val="accent1"/>
+          </a:fillRef>
+          <a:effectRef idx="0">
+            <a:schemeClr val="accent1"/>
+          </a:effectRef>
+          <a:fontRef idx="minor">
+            <a:schemeClr val="lt1"/>
+          </a:fontRef>
+        </p:style>
+        <p:txBody>
+          <a:bodyPr rtlCol="0" anchor="ctr"/>
+          <a:lstStyle/>
+          <a:p>
+            <a:pPr algn="ctr"/>
+            <a:endParaRPr lang="de-DE"/>
+          </a:p>
+        </p:txBody>
+      </p:sp>
+      <p:sp>
+        <p:nvSpPr>
+          <p:cNvPr id="6" name="Textfeld 5">
+            <a:extLst>
+              <a:ext uri="{FF2B5EF4-FFF2-40B4-BE49-F238E27FC236}">
+                <a16:creationId xmlns:a16="http://schemas.microsoft.com/office/drawing/2014/main" id="{296021C2-D1A8-4421-90E4-5871158F5F43}"/>
+              </a:ext>
+            </a:extLst>
+          </p:cNvPr>
+          <p:cNvSpPr txBox="1"/>
+          <p:nvPr/>
+        </p:nvSpPr>
+        <p:spPr>
+          <a:xfrm>
+            <a:off x="2123728" y="404664"/>
+            <a:ext cx="4392488" cy="1200329"/>
+          </a:xfrm>
+          <a:prstGeom prst="rect">
+            <a:avLst/>
+          </a:prstGeom>
+          <a:noFill/>
+        </p:spPr>
+        <p:txBody>
+          <a:bodyPr wrap="square" rtlCol="0">
+            <a:spAutoFit/>
+          </a:bodyPr>
+          <a:lstStyle/>
+          <a:p>
+            <a:pPr algn="ctr">
+              <a:buClr>
+                <a:srgbClr val="C00000"/>
+              </a:buClr>
+            </a:pPr>
+            <a:r>
+              <a:rPr lang="de-DE" sz="7200" b="1" dirty="0" err="1"/>
+              <a:t>add</a:t>
+            </a:r>
+            <a:endParaRPr lang="de-DE" sz="2000" b="1" dirty="0"/>
+          </a:p>
+        </p:txBody>
+      </p:sp>
+    </p:spTree>
+    <p:extLst>
+      <p:ext uri="{BB962C8B-B14F-4D97-AF65-F5344CB8AC3E}">
+        <p14:creationId xmlns:p14="http://schemas.microsoft.com/office/powerpoint/2010/main" val="3503399456"/>
+      </p:ext>
+    </p:extLst>
+  </p:cSld>
+  <p:clrMapOvr>
+    <a:masterClrMapping/>
+  </p:clrMapOvr>
+</p:sld>
+</file>
+
+<file path=ppt/slides/slide6.xml><?xml version="1.0" encoding="utf-8"?>
+<p:sld xmlns:a="http://schemas.openxmlformats.org/drawingml/2006/main" xmlns:r="http://schemas.openxmlformats.org/officeDocument/2006/relationships" xmlns:p="http://schemas.openxmlformats.org/presentationml/2006/main">
+  <p:cSld>
+    <p:spTree>
+      <p:nvGrpSpPr>
+        <p:cNvPr id="1" name=""/>
+        <p:cNvGrpSpPr/>
+        <p:nvPr/>
+      </p:nvGrpSpPr>
+      <p:grpSpPr>
+        <a:xfrm>
+          <a:off x="0" y="0"/>
+          <a:ext cx="0" cy="0"/>
+          <a:chOff x="0" y="0"/>
+          <a:chExt cx="0" cy="0"/>
+        </a:xfrm>
+      </p:grpSpPr>
+      <p:sp>
+        <p:nvSpPr>
+          <p:cNvPr id="2" name="Titel 1"/>
+          <p:cNvSpPr>
+            <a:spLocks noGrp="1"/>
+          </p:cNvSpPr>
+          <p:nvPr>
+            <p:ph type="title"/>
+          </p:nvPr>
+        </p:nvSpPr>
+        <p:spPr/>
+        <p:txBody>
+          <a:bodyPr/>
+          <a:lstStyle/>
+          <a:p>
+            <a:r>
+              <a:rPr lang="de-DE" dirty="0"/>
+              <a:t>Einleitung</a:t>
+            </a:r>
+          </a:p>
+        </p:txBody>
+      </p:sp>
+      <p:pic>
+        <p:nvPicPr>
+          <p:cNvPr id="7" name="Bildplatzhalter 6" descr="Ein Bild, das ClipArt enthält.&#10;&#10;Mit hoher Zuverlässigkeit generierte Beschreibung">
+            <a:extLst>
+              <a:ext uri="{FF2B5EF4-FFF2-40B4-BE49-F238E27FC236}">
+                <a16:creationId xmlns:a16="http://schemas.microsoft.com/office/drawing/2014/main" id="{139C5A7F-A204-41EC-9889-C7B002A21534}"/>
+              </a:ext>
+            </a:extLst>
+          </p:cNvPr>
+          <p:cNvPicPr>
+            <a:picLocks noGrp="1" noChangeAspect="1"/>
+          </p:cNvPicPr>
+          <p:nvPr>
+            <p:ph type="pic" sz="quarter" idx="12"/>
+          </p:nvPr>
+        </p:nvPicPr>
+        <p:blipFill>
+          <a:blip r:embed="rId2">
+            <a:extLst>
+              <a:ext uri="{28A0092B-C50C-407E-A947-70E740481C1C}">
+                <a14:useLocalDpi xmlns:a14="http://schemas.microsoft.com/office/drawing/2010/main" val="0"/>
+              </a:ext>
+            </a:extLst>
+          </a:blip>
+          <a:srcRect t="6324" b="6324"/>
+          <a:stretch>
+            <a:fillRect/>
+          </a:stretch>
+        </p:blipFill>
+        <p:spPr/>
+      </p:pic>
+      <p:sp>
+        <p:nvSpPr>
+          <p:cNvPr id="4" name="Textplatzhalter 3"/>
+          <p:cNvSpPr>
+            <a:spLocks noGrp="1"/>
+          </p:cNvSpPr>
+          <p:nvPr>
+            <p:ph type="body" sz="quarter" idx="13"/>
+          </p:nvPr>
+        </p:nvSpPr>
+        <p:spPr/>
+        <p:txBody>
+          <a:bodyPr/>
+          <a:lstStyle/>
+          <a:p>
+            <a:r>
+              <a:rPr lang="de-DE" dirty="0"/>
+              <a:t>Supertolle </a:t>
+            </a:r>
+            <a:r>
+              <a:rPr lang="de-DE" dirty="0" err="1"/>
+              <a:t>Annelogie</a:t>
+            </a:r>
+            <a:endParaRPr lang="de-DE" dirty="0"/>
+          </a:p>
+        </p:txBody>
+      </p:sp>
+      <p:sp>
+        <p:nvSpPr>
+          <p:cNvPr id="5" name="Textplatzhalter 4"/>
+          <p:cNvSpPr>
+            <a:spLocks noGrp="1"/>
+          </p:cNvSpPr>
+          <p:nvPr>
+            <p:ph type="body" sz="quarter" idx="15"/>
+          </p:nvPr>
+        </p:nvSpPr>
+        <p:spPr/>
+        <p:txBody>
+          <a:bodyPr/>
+          <a:lstStyle/>
+          <a:p>
+            <a:r>
+              <a:rPr lang="de-DE" dirty="0"/>
+              <a:t>Analogie</a:t>
+            </a:r>
+          </a:p>
+        </p:txBody>
+      </p:sp>
+      <p:sp>
+        <p:nvSpPr>
+          <p:cNvPr id="3" name="Rechteck 2">
+            <a:extLst>
+              <a:ext uri="{FF2B5EF4-FFF2-40B4-BE49-F238E27FC236}">
+                <a16:creationId xmlns:a16="http://schemas.microsoft.com/office/drawing/2014/main" id="{7976462E-8EB9-46BE-9B9D-BC8AA42CBA20}"/>
+              </a:ext>
+            </a:extLst>
+          </p:cNvPr>
+          <p:cNvSpPr/>
+          <p:nvPr/>
+        </p:nvSpPr>
+        <p:spPr>
+          <a:xfrm>
+            <a:off x="0" y="0"/>
+            <a:ext cx="9144000" cy="6858000"/>
+          </a:xfrm>
+          <a:prstGeom prst="rect">
+            <a:avLst/>
+          </a:prstGeom>
+          <a:solidFill>
+            <a:schemeClr val="bg1"/>
+          </a:solidFill>
+          <a:ln w="28575">
+            <a:solidFill>
+              <a:schemeClr val="bg1"/>
+            </a:solidFill>
+          </a:ln>
+        </p:spPr>
+        <p:style>
+          <a:lnRef idx="2">
+            <a:schemeClr val="accent1">
+              <a:shade val="50000"/>
+            </a:schemeClr>
+          </a:lnRef>
+          <a:fillRef idx="1">
+            <a:schemeClr val="accent1"/>
+          </a:fillRef>
+          <a:effectRef idx="0">
+            <a:schemeClr val="accent1"/>
+          </a:effectRef>
+          <a:fontRef idx="minor">
+            <a:schemeClr val="lt1"/>
+          </a:fontRef>
+        </p:style>
+        <p:txBody>
+          <a:bodyPr rtlCol="0" anchor="ctr"/>
+          <a:lstStyle/>
+          <a:p>
+            <a:pPr algn="ctr"/>
+            <a:endParaRPr lang="de-DE"/>
+          </a:p>
+        </p:txBody>
+      </p:sp>
+      <p:sp>
+        <p:nvSpPr>
+          <p:cNvPr id="6" name="Textfeld 5">
+            <a:extLst>
+              <a:ext uri="{FF2B5EF4-FFF2-40B4-BE49-F238E27FC236}">
+                <a16:creationId xmlns:a16="http://schemas.microsoft.com/office/drawing/2014/main" id="{296021C2-D1A8-4421-90E4-5871158F5F43}"/>
+              </a:ext>
+            </a:extLst>
+          </p:cNvPr>
+          <p:cNvSpPr txBox="1"/>
+          <p:nvPr/>
+        </p:nvSpPr>
+        <p:spPr>
+          <a:xfrm>
+            <a:off x="2123728" y="404664"/>
+            <a:ext cx="4392488" cy="1200329"/>
+          </a:xfrm>
+          <a:prstGeom prst="rect">
+            <a:avLst/>
+          </a:prstGeom>
+          <a:noFill/>
+        </p:spPr>
+        <p:txBody>
+          <a:bodyPr wrap="square" rtlCol="0">
+            <a:spAutoFit/>
+          </a:bodyPr>
+          <a:lstStyle/>
+          <a:p>
+            <a:pPr algn="ctr">
+              <a:buClr>
+                <a:srgbClr val="C00000"/>
+              </a:buClr>
+            </a:pPr>
+            <a:r>
+              <a:rPr lang="de-DE" sz="7200" b="1" dirty="0" err="1"/>
+              <a:t>commit</a:t>
+            </a:r>
+            <a:endParaRPr lang="de-DE" sz="2000" b="1" dirty="0"/>
+          </a:p>
+        </p:txBody>
+      </p:sp>
+    </p:spTree>
+    <p:extLst>
+      <p:ext uri="{BB962C8B-B14F-4D97-AF65-F5344CB8AC3E}">
+        <p14:creationId xmlns:p14="http://schemas.microsoft.com/office/powerpoint/2010/main" val="3061075944"/>
+      </p:ext>
+    </p:extLst>
+  </p:cSld>
+  <p:clrMapOvr>
+    <a:masterClrMapping/>
+  </p:clrMapOvr>
+</p:sld>
+</file>
+
+<file path=ppt/slides/slide7.xml><?xml version="1.0" encoding="utf-8"?>
+<p:sld xmlns:a="http://schemas.openxmlformats.org/drawingml/2006/main" xmlns:r="http://schemas.openxmlformats.org/officeDocument/2006/relationships" xmlns:p="http://schemas.openxmlformats.org/presentationml/2006/main">
+  <p:cSld>
+    <p:spTree>
+      <p:nvGrpSpPr>
+        <p:cNvPr id="1" name=""/>
+        <p:cNvGrpSpPr/>
+        <p:nvPr/>
+      </p:nvGrpSpPr>
+      <p:grpSpPr>
+        <a:xfrm>
+          <a:off x="0" y="0"/>
+          <a:ext cx="0" cy="0"/>
+          <a:chOff x="0" y="0"/>
+          <a:chExt cx="0" cy="0"/>
+        </a:xfrm>
+      </p:grpSpPr>
+      <p:sp>
+        <p:nvSpPr>
+          <p:cNvPr id="2" name="Titel 1"/>
+          <p:cNvSpPr>
+            <a:spLocks noGrp="1"/>
+          </p:cNvSpPr>
+          <p:nvPr>
+            <p:ph type="title"/>
+          </p:nvPr>
+        </p:nvSpPr>
+        <p:spPr/>
+        <p:txBody>
+          <a:bodyPr/>
+          <a:lstStyle/>
+          <a:p>
+            <a:r>
+              <a:rPr lang="de-DE" dirty="0"/>
+              <a:t>Einleitung</a:t>
+            </a:r>
+          </a:p>
+        </p:txBody>
+      </p:sp>
+      <p:pic>
+        <p:nvPicPr>
+          <p:cNvPr id="7" name="Bildplatzhalter 6" descr="Ein Bild, das ClipArt enthält.&#10;&#10;Mit hoher Zuverlässigkeit generierte Beschreibung">
+            <a:extLst>
+              <a:ext uri="{FF2B5EF4-FFF2-40B4-BE49-F238E27FC236}">
+                <a16:creationId xmlns:a16="http://schemas.microsoft.com/office/drawing/2014/main" id="{139C5A7F-A204-41EC-9889-C7B002A21534}"/>
+              </a:ext>
+            </a:extLst>
+          </p:cNvPr>
+          <p:cNvPicPr>
+            <a:picLocks noGrp="1" noChangeAspect="1"/>
+          </p:cNvPicPr>
+          <p:nvPr>
+            <p:ph type="pic" sz="quarter" idx="12"/>
+          </p:nvPr>
+        </p:nvPicPr>
+        <p:blipFill>
+          <a:blip r:embed="rId2">
+            <a:extLst>
+              <a:ext uri="{28A0092B-C50C-407E-A947-70E740481C1C}">
+                <a14:useLocalDpi xmlns:a14="http://schemas.microsoft.com/office/drawing/2010/main" val="0"/>
+              </a:ext>
+            </a:extLst>
+          </a:blip>
+          <a:srcRect t="6324" b="6324"/>
+          <a:stretch>
+            <a:fillRect/>
+          </a:stretch>
+        </p:blipFill>
+        <p:spPr/>
+      </p:pic>
+      <p:sp>
+        <p:nvSpPr>
+          <p:cNvPr id="4" name="Textplatzhalter 3"/>
+          <p:cNvSpPr>
+            <a:spLocks noGrp="1"/>
+          </p:cNvSpPr>
+          <p:nvPr>
+            <p:ph type="body" sz="quarter" idx="13"/>
+          </p:nvPr>
+        </p:nvSpPr>
+        <p:spPr/>
+        <p:txBody>
+          <a:bodyPr/>
+          <a:lstStyle/>
+          <a:p>
+            <a:r>
+              <a:rPr lang="de-DE" dirty="0"/>
+              <a:t>Supertolle </a:t>
+            </a:r>
+            <a:r>
+              <a:rPr lang="de-DE" dirty="0" err="1"/>
+              <a:t>Annelogie</a:t>
+            </a:r>
+            <a:endParaRPr lang="de-DE" dirty="0"/>
+          </a:p>
+        </p:txBody>
+      </p:sp>
+      <p:sp>
+        <p:nvSpPr>
+          <p:cNvPr id="5" name="Textplatzhalter 4"/>
+          <p:cNvSpPr>
+            <a:spLocks noGrp="1"/>
+          </p:cNvSpPr>
+          <p:nvPr>
+            <p:ph type="body" sz="quarter" idx="15"/>
+          </p:nvPr>
+        </p:nvSpPr>
+        <p:spPr/>
+        <p:txBody>
+          <a:bodyPr/>
+          <a:lstStyle/>
+          <a:p>
+            <a:r>
+              <a:rPr lang="de-DE" dirty="0"/>
+              <a:t>Analogie</a:t>
+            </a:r>
+          </a:p>
+        </p:txBody>
+      </p:sp>
+      <p:sp>
+        <p:nvSpPr>
+          <p:cNvPr id="3" name="Rechteck 2">
+            <a:extLst>
+              <a:ext uri="{FF2B5EF4-FFF2-40B4-BE49-F238E27FC236}">
+                <a16:creationId xmlns:a16="http://schemas.microsoft.com/office/drawing/2014/main" id="{7976462E-8EB9-46BE-9B9D-BC8AA42CBA20}"/>
+              </a:ext>
+            </a:extLst>
+          </p:cNvPr>
+          <p:cNvSpPr/>
+          <p:nvPr/>
+        </p:nvSpPr>
+        <p:spPr>
+          <a:xfrm>
+            <a:off x="0" y="0"/>
+            <a:ext cx="9144000" cy="6858000"/>
+          </a:xfrm>
+          <a:prstGeom prst="rect">
+            <a:avLst/>
+          </a:prstGeom>
+          <a:solidFill>
+            <a:schemeClr val="bg1"/>
+          </a:solidFill>
+          <a:ln w="28575">
+            <a:solidFill>
+              <a:schemeClr val="bg1"/>
+            </a:solidFill>
+          </a:ln>
+        </p:spPr>
+        <p:style>
+          <a:lnRef idx="2">
+            <a:schemeClr val="accent1">
+              <a:shade val="50000"/>
+            </a:schemeClr>
+          </a:lnRef>
+          <a:fillRef idx="1">
+            <a:schemeClr val="accent1"/>
+          </a:fillRef>
+          <a:effectRef idx="0">
+            <a:schemeClr val="accent1"/>
+          </a:effectRef>
+          <a:fontRef idx="minor">
+            <a:schemeClr val="lt1"/>
+          </a:fontRef>
+        </p:style>
+        <p:txBody>
+          <a:bodyPr rtlCol="0" anchor="ctr"/>
+          <a:lstStyle/>
+          <a:p>
+            <a:pPr algn="ctr"/>
+            <a:endParaRPr lang="de-DE"/>
+          </a:p>
+        </p:txBody>
+      </p:sp>
+      <p:sp>
+        <p:nvSpPr>
+          <p:cNvPr id="6" name="Textfeld 5">
+            <a:extLst>
+              <a:ext uri="{FF2B5EF4-FFF2-40B4-BE49-F238E27FC236}">
+                <a16:creationId xmlns:a16="http://schemas.microsoft.com/office/drawing/2014/main" id="{296021C2-D1A8-4421-90E4-5871158F5F43}"/>
+              </a:ext>
+            </a:extLst>
+          </p:cNvPr>
+          <p:cNvSpPr txBox="1"/>
+          <p:nvPr/>
+        </p:nvSpPr>
+        <p:spPr>
+          <a:xfrm>
+            <a:off x="2123728" y="404664"/>
+            <a:ext cx="4392488" cy="1200329"/>
+          </a:xfrm>
+          <a:prstGeom prst="rect">
+            <a:avLst/>
+          </a:prstGeom>
+          <a:noFill/>
+        </p:spPr>
+        <p:txBody>
+          <a:bodyPr wrap="square" rtlCol="0">
+            <a:spAutoFit/>
+          </a:bodyPr>
+          <a:lstStyle/>
+          <a:p>
+            <a:pPr algn="ctr">
+              <a:buClr>
+                <a:srgbClr val="C00000"/>
+              </a:buClr>
+            </a:pPr>
+            <a:r>
+              <a:rPr lang="de-DE" sz="7200" b="1" dirty="0"/>
+              <a:t>push</a:t>
+            </a:r>
+            <a:endParaRPr lang="de-DE" sz="2000" b="1" dirty="0"/>
+          </a:p>
+        </p:txBody>
+      </p:sp>
+    </p:spTree>
+    <p:extLst>
+      <p:ext uri="{BB962C8B-B14F-4D97-AF65-F5344CB8AC3E}">
+        <p14:creationId xmlns:p14="http://schemas.microsoft.com/office/powerpoint/2010/main" val="2985662647"/>
+      </p:ext>
+    </p:extLst>
+  </p:cSld>
+  <p:clrMapOvr>
+    <a:masterClrMapping/>
+  </p:clrMapOvr>
+</p:sld>
+</file>
+
+<file path=ppt/slides/slide8.xml><?xml version="1.0" encoding="utf-8"?>
+<p:sld xmlns:a="http://schemas.openxmlformats.org/drawingml/2006/main" xmlns:r="http://schemas.openxmlformats.org/officeDocument/2006/relationships" xmlns:p="http://schemas.openxmlformats.org/presentationml/2006/main">
+  <p:cSld>
+    <p:spTree>
+      <p:nvGrpSpPr>
+        <p:cNvPr id="1" name=""/>
+        <p:cNvGrpSpPr/>
+        <p:nvPr/>
+      </p:nvGrpSpPr>
+      <p:grpSpPr>
+        <a:xfrm>
+          <a:off x="0" y="0"/>
+          <a:ext cx="0" cy="0"/>
+          <a:chOff x="0" y="0"/>
+          <a:chExt cx="0" cy="0"/>
+        </a:xfrm>
+      </p:grpSpPr>
+      <p:sp>
+        <p:nvSpPr>
+          <p:cNvPr id="2" name="Titel 1"/>
+          <p:cNvSpPr>
+            <a:spLocks noGrp="1"/>
+          </p:cNvSpPr>
+          <p:nvPr>
+            <p:ph type="title"/>
+          </p:nvPr>
+        </p:nvSpPr>
+        <p:spPr/>
+        <p:txBody>
+          <a:bodyPr/>
+          <a:lstStyle/>
+          <a:p>
+            <a:r>
+              <a:rPr lang="de-DE" dirty="0"/>
+              <a:t>Einleitung</a:t>
+            </a:r>
+          </a:p>
+        </p:txBody>
+      </p:sp>
+      <p:pic>
+        <p:nvPicPr>
+          <p:cNvPr id="7" name="Bildplatzhalter 6" descr="Ein Bild, das ClipArt enthält.&#10;&#10;Mit hoher Zuverlässigkeit generierte Beschreibung">
+            <a:extLst>
+              <a:ext uri="{FF2B5EF4-FFF2-40B4-BE49-F238E27FC236}">
+                <a16:creationId xmlns:a16="http://schemas.microsoft.com/office/drawing/2014/main" id="{139C5A7F-A204-41EC-9889-C7B002A21534}"/>
+              </a:ext>
+            </a:extLst>
+          </p:cNvPr>
+          <p:cNvPicPr>
+            <a:picLocks noGrp="1" noChangeAspect="1"/>
+          </p:cNvPicPr>
+          <p:nvPr>
+            <p:ph type="pic" sz="quarter" idx="12"/>
+          </p:nvPr>
+        </p:nvPicPr>
+        <p:blipFill>
+          <a:blip r:embed="rId2">
+            <a:extLst>
+              <a:ext uri="{28A0092B-C50C-407E-A947-70E740481C1C}">
+                <a14:useLocalDpi xmlns:a14="http://schemas.microsoft.com/office/drawing/2010/main" val="0"/>
+              </a:ext>
+            </a:extLst>
+          </a:blip>
+          <a:srcRect t="6324" b="6324"/>
+          <a:stretch>
+            <a:fillRect/>
+          </a:stretch>
+        </p:blipFill>
+        <p:spPr/>
+      </p:pic>
+      <p:sp>
+        <p:nvSpPr>
+          <p:cNvPr id="4" name="Textplatzhalter 3"/>
+          <p:cNvSpPr>
+            <a:spLocks noGrp="1"/>
+          </p:cNvSpPr>
+          <p:nvPr>
+            <p:ph type="body" sz="quarter" idx="13"/>
+          </p:nvPr>
+        </p:nvSpPr>
+        <p:spPr/>
+        <p:txBody>
+          <a:bodyPr/>
+          <a:lstStyle/>
+          <a:p>
+            <a:r>
+              <a:rPr lang="de-DE" dirty="0"/>
+              <a:t>Supertolle </a:t>
+            </a:r>
+            <a:r>
+              <a:rPr lang="de-DE" dirty="0" err="1"/>
+              <a:t>Annelogie</a:t>
+            </a:r>
+            <a:endParaRPr lang="de-DE" dirty="0"/>
+          </a:p>
+        </p:txBody>
+      </p:sp>
+      <p:sp>
+        <p:nvSpPr>
+          <p:cNvPr id="5" name="Textplatzhalter 4"/>
+          <p:cNvSpPr>
+            <a:spLocks noGrp="1"/>
+          </p:cNvSpPr>
+          <p:nvPr>
+            <p:ph type="body" sz="quarter" idx="15"/>
+          </p:nvPr>
+        </p:nvSpPr>
+        <p:spPr/>
+        <p:txBody>
+          <a:bodyPr/>
+          <a:lstStyle/>
+          <a:p>
+            <a:r>
+              <a:rPr lang="de-DE" dirty="0"/>
+              <a:t>Analogie</a:t>
+            </a:r>
+          </a:p>
+        </p:txBody>
+      </p:sp>
+      <p:sp>
+        <p:nvSpPr>
+          <p:cNvPr id="3" name="Rechteck 2">
+            <a:extLst>
+              <a:ext uri="{FF2B5EF4-FFF2-40B4-BE49-F238E27FC236}">
+                <a16:creationId xmlns:a16="http://schemas.microsoft.com/office/drawing/2014/main" id="{7976462E-8EB9-46BE-9B9D-BC8AA42CBA20}"/>
+              </a:ext>
+            </a:extLst>
+          </p:cNvPr>
+          <p:cNvSpPr/>
+          <p:nvPr/>
+        </p:nvSpPr>
+        <p:spPr>
+          <a:xfrm>
+            <a:off x="0" y="0"/>
+            <a:ext cx="9144000" cy="6858000"/>
+          </a:xfrm>
+          <a:prstGeom prst="rect">
+            <a:avLst/>
+          </a:prstGeom>
+          <a:solidFill>
+            <a:schemeClr val="bg1"/>
+          </a:solidFill>
+          <a:ln w="28575">
+            <a:solidFill>
+              <a:schemeClr val="bg1"/>
+            </a:solidFill>
+          </a:ln>
+        </p:spPr>
+        <p:style>
+          <a:lnRef idx="2">
+            <a:schemeClr val="accent1">
+              <a:shade val="50000"/>
+            </a:schemeClr>
+          </a:lnRef>
+          <a:fillRef idx="1">
+            <a:schemeClr val="accent1"/>
+          </a:fillRef>
+          <a:effectRef idx="0">
+            <a:schemeClr val="accent1"/>
+          </a:effectRef>
+          <a:fontRef idx="minor">
+            <a:schemeClr val="lt1"/>
+          </a:fontRef>
+        </p:style>
+        <p:txBody>
+          <a:bodyPr rtlCol="0" anchor="ctr"/>
+          <a:lstStyle/>
+          <a:p>
+            <a:pPr algn="ctr"/>
+            <a:endParaRPr lang="de-DE"/>
+          </a:p>
+        </p:txBody>
+      </p:sp>
+      <p:sp>
+        <p:nvSpPr>
+          <p:cNvPr id="6" name="Textfeld 5">
+            <a:extLst>
+              <a:ext uri="{FF2B5EF4-FFF2-40B4-BE49-F238E27FC236}">
+                <a16:creationId xmlns:a16="http://schemas.microsoft.com/office/drawing/2014/main" id="{296021C2-D1A8-4421-90E4-5871158F5F43}"/>
+              </a:ext>
+            </a:extLst>
+          </p:cNvPr>
+          <p:cNvSpPr txBox="1"/>
+          <p:nvPr/>
+        </p:nvSpPr>
+        <p:spPr>
+          <a:xfrm>
+            <a:off x="2123728" y="404664"/>
+            <a:ext cx="4392488" cy="1200329"/>
+          </a:xfrm>
+          <a:prstGeom prst="rect">
+            <a:avLst/>
+          </a:prstGeom>
+          <a:noFill/>
+        </p:spPr>
+        <p:txBody>
+          <a:bodyPr wrap="square" rtlCol="0">
+            <a:spAutoFit/>
+          </a:bodyPr>
+          <a:lstStyle/>
+          <a:p>
+            <a:pPr algn="ctr">
+              <a:buClr>
+                <a:srgbClr val="C00000"/>
+              </a:buClr>
+            </a:pPr>
+            <a:r>
+              <a:rPr lang="de-DE" sz="7200" b="1" dirty="0"/>
+              <a:t>pull</a:t>
+            </a:r>
+            <a:endParaRPr lang="de-DE" sz="2000" b="1" dirty="0"/>
+          </a:p>
+        </p:txBody>
+      </p:sp>
+    </p:spTree>
+    <p:extLst>
+      <p:ext uri="{BB962C8B-B14F-4D97-AF65-F5344CB8AC3E}">
+        <p14:creationId xmlns:p14="http://schemas.microsoft.com/office/powerpoint/2010/main" val="2690635798"/>
+      </p:ext>
+    </p:extLst>
+  </p:cSld>
+  <p:clrMapOvr>
+    <a:masterClrMapping/>
+  </p:clrMapOvr>
+</p:sld>
+</file>
+
+<file path=ppt/slides/slide9.xml><?xml version="1.0" encoding="utf-8"?>
+<p:sld xmlns:a="http://schemas.openxmlformats.org/drawingml/2006/main" xmlns:r="http://schemas.openxmlformats.org/officeDocument/2006/relationships" xmlns:p="http://schemas.openxmlformats.org/presentationml/2006/main">
+  <p:cSld>
+    <p:spTree>
+      <p:nvGrpSpPr>
+        <p:cNvPr id="1" name=""/>
+        <p:cNvGrpSpPr/>
+        <p:nvPr/>
+      </p:nvGrpSpPr>
+      <p:grpSpPr>
+        <a:xfrm>
+          <a:off x="0" y="0"/>
+          <a:ext cx="0" cy="0"/>
+          <a:chOff x="0" y="0"/>
+          <a:chExt cx="0" cy="0"/>
+        </a:xfrm>
+      </p:grpSpPr>
+      <p:sp>
+        <p:nvSpPr>
+          <p:cNvPr id="2" name="Titel 1"/>
+          <p:cNvSpPr>
+            <a:spLocks noGrp="1"/>
+          </p:cNvSpPr>
+          <p:nvPr>
+            <p:ph type="title"/>
+          </p:nvPr>
+        </p:nvSpPr>
+        <p:spPr/>
+        <p:txBody>
+          <a:bodyPr/>
+          <a:lstStyle/>
+          <a:p>
+            <a:r>
+              <a:rPr lang="de-DE" dirty="0"/>
+              <a:t>Einleitung</a:t>
+            </a:r>
+          </a:p>
+        </p:txBody>
+      </p:sp>
+      <p:pic>
+        <p:nvPicPr>
+          <p:cNvPr id="7" name="Bildplatzhalter 6" descr="Ein Bild, das ClipArt enthält.&#10;&#10;Mit hoher Zuverlässigkeit generierte Beschreibung">
+            <a:extLst>
+              <a:ext uri="{FF2B5EF4-FFF2-40B4-BE49-F238E27FC236}">
+                <a16:creationId xmlns:a16="http://schemas.microsoft.com/office/drawing/2014/main" id="{139C5A7F-A204-41EC-9889-C7B002A21534}"/>
+              </a:ext>
+            </a:extLst>
+          </p:cNvPr>
+          <p:cNvPicPr>
+            <a:picLocks noGrp="1" noChangeAspect="1"/>
+          </p:cNvPicPr>
+          <p:nvPr>
+            <p:ph type="pic" sz="quarter" idx="12"/>
+          </p:nvPr>
+        </p:nvPicPr>
+        <p:blipFill>
+          <a:blip r:embed="rId2">
+            <a:extLst>
+              <a:ext uri="{28A0092B-C50C-407E-A947-70E740481C1C}">
+                <a14:useLocalDpi xmlns:a14="http://schemas.microsoft.com/office/drawing/2010/main" val="0"/>
+              </a:ext>
+            </a:extLst>
+          </a:blip>
+          <a:srcRect t="6324" b="6324"/>
+          <a:stretch>
+            <a:fillRect/>
+          </a:stretch>
+        </p:blipFill>
+        <p:spPr/>
+      </p:pic>
+      <p:sp>
+        <p:nvSpPr>
+          <p:cNvPr id="4" name="Textplatzhalter 3"/>
+          <p:cNvSpPr>
+            <a:spLocks noGrp="1"/>
+          </p:cNvSpPr>
+          <p:nvPr>
+            <p:ph type="body" sz="quarter" idx="13"/>
+          </p:nvPr>
+        </p:nvSpPr>
+        <p:spPr/>
+        <p:txBody>
+          <a:bodyPr/>
+          <a:lstStyle/>
+          <a:p>
+            <a:r>
+              <a:rPr lang="de-DE" dirty="0"/>
+              <a:t>Supertolle </a:t>
+            </a:r>
+            <a:r>
+              <a:rPr lang="de-DE" dirty="0" err="1"/>
+              <a:t>Annelogie</a:t>
+            </a:r>
+            <a:endParaRPr lang="de-DE" dirty="0"/>
+          </a:p>
+        </p:txBody>
+      </p:sp>
+      <p:sp>
+        <p:nvSpPr>
+          <p:cNvPr id="5" name="Textplatzhalter 4"/>
+          <p:cNvSpPr>
+            <a:spLocks noGrp="1"/>
+          </p:cNvSpPr>
+          <p:nvPr>
+            <p:ph type="body" sz="quarter" idx="15"/>
+          </p:nvPr>
+        </p:nvSpPr>
+        <p:spPr/>
+        <p:txBody>
+          <a:bodyPr/>
+          <a:lstStyle/>
+          <a:p>
+            <a:r>
+              <a:rPr lang="de-DE" dirty="0"/>
+              <a:t>Analogie</a:t>
+            </a:r>
+          </a:p>
+        </p:txBody>
+      </p:sp>
+      <p:sp>
+        <p:nvSpPr>
+          <p:cNvPr id="3" name="Rechteck 2">
+            <a:extLst>
+              <a:ext uri="{FF2B5EF4-FFF2-40B4-BE49-F238E27FC236}">
+                <a16:creationId xmlns:a16="http://schemas.microsoft.com/office/drawing/2014/main" id="{7976462E-8EB9-46BE-9B9D-BC8AA42CBA20}"/>
+              </a:ext>
+            </a:extLst>
+          </p:cNvPr>
+          <p:cNvSpPr/>
+          <p:nvPr/>
+        </p:nvSpPr>
+        <p:spPr>
+          <a:xfrm>
+            <a:off x="0" y="0"/>
+            <a:ext cx="9144000" cy="6858000"/>
+          </a:xfrm>
+          <a:prstGeom prst="rect">
+            <a:avLst/>
+          </a:prstGeom>
+          <a:solidFill>
+            <a:schemeClr val="bg1"/>
+          </a:solidFill>
+          <a:ln w="28575">
+            <a:solidFill>
+              <a:schemeClr val="bg1"/>
+            </a:solidFill>
+          </a:ln>
+        </p:spPr>
+        <p:style>
+          <a:lnRef idx="2">
+            <a:schemeClr val="accent1">
+              <a:shade val="50000"/>
+            </a:schemeClr>
+          </a:lnRef>
+          <a:fillRef idx="1">
+            <a:schemeClr val="accent1"/>
+          </a:fillRef>
+          <a:effectRef idx="0">
+            <a:schemeClr val="accent1"/>
+          </a:effectRef>
+          <a:fontRef idx="minor">
+            <a:schemeClr val="lt1"/>
+          </a:fontRef>
+        </p:style>
+        <p:txBody>
+          <a:bodyPr rtlCol="0" anchor="ctr"/>
+          <a:lstStyle/>
+          <a:p>
+            <a:pPr algn="ctr"/>
+            <a:endParaRPr lang="de-DE"/>
+          </a:p>
+        </p:txBody>
+      </p:sp>
+      <p:sp>
+        <p:nvSpPr>
+          <p:cNvPr id="6" name="Textfeld 5">
+            <a:extLst>
+              <a:ext uri="{FF2B5EF4-FFF2-40B4-BE49-F238E27FC236}">
+                <a16:creationId xmlns:a16="http://schemas.microsoft.com/office/drawing/2014/main" id="{296021C2-D1A8-4421-90E4-5871158F5F43}"/>
+              </a:ext>
+            </a:extLst>
+          </p:cNvPr>
+          <p:cNvSpPr txBox="1"/>
+          <p:nvPr/>
+        </p:nvSpPr>
+        <p:spPr>
+          <a:xfrm>
+            <a:off x="2123728" y="404664"/>
+            <a:ext cx="4392488" cy="1200329"/>
+          </a:xfrm>
+          <a:prstGeom prst="rect">
+            <a:avLst/>
+          </a:prstGeom>
+          <a:noFill/>
+        </p:spPr>
+        <p:txBody>
+          <a:bodyPr wrap="square" rtlCol="0">
+            <a:spAutoFit/>
+          </a:bodyPr>
+          <a:lstStyle/>
+          <a:p>
+            <a:pPr algn="ctr">
+              <a:buClr>
+                <a:srgbClr val="C00000"/>
+              </a:buClr>
+            </a:pPr>
+            <a:r>
+              <a:rPr lang="de-DE" sz="7200" b="1" dirty="0" err="1"/>
+              <a:t>merge</a:t>
+            </a:r>
+            <a:endParaRPr lang="de-DE" sz="2000" b="1" dirty="0"/>
+          </a:p>
+        </p:txBody>
+      </p:sp>
+    </p:spTree>
+    <p:extLst>
+      <p:ext uri="{BB962C8B-B14F-4D97-AF65-F5344CB8AC3E}">
+        <p14:creationId xmlns:p14="http://schemas.microsoft.com/office/powerpoint/2010/main" val="4064159595"/>
       </p:ext>
     </p:extLst>
   </p:cSld>

</xml_diff>